<commit_message>
Different good edits to defense + folders
- Inserted info about co-relator and renamed folder
- Important edits to presentation
</commit_message>
<xml_diff>
--- a/Thesis Presentation/Presentation Gabriel Rovesti.pptx
+++ b/Thesis Presentation/Presentation Gabriel Rovesti.pptx
@@ -6,10 +6,10 @@
     <p:sldMasterId id="2147483665" r:id="rId2"/>
   </p:sldMasterIdLst>
   <p:notesMasterIdLst>
-    <p:notesMasterId r:id="rId20"/>
+    <p:notesMasterId r:id="rId19"/>
   </p:notesMasterIdLst>
   <p:handoutMasterIdLst>
-    <p:handoutMasterId r:id="rId21"/>
+    <p:handoutMasterId r:id="rId20"/>
   </p:handoutMasterIdLst>
   <p:sldIdLst>
     <p:sldId id="256" r:id="rId3"/>
@@ -23,29 +23,28 @@
     <p:sldId id="271" r:id="rId11"/>
     <p:sldId id="272" r:id="rId12"/>
     <p:sldId id="264" r:id="rId13"/>
-    <p:sldId id="265" r:id="rId14"/>
-    <p:sldId id="267" r:id="rId15"/>
-    <p:sldId id="266" r:id="rId16"/>
-    <p:sldId id="268" r:id="rId17"/>
-    <p:sldId id="269" r:id="rId18"/>
-    <p:sldId id="270" r:id="rId19"/>
+    <p:sldId id="267" r:id="rId14"/>
+    <p:sldId id="266" r:id="rId15"/>
+    <p:sldId id="268" r:id="rId16"/>
+    <p:sldId id="269" r:id="rId17"/>
+    <p:sldId id="270" r:id="rId18"/>
   </p:sldIdLst>
   <p:sldSz cx="9144000" cy="6858000" type="screen4x3"/>
   <p:notesSz cx="6858000" cy="9144000"/>
   <p:embeddedFontLst>
     <p:embeddedFont>
       <p:font typeface="Consolas" panose="020B0609020204030204" pitchFamily="49" charset="0"/>
-      <p:regular r:id="rId22"/>
-      <p:bold r:id="rId23"/>
-      <p:italic r:id="rId24"/>
-      <p:boldItalic r:id="rId25"/>
+      <p:regular r:id="rId21"/>
+      <p:bold r:id="rId22"/>
+      <p:italic r:id="rId23"/>
+      <p:boldItalic r:id="rId24"/>
     </p:embeddedFont>
     <p:embeddedFont>
       <p:font typeface="Segoe UI" panose="020B0502040204020203" pitchFamily="34" charset="0"/>
-      <p:regular r:id="rId26"/>
-      <p:bold r:id="rId27"/>
-      <p:italic r:id="rId28"/>
-      <p:boldItalic r:id="rId29"/>
+      <p:regular r:id="rId25"/>
+      <p:bold r:id="rId26"/>
+      <p:italic r:id="rId27"/>
+      <p:boldItalic r:id="rId28"/>
     </p:embeddedFont>
   </p:embeddedFontLst>
   <p:defaultTextStyle>
@@ -261,10 +260,8 @@
 <file path=ppt/revisionInfo.xml><?xml version="1.0" encoding="utf-8"?>
 <p1510:revInfo xmlns:a="http://schemas.openxmlformats.org/drawingml/2006/main" xmlns:r="http://schemas.openxmlformats.org/officeDocument/2006/relationships" xmlns:p1510="http://schemas.microsoft.com/office/powerpoint/2015/10/main">
   <p1510:revLst>
-    <p1510:client id="{0C207069-FD5A-C74F-5DEE-D4632958E92A}" v="1564" dt="2025-07-05T14:36:23.365"/>
-    <p1510:client id="{7100BD26-BD90-CB9A-F001-EF19CF476ABA}" v="306" dt="2025-07-05T12:47:55.170"/>
-    <p1510:client id="{A56BC8BB-000D-3B9D-EE5E-D022E3B0FC91}" v="439" dt="2025-07-05T15:02:31.262"/>
-    <p1510:client id="{BA4FCC0E-7DA5-619A-5E41-7CA15D88F4E1}" v="470" dt="2025-07-04T15:34:51.873"/>
+    <p1510:client id="{625D73A8-2971-33D0-7F96-EA3FA7DFDCDD}" v="152" dt="2025-07-07T17:42:36.729"/>
+    <p1510:client id="{63ABD6D2-6AA7-A9AD-CFE8-E7CF9E0D030A}" v="622" dt="2025-07-07T17:03:40.833"/>
   </p1510:revLst>
 </p1510:revInfo>
 </file>
@@ -363,7 +360,7 @@
           <a:p>
             <a:fld id="{6469F890-3609-4E18-B68A-510CF7125ACB}" type="datetimeFigureOut">
               <a:rPr lang="it-IT" smtClean="0"/>
-              <a:t>05/07/2025</a:t>
+              <a:t>07/07/2025</a:t>
             </a:fld>
             <a:endParaRPr lang="it-IT"/>
           </a:p>
@@ -1128,133 +1125,6 @@
         <p:cNvPr id="1" name="Shape 95">
           <a:extLst>
             <a:ext uri="{FF2B5EF4-FFF2-40B4-BE49-F238E27FC236}">
-              <a16:creationId xmlns:a16="http://schemas.microsoft.com/office/drawing/2014/main" id="{88028947-BE39-E256-5C25-DEC687441D25}"/>
-            </a:ext>
-          </a:extLst>
-        </p:cNvPr>
-        <p:cNvGrpSpPr/>
-        <p:nvPr/>
-      </p:nvGrpSpPr>
-      <p:grpSpPr>
-        <a:xfrm>
-          <a:off x="0" y="0"/>
-          <a:ext cx="0" cy="0"/>
-          <a:chOff x="0" y="0"/>
-          <a:chExt cx="0" cy="0"/>
-        </a:xfrm>
-      </p:grpSpPr>
-      <p:sp>
-        <p:nvSpPr>
-          <p:cNvPr id="96" name="Shape 96">
-            <a:extLst>
-              <a:ext uri="{FF2B5EF4-FFF2-40B4-BE49-F238E27FC236}">
-                <a16:creationId xmlns:a16="http://schemas.microsoft.com/office/drawing/2014/main" id="{80913FC8-3E24-932F-B76E-87DD8DDF094F}"/>
-              </a:ext>
-            </a:extLst>
-          </p:cNvPr>
-          <p:cNvSpPr>
-            <a:spLocks noGrp="1" noRot="1" noChangeAspect="1"/>
-          </p:cNvSpPr>
-          <p:nvPr>
-            <p:ph type="sldImg" idx="2"/>
-          </p:nvPr>
-        </p:nvSpPr>
-        <p:spPr>
-          <a:xfrm>
-            <a:off x="1143000" y="685800"/>
-            <a:ext cx="4572000" cy="3429000"/>
-          </a:xfrm>
-          <a:custGeom>
-            <a:avLst/>
-            <a:gdLst/>
-            <a:ahLst/>
-            <a:cxnLst/>
-            <a:rect l="0" t="0" r="0" b="0"/>
-            <a:pathLst>
-              <a:path w="120000" h="120000" extrusionOk="0">
-                <a:moveTo>
-                  <a:pt x="0" y="0"/>
-                </a:moveTo>
-                <a:lnTo>
-                  <a:pt x="120000" y="0"/>
-                </a:lnTo>
-                <a:lnTo>
-                  <a:pt x="120000" y="120000"/>
-                </a:lnTo>
-                <a:lnTo>
-                  <a:pt x="0" y="120000"/>
-                </a:lnTo>
-                <a:close/>
-              </a:path>
-            </a:pathLst>
-          </a:custGeom>
-        </p:spPr>
-      </p:sp>
-      <p:sp>
-        <p:nvSpPr>
-          <p:cNvPr id="97" name="Shape 97">
-            <a:extLst>
-              <a:ext uri="{FF2B5EF4-FFF2-40B4-BE49-F238E27FC236}">
-                <a16:creationId xmlns:a16="http://schemas.microsoft.com/office/drawing/2014/main" id="{ED681E90-529F-B6A6-C677-EE82D913E49C}"/>
-              </a:ext>
-            </a:extLst>
-          </p:cNvPr>
-          <p:cNvSpPr txBox="1">
-            <a:spLocks noGrp="1"/>
-          </p:cNvSpPr>
-          <p:nvPr>
-            <p:ph type="body" idx="1"/>
-          </p:nvPr>
-        </p:nvSpPr>
-        <p:spPr>
-          <a:xfrm>
-            <a:off x="685800" y="4343400"/>
-            <a:ext cx="5486400" cy="4114800"/>
-          </a:xfrm>
-          <a:prstGeom prst="rect">
-            <a:avLst/>
-          </a:prstGeom>
-        </p:spPr>
-        <p:txBody>
-          <a:bodyPr spcFirstLastPara="1" wrap="square" lIns="91425" tIns="91425" rIns="91425" bIns="91425" anchor="t" anchorCtr="0">
-            <a:noAutofit/>
-          </a:bodyPr>
-          <a:lstStyle/>
-          <a:p>
-            <a:pPr marL="0" lvl="0" indent="0" rtl="0">
-              <a:spcBef>
-                <a:spcPts val="0"/>
-              </a:spcBef>
-              <a:spcAft>
-                <a:spcPts val="0"/>
-              </a:spcAft>
-              <a:buNone/>
-            </a:pPr>
-            <a:endParaRPr dirty="0"/>
-          </a:p>
-        </p:txBody>
-      </p:sp>
-    </p:spTree>
-    <p:extLst>
-      <p:ext uri="{BB962C8B-B14F-4D97-AF65-F5344CB8AC3E}">
-        <p14:creationId xmlns:p14="http://schemas.microsoft.com/office/powerpoint/2010/main" val="2422285050"/>
-      </p:ext>
-    </p:extLst>
-  </p:cSld>
-  <p:clrMapOvr>
-    <a:masterClrMapping/>
-  </p:clrMapOvr>
-</p:notes>
-</file>
-
-<file path=ppt/notesSlides/notesSlide13.xml><?xml version="1.0" encoding="utf-8"?>
-<p:notes xmlns:a="http://schemas.openxmlformats.org/drawingml/2006/main" xmlns:r="http://schemas.openxmlformats.org/officeDocument/2006/relationships" xmlns:p="http://schemas.openxmlformats.org/presentationml/2006/main" showMasterSp="0" showMasterPhAnim="0">
-  <p:cSld>
-    <p:spTree>
-      <p:nvGrpSpPr>
-        <p:cNvPr id="1" name="Shape 95">
-          <a:extLst>
-            <a:ext uri="{FF2B5EF4-FFF2-40B4-BE49-F238E27FC236}">
               <a16:creationId xmlns:a16="http://schemas.microsoft.com/office/drawing/2014/main" id="{FA0F4EE9-5E1D-D653-EF03-682CDD54DE90}"/>
             </a:ext>
           </a:extLst>
@@ -1374,7 +1244,7 @@
 </p:notes>
 </file>
 
-<file path=ppt/notesSlides/notesSlide14.xml><?xml version="1.0" encoding="utf-8"?>
+<file path=ppt/notesSlides/notesSlide13.xml><?xml version="1.0" encoding="utf-8"?>
 <p:notes xmlns:a="http://schemas.openxmlformats.org/drawingml/2006/main" xmlns:r="http://schemas.openxmlformats.org/officeDocument/2006/relationships" xmlns:p="http://schemas.openxmlformats.org/presentationml/2006/main" showMasterSp="0" showMasterPhAnim="0">
   <p:cSld>
     <p:spTree>
@@ -1501,7 +1371,7 @@
 </p:notes>
 </file>
 
-<file path=ppt/notesSlides/notesSlide15.xml><?xml version="1.0" encoding="utf-8"?>
+<file path=ppt/notesSlides/notesSlide14.xml><?xml version="1.0" encoding="utf-8"?>
 <p:notes xmlns:a="http://schemas.openxmlformats.org/drawingml/2006/main" xmlns:r="http://schemas.openxmlformats.org/officeDocument/2006/relationships" xmlns:p="http://schemas.openxmlformats.org/presentationml/2006/main" showMasterSp="0" showMasterPhAnim="0">
   <p:cSld>
     <p:spTree>
@@ -1628,7 +1498,7 @@
 </p:notes>
 </file>
 
-<file path=ppt/notesSlides/notesSlide16.xml><?xml version="1.0" encoding="utf-8"?>
+<file path=ppt/notesSlides/notesSlide15.xml><?xml version="1.0" encoding="utf-8"?>
 <p:notes xmlns:a="http://schemas.openxmlformats.org/drawingml/2006/main" xmlns:r="http://schemas.openxmlformats.org/officeDocument/2006/relationships" xmlns:p="http://schemas.openxmlformats.org/presentationml/2006/main" showMasterSp="0" showMasterPhAnim="0">
   <p:cSld>
     <p:spTree>
@@ -1755,7 +1625,7 @@
 </p:notes>
 </file>
 
-<file path=ppt/notesSlides/notesSlide17.xml><?xml version="1.0" encoding="utf-8"?>
+<file path=ppt/notesSlides/notesSlide16.xml><?xml version="1.0" encoding="utf-8"?>
 <p:notes xmlns:a="http://schemas.openxmlformats.org/drawingml/2006/main" xmlns:r="http://schemas.openxmlformats.org/officeDocument/2006/relationships" xmlns:p="http://schemas.openxmlformats.org/presentationml/2006/main" showMasterSp="0" showMasterPhAnim="0">
   <p:cSld>
     <p:spTree>
@@ -9597,7 +9467,7 @@
               <a:t>: Gabriel </a:t>
             </a:r>
             <a:r>
-              <a:rPr lang="it-IT" sz="1800" err="1">
+              <a:rPr lang="it-IT" sz="1800" dirty="0" err="1">
                 <a:solidFill>
                   <a:srgbClr val="FFFFFF"/>
                 </a:solidFill>
@@ -9614,10 +9484,11 @@
                 <a:latin typeface="Segoe UI"/>
                 <a:ea typeface="Calibri"/>
               </a:rPr>
-              <a:t> (ID: 2103389)</a:t>
+              <a:t> </a:t>
             </a:r>
             <a:endParaRPr lang="it-IT" sz="1800">
               <a:latin typeface="Segoe UI"/>
+              <a:ea typeface="Calibri"/>
             </a:endParaRPr>
           </a:p>
           <a:p>
@@ -9662,6 +9533,10 @@
               </a:rPr>
               <a:t>Prof. Ombretta Gaggi</a:t>
             </a:r>
+            <a:endParaRPr lang="it-IT" sz="1800">
+              <a:latin typeface="Segoe UI"/>
+              <a:ea typeface="Calibri"/>
+            </a:endParaRPr>
           </a:p>
           <a:p>
             <a:pPr algn="ctr"/>
@@ -10946,802 +10821,6 @@
         <p:cNvPr id="1" name="Shape 98">
           <a:extLst>
             <a:ext uri="{FF2B5EF4-FFF2-40B4-BE49-F238E27FC236}">
-              <a16:creationId xmlns:a16="http://schemas.microsoft.com/office/drawing/2014/main" id="{307F043A-3C0F-1153-C2B5-AE3CA91477F4}"/>
-            </a:ext>
-          </a:extLst>
-        </p:cNvPr>
-        <p:cNvGrpSpPr/>
-        <p:nvPr/>
-      </p:nvGrpSpPr>
-      <p:grpSpPr>
-        <a:xfrm>
-          <a:off x="0" y="0"/>
-          <a:ext cx="0" cy="0"/>
-          <a:chOff x="0" y="0"/>
-          <a:chExt cx="0" cy="0"/>
-        </a:xfrm>
-      </p:grpSpPr>
-      <p:sp>
-        <p:nvSpPr>
-          <p:cNvPr id="99" name="Shape 99">
-            <a:extLst>
-              <a:ext uri="{FF2B5EF4-FFF2-40B4-BE49-F238E27FC236}">
-                <a16:creationId xmlns:a16="http://schemas.microsoft.com/office/drawing/2014/main" id="{9A8EC9BB-058E-724B-5A2A-BF5C0F7FDD52}"/>
-              </a:ext>
-            </a:extLst>
-          </p:cNvPr>
-          <p:cNvSpPr txBox="1">
-            <a:spLocks noGrp="1"/>
-          </p:cNvSpPr>
-          <p:nvPr>
-            <p:ph type="title" idx="4294967295"/>
-          </p:nvPr>
-        </p:nvSpPr>
-        <p:spPr>
-          <a:xfrm>
-            <a:off x="319489" y="-182567"/>
-            <a:ext cx="6382917" cy="1143300"/>
-          </a:xfrm>
-          <a:prstGeom prst="rect">
-            <a:avLst/>
-          </a:prstGeom>
-        </p:spPr>
-        <p:txBody>
-          <a:bodyPr spcFirstLastPara="1" wrap="square" lIns="82925" tIns="82925" rIns="82925" bIns="82925" anchor="ctr" anchorCtr="0">
-            <a:noAutofit/>
-          </a:bodyPr>
-          <a:lstStyle/>
-          <a:p>
-            <a:pPr indent="0">
-              <a:buNone/>
-            </a:pPr>
-            <a:r>
-              <a:rPr lang="it-IT" sz="3000" dirty="0">
-                <a:solidFill>
-                  <a:srgbClr val="FFFFFF"/>
-                </a:solidFill>
-                <a:latin typeface="Segoe UI"/>
-                <a:cs typeface="Segoe UI"/>
-              </a:rPr>
-              <a:t>Beyond WCAG: Extended </a:t>
-            </a:r>
-            <a:r>
-              <a:rPr lang="it-IT" sz="3000" dirty="0" err="1">
-                <a:solidFill>
-                  <a:srgbClr val="FFFFFF"/>
-                </a:solidFill>
-                <a:latin typeface="Segoe UI"/>
-                <a:cs typeface="Segoe UI"/>
-              </a:rPr>
-              <a:t>Principles</a:t>
-            </a:r>
-            <a:r>
-              <a:rPr lang="it-IT" sz="3000" dirty="0">
-                <a:solidFill>
-                  <a:srgbClr val="FFFFFF"/>
-                </a:solidFill>
-                <a:latin typeface="Segoe UI"/>
-                <a:cs typeface="Segoe UI"/>
-              </a:rPr>
-              <a:t> </a:t>
-            </a:r>
-          </a:p>
-        </p:txBody>
-      </p:sp>
-      <p:sp>
-        <p:nvSpPr>
-          <p:cNvPr id="101" name="Shape 101">
-            <a:extLst>
-              <a:ext uri="{FF2B5EF4-FFF2-40B4-BE49-F238E27FC236}">
-                <a16:creationId xmlns:a16="http://schemas.microsoft.com/office/drawing/2014/main" id="{BB44B753-9B65-75BE-237D-5FF5BA30D536}"/>
-              </a:ext>
-            </a:extLst>
-          </p:cNvPr>
-          <p:cNvSpPr/>
-          <p:nvPr/>
-        </p:nvSpPr>
-        <p:spPr>
-          <a:xfrm>
-            <a:off x="8302200" y="6479700"/>
-            <a:ext cx="384600" cy="378300"/>
-          </a:xfrm>
-          <a:prstGeom prst="rect">
-            <a:avLst/>
-          </a:prstGeom>
-          <a:solidFill>
-            <a:srgbClr val="9B0014"/>
-          </a:solidFill>
-          <a:ln>
-            <a:noFill/>
-          </a:ln>
-        </p:spPr>
-        <p:txBody>
-          <a:bodyPr spcFirstLastPara="1" wrap="square" lIns="91425" tIns="91425" rIns="91425" bIns="91425" anchor="ctr" anchorCtr="0">
-            <a:noAutofit/>
-          </a:bodyPr>
-          <a:lstStyle/>
-          <a:p>
-            <a:pPr marL="0" lvl="0" indent="0">
-              <a:spcBef>
-                <a:spcPts val="0"/>
-              </a:spcBef>
-              <a:spcAft>
-                <a:spcPts val="0"/>
-              </a:spcAft>
-              <a:buNone/>
-            </a:pPr>
-            <a:endParaRPr/>
-          </a:p>
-        </p:txBody>
-      </p:sp>
-      <p:sp>
-        <p:nvSpPr>
-          <p:cNvPr id="23" name="CasellaDiTesto 22">
-            <a:extLst>
-              <a:ext uri="{FF2B5EF4-FFF2-40B4-BE49-F238E27FC236}">
-                <a16:creationId xmlns:a16="http://schemas.microsoft.com/office/drawing/2014/main" id="{58ECFC73-CE5C-08DD-6868-26216BCA7C63}"/>
-              </a:ext>
-            </a:extLst>
-          </p:cNvPr>
-          <p:cNvSpPr txBox="1"/>
-          <p:nvPr/>
-        </p:nvSpPr>
-        <p:spPr>
-          <a:xfrm>
-            <a:off x="4781846" y="6482191"/>
-            <a:ext cx="3911435" cy="261610"/>
-          </a:xfrm>
-          <a:prstGeom prst="rect">
-            <a:avLst/>
-          </a:prstGeom>
-          <a:noFill/>
-        </p:spPr>
-        <p:txBody>
-          <a:bodyPr wrap="square" lIns="91440" tIns="45720" rIns="91440" bIns="45720" rtlCol="0" anchor="t">
-            <a:spAutoFit/>
-          </a:bodyPr>
-          <a:lstStyle/>
-          <a:p>
-            <a:pPr algn="r"/>
-            <a:r>
-              <a:rPr lang="it-IT" sz="1100" dirty="0">
-                <a:solidFill>
-                  <a:schemeClr val="bg1"/>
-                </a:solidFill>
-                <a:latin typeface="Segoe UI"/>
-              </a:rPr>
-              <a:t>G. </a:t>
-            </a:r>
-            <a:r>
-              <a:rPr lang="it-IT" sz="1100" err="1">
-                <a:solidFill>
-                  <a:schemeClr val="bg1"/>
-                </a:solidFill>
-                <a:latin typeface="Segoe UI"/>
-              </a:rPr>
-              <a:t>Rovesti</a:t>
-            </a:r>
-            <a:r>
-              <a:rPr lang="it-IT" sz="1100" dirty="0">
-                <a:solidFill>
-                  <a:schemeClr val="bg1"/>
-                </a:solidFill>
-                <a:latin typeface="Segoe UI"/>
-              </a:rPr>
-              <a:t> - </a:t>
-            </a:r>
-            <a:r>
-              <a:rPr lang="it-IT" sz="1100" err="1">
-                <a:solidFill>
-                  <a:schemeClr val="bg1"/>
-                </a:solidFill>
-                <a:latin typeface="Segoe UI"/>
-              </a:rPr>
-              <a:t>Designing</a:t>
-            </a:r>
-            <a:r>
-              <a:rPr lang="it-IT" sz="1100" dirty="0">
-                <a:solidFill>
-                  <a:schemeClr val="bg1"/>
-                </a:solidFill>
-                <a:latin typeface="Segoe UI"/>
-              </a:rPr>
-              <a:t> an </a:t>
-            </a:r>
-            <a:r>
-              <a:rPr lang="it-IT" sz="1100" err="1">
-                <a:solidFill>
-                  <a:schemeClr val="bg1"/>
-                </a:solidFill>
-                <a:latin typeface="Segoe UI"/>
-              </a:rPr>
-              <a:t>accessibility</a:t>
-            </a:r>
-            <a:r>
-              <a:rPr lang="it-IT" sz="1100" dirty="0">
-                <a:solidFill>
-                  <a:schemeClr val="bg1"/>
-                </a:solidFill>
-                <a:latin typeface="Segoe UI"/>
-              </a:rPr>
-              <a:t> learning toolkit</a:t>
-            </a:r>
-            <a:endParaRPr lang="it-IT" dirty="0">
-              <a:solidFill>
-                <a:schemeClr val="bg1"/>
-              </a:solidFill>
-              <a:latin typeface="Segoe UI"/>
-            </a:endParaRPr>
-          </a:p>
-        </p:txBody>
-      </p:sp>
-      <p:sp>
-        <p:nvSpPr>
-          <p:cNvPr id="10" name="CasellaDiTesto 9">
-            <a:extLst>
-              <a:ext uri="{FF2B5EF4-FFF2-40B4-BE49-F238E27FC236}">
-                <a16:creationId xmlns:a16="http://schemas.microsoft.com/office/drawing/2014/main" id="{ECBEB566-F1DC-7287-867B-254A5511EA03}"/>
-              </a:ext>
-            </a:extLst>
-          </p:cNvPr>
-          <p:cNvSpPr txBox="1"/>
-          <p:nvPr/>
-        </p:nvSpPr>
-        <p:spPr>
-          <a:xfrm>
-            <a:off x="315940" y="962003"/>
-            <a:ext cx="8515877" cy="4708981"/>
-          </a:xfrm>
-          <a:prstGeom prst="rect">
-            <a:avLst/>
-          </a:prstGeom>
-          <a:noFill/>
-        </p:spPr>
-        <p:txBody>
-          <a:bodyPr wrap="square" lIns="91440" tIns="45720" rIns="91440" bIns="45720" rtlCol="0" anchor="t">
-            <a:spAutoFit/>
-          </a:bodyPr>
-          <a:lstStyle/>
-          <a:p>
-            <a:pPr algn="just"/>
-            <a:r>
-              <a:rPr lang="it-IT" sz="2000" b="1" dirty="0" err="1">
-                <a:latin typeface="Segoe UI"/>
-              </a:rPr>
-              <a:t>Extending</a:t>
-            </a:r>
-            <a:r>
-              <a:rPr lang="it-IT" sz="2000" b="1" dirty="0">
-                <a:latin typeface="Segoe UI"/>
-              </a:rPr>
-              <a:t> WCAG </a:t>
-            </a:r>
-            <a:r>
-              <a:rPr lang="it-IT" sz="2000" b="1" dirty="0" err="1">
-                <a:latin typeface="Segoe UI"/>
-              </a:rPr>
-              <a:t>Principles</a:t>
-            </a:r>
-            <a:r>
-              <a:rPr lang="it-IT" sz="2000" b="1" dirty="0">
-                <a:latin typeface="Segoe UI"/>
-              </a:rPr>
-              <a:t>:</a:t>
-            </a:r>
-            <a:r>
-              <a:rPr lang="it-IT" sz="2000" dirty="0">
-                <a:latin typeface="Segoe UI"/>
-              </a:rPr>
-              <a:t> </a:t>
-            </a:r>
-            <a:endParaRPr lang="it-IT">
-              <a:latin typeface="Segoe UI"/>
-            </a:endParaRPr>
-          </a:p>
-          <a:p>
-            <a:pPr algn="just"/>
-            <a:endParaRPr lang="it-IT" sz="2000" dirty="0">
-              <a:latin typeface="Segoe UI"/>
-            </a:endParaRPr>
-          </a:p>
-          <a:p>
-            <a:pPr algn="just"/>
-            <a:r>
-              <a:rPr lang="it-IT" sz="2000" dirty="0">
-                <a:latin typeface="Segoe UI"/>
-              </a:rPr>
-              <a:t>🔄 </a:t>
-            </a:r>
-            <a:r>
-              <a:rPr lang="it-IT" sz="2000" b="1" dirty="0">
-                <a:latin typeface="Segoe UI"/>
-              </a:rPr>
-              <a:t>Multi-</a:t>
-            </a:r>
-            <a:r>
-              <a:rPr lang="it-IT" sz="2000" b="1" dirty="0" err="1">
-                <a:latin typeface="Segoe UI"/>
-              </a:rPr>
-              <a:t>dimensional</a:t>
-            </a:r>
-            <a:r>
-              <a:rPr lang="it-IT" sz="2000" b="1" dirty="0">
-                <a:latin typeface="Segoe UI"/>
-              </a:rPr>
-              <a:t> Evaluation:</a:t>
-            </a:r>
-            <a:r>
-              <a:rPr lang="it-IT" sz="2000" dirty="0">
-                <a:latin typeface="Segoe UI"/>
-              </a:rPr>
-              <a:t> Beyond compliance - </a:t>
-            </a:r>
-            <a:r>
-              <a:rPr lang="it-IT" sz="2000" dirty="0" err="1">
-                <a:latin typeface="Segoe UI"/>
-              </a:rPr>
-              <a:t>includes</a:t>
-            </a:r>
-            <a:r>
-              <a:rPr lang="it-IT" sz="2000" dirty="0">
-                <a:latin typeface="Segoe UI"/>
-              </a:rPr>
-              <a:t> </a:t>
-            </a:r>
-            <a:r>
-              <a:rPr lang="it-IT" sz="2000" dirty="0" err="1">
-                <a:latin typeface="Segoe UI"/>
-              </a:rPr>
-              <a:t>empirical</a:t>
-            </a:r>
-            <a:r>
-              <a:rPr lang="it-IT" sz="2000" dirty="0">
-                <a:latin typeface="Segoe UI"/>
-              </a:rPr>
-              <a:t> testing + </a:t>
-            </a:r>
-            <a:r>
-              <a:rPr lang="it-IT" sz="2000" dirty="0" err="1">
-                <a:latin typeface="Segoe UI"/>
-              </a:rPr>
-              <a:t>real</a:t>
-            </a:r>
-            <a:r>
-              <a:rPr lang="it-IT" sz="2000" dirty="0">
-                <a:latin typeface="Segoe UI"/>
-              </a:rPr>
-              <a:t>-world </a:t>
-            </a:r>
-            <a:r>
-              <a:rPr lang="it-IT" sz="2000" dirty="0" err="1">
-                <a:latin typeface="Segoe UI"/>
-              </a:rPr>
-              <a:t>usability</a:t>
-            </a:r>
-            <a:r>
-              <a:rPr lang="it-IT" sz="2000" dirty="0">
-                <a:latin typeface="Segoe UI"/>
-              </a:rPr>
-              <a:t> </a:t>
-            </a:r>
-            <a:endParaRPr lang="it-IT">
-              <a:latin typeface="Segoe UI"/>
-            </a:endParaRPr>
-          </a:p>
-          <a:p>
-            <a:pPr algn="just"/>
-            <a:r>
-              <a:rPr lang="it-IT" sz="2000" dirty="0">
-                <a:latin typeface="Segoe UI"/>
-              </a:rPr>
-              <a:t>🔍 </a:t>
-            </a:r>
-            <a:r>
-              <a:rPr lang="it-IT" sz="2000" b="1" err="1">
-                <a:latin typeface="Segoe UI"/>
-              </a:rPr>
-              <a:t>Methodology</a:t>
-            </a:r>
-            <a:r>
-              <a:rPr lang="it-IT" sz="2000" b="1" dirty="0">
-                <a:latin typeface="Segoe UI"/>
-              </a:rPr>
-              <a:t> </a:t>
-            </a:r>
-            <a:r>
-              <a:rPr lang="it-IT" sz="2000" b="1" err="1">
-                <a:latin typeface="Segoe UI"/>
-              </a:rPr>
-              <a:t>Transparency</a:t>
-            </a:r>
-            <a:r>
-              <a:rPr lang="it-IT" sz="2000" b="1" dirty="0">
-                <a:latin typeface="Segoe UI"/>
-              </a:rPr>
-              <a:t>:</a:t>
-            </a:r>
-            <a:r>
-              <a:rPr lang="it-IT" sz="2000" dirty="0">
-                <a:latin typeface="Segoe UI"/>
-              </a:rPr>
-              <a:t> Clear </a:t>
-            </a:r>
-            <a:r>
-              <a:rPr lang="it-IT" sz="2000" err="1">
-                <a:latin typeface="Segoe UI"/>
-              </a:rPr>
-              <a:t>evaluation</a:t>
-            </a:r>
-            <a:r>
-              <a:rPr lang="it-IT" sz="2000" dirty="0">
-                <a:latin typeface="Segoe UI"/>
-              </a:rPr>
-              <a:t> </a:t>
-            </a:r>
-            <a:r>
-              <a:rPr lang="it-IT" sz="2000" err="1">
-                <a:latin typeface="Segoe UI"/>
-              </a:rPr>
-              <a:t>documentation</a:t>
-            </a:r>
-            <a:r>
-              <a:rPr lang="it-IT" sz="2000" dirty="0">
-                <a:latin typeface="Segoe UI"/>
-              </a:rPr>
-              <a:t>, test </a:t>
-            </a:r>
-            <a:r>
-              <a:rPr lang="it-IT" sz="2000" err="1">
-                <a:latin typeface="Segoe UI"/>
-              </a:rPr>
-              <a:t>procedures</a:t>
-            </a:r>
-            <a:r>
-              <a:rPr lang="it-IT" sz="2000" dirty="0">
-                <a:latin typeface="Segoe UI"/>
-              </a:rPr>
-              <a:t>, accountability </a:t>
-            </a:r>
-            <a:endParaRPr lang="it-IT">
-              <a:latin typeface="Segoe UI"/>
-            </a:endParaRPr>
-          </a:p>
-          <a:p>
-            <a:pPr algn="just"/>
-            <a:r>
-              <a:rPr lang="it-IT" sz="2000" dirty="0">
-                <a:latin typeface="Segoe UI"/>
-              </a:rPr>
-              <a:t>📚 </a:t>
-            </a:r>
-            <a:r>
-              <a:rPr lang="it-IT" sz="2000" b="1" dirty="0" err="1">
-                <a:latin typeface="Segoe UI"/>
-              </a:rPr>
-              <a:t>Academic</a:t>
-            </a:r>
-            <a:r>
-              <a:rPr lang="it-IT" sz="2000" b="1" dirty="0">
-                <a:latin typeface="Segoe UI"/>
-              </a:rPr>
-              <a:t> Grounding:</a:t>
-            </a:r>
-            <a:r>
-              <a:rPr lang="it-IT" sz="2000" dirty="0">
-                <a:latin typeface="Segoe UI"/>
-              </a:rPr>
-              <a:t> Peer-</a:t>
-            </a:r>
-            <a:r>
-              <a:rPr lang="it-IT" sz="2000" dirty="0" err="1">
-                <a:latin typeface="Segoe UI"/>
-              </a:rPr>
-              <a:t>reviewed</a:t>
-            </a:r>
-            <a:r>
-              <a:rPr lang="it-IT" sz="2000" dirty="0">
-                <a:latin typeface="Segoe UI"/>
-              </a:rPr>
-              <a:t> </a:t>
-            </a:r>
-            <a:r>
-              <a:rPr lang="it-IT" sz="2000" dirty="0" err="1">
-                <a:latin typeface="Segoe UI"/>
-              </a:rPr>
-              <a:t>research</a:t>
-            </a:r>
-            <a:r>
-              <a:rPr lang="it-IT" sz="2000" dirty="0">
-                <a:latin typeface="Segoe UI"/>
-              </a:rPr>
-              <a:t> </a:t>
-            </a:r>
-            <a:r>
-              <a:rPr lang="it-IT" sz="2000" dirty="0" err="1">
-                <a:latin typeface="Segoe UI"/>
-              </a:rPr>
-              <a:t>integration</a:t>
-            </a:r>
-            <a:r>
-              <a:rPr lang="it-IT" sz="2000" dirty="0">
-                <a:latin typeface="Segoe UI"/>
-              </a:rPr>
-              <a:t>, </a:t>
-            </a:r>
-            <a:r>
-              <a:rPr lang="it-IT" sz="2000" dirty="0" err="1">
-                <a:latin typeface="Segoe UI"/>
-              </a:rPr>
-              <a:t>formal</a:t>
-            </a:r>
-            <a:r>
-              <a:rPr lang="it-IT" sz="2000" dirty="0">
-                <a:latin typeface="Segoe UI"/>
-              </a:rPr>
-              <a:t> standards connection</a:t>
-            </a:r>
-            <a:endParaRPr lang="it-IT">
-              <a:latin typeface="Segoe UI"/>
-            </a:endParaRPr>
-          </a:p>
-          <a:p>
-            <a:pPr algn="just"/>
-            <a:r>
-              <a:rPr lang="it-IT" sz="2000" dirty="0">
-                <a:latin typeface="Segoe UI"/>
-              </a:rPr>
-              <a:t> 📊 </a:t>
-            </a:r>
-            <a:r>
-              <a:rPr lang="it-IT" sz="2000" b="1" dirty="0">
-                <a:latin typeface="Segoe UI"/>
-              </a:rPr>
-              <a:t>Progressive Disclosure:</a:t>
-            </a:r>
-            <a:r>
-              <a:rPr lang="it-IT" sz="2000" dirty="0">
-                <a:latin typeface="Segoe UI"/>
-              </a:rPr>
-              <a:t> </a:t>
-            </a:r>
-            <a:r>
-              <a:rPr lang="it-IT" sz="2000" err="1">
-                <a:latin typeface="Segoe UI"/>
-              </a:rPr>
-              <a:t>Layered</a:t>
-            </a:r>
-            <a:r>
-              <a:rPr lang="it-IT" sz="2000" dirty="0">
-                <a:latin typeface="Segoe UI"/>
-              </a:rPr>
-              <a:t> </a:t>
-            </a:r>
-            <a:r>
-              <a:rPr lang="it-IT" sz="2000" err="1">
-                <a:latin typeface="Segoe UI"/>
-              </a:rPr>
-              <a:t>complexity</a:t>
-            </a:r>
-            <a:r>
-              <a:rPr lang="it-IT" sz="2000" dirty="0">
-                <a:latin typeface="Segoe UI"/>
-              </a:rPr>
-              <a:t> for </a:t>
-            </a:r>
-            <a:r>
-              <a:rPr lang="it-IT" sz="2000" err="1">
-                <a:latin typeface="Segoe UI"/>
-              </a:rPr>
-              <a:t>different</a:t>
-            </a:r>
-            <a:r>
-              <a:rPr lang="it-IT" sz="2000" dirty="0">
-                <a:latin typeface="Segoe UI"/>
-              </a:rPr>
-              <a:t> developer skill </a:t>
-            </a:r>
-            <a:r>
-              <a:rPr lang="it-IT" sz="2000" err="1">
-                <a:latin typeface="Segoe UI"/>
-              </a:rPr>
-              <a:t>levels</a:t>
-            </a:r>
-            <a:r>
-              <a:rPr lang="it-IT" sz="2000" dirty="0">
-                <a:latin typeface="Segoe UI"/>
-              </a:rPr>
-              <a:t> </a:t>
-            </a:r>
-            <a:endParaRPr lang="it-IT">
-              <a:latin typeface="Segoe UI"/>
-            </a:endParaRPr>
-          </a:p>
-          <a:p>
-            <a:pPr algn="just"/>
-            <a:r>
-              <a:rPr lang="it-IT" sz="2000" dirty="0">
-                <a:latin typeface="Segoe UI"/>
-              </a:rPr>
-              <a:t>👥 </a:t>
-            </a:r>
-            <a:r>
-              <a:rPr lang="it-IT" sz="2000" b="1" dirty="0">
-                <a:latin typeface="Segoe UI"/>
-              </a:rPr>
-              <a:t>Social Learning Integration:</a:t>
-            </a:r>
-            <a:r>
-              <a:rPr lang="it-IT" sz="2000" dirty="0">
-                <a:latin typeface="Segoe UI"/>
-              </a:rPr>
-              <a:t> Community-</a:t>
-            </a:r>
-            <a:r>
-              <a:rPr lang="it-IT" sz="2000" dirty="0" err="1">
-                <a:latin typeface="Segoe UI"/>
-              </a:rPr>
-              <a:t>driven</a:t>
-            </a:r>
-            <a:r>
-              <a:rPr lang="it-IT" sz="2000" dirty="0">
-                <a:latin typeface="Segoe UI"/>
-              </a:rPr>
-              <a:t> knowledge sharing</a:t>
-            </a:r>
-          </a:p>
-          <a:p>
-            <a:pPr algn="just"/>
-            <a:endParaRPr lang="it-IT" sz="2000" b="1" dirty="0">
-              <a:latin typeface="Segoe UI"/>
-            </a:endParaRPr>
-          </a:p>
-          <a:p>
-            <a:pPr algn="just"/>
-            <a:r>
-              <a:rPr lang="it-IT" sz="2000" b="1" err="1">
-                <a:latin typeface="Segoe UI"/>
-              </a:rPr>
-              <a:t>Result</a:t>
-            </a:r>
-            <a:r>
-              <a:rPr lang="it-IT" sz="2000" b="1" dirty="0">
-                <a:latin typeface="Segoe UI"/>
-              </a:rPr>
-              <a:t>:</a:t>
-            </a:r>
-            <a:r>
-              <a:rPr lang="it-IT" sz="2000" dirty="0">
-                <a:latin typeface="Segoe UI"/>
-              </a:rPr>
-              <a:t> First </a:t>
-            </a:r>
-            <a:r>
-              <a:rPr lang="it-IT" sz="2000" err="1">
-                <a:latin typeface="Segoe UI"/>
-              </a:rPr>
-              <a:t>comprehensive</a:t>
-            </a:r>
-            <a:r>
-              <a:rPr lang="it-IT" sz="2000" dirty="0">
-                <a:latin typeface="Segoe UI"/>
-              </a:rPr>
-              <a:t> developer </a:t>
-            </a:r>
-            <a:r>
-              <a:rPr lang="it-IT" sz="2000" err="1">
-                <a:latin typeface="Segoe UI"/>
-              </a:rPr>
-              <a:t>resource</a:t>
-            </a:r>
-            <a:r>
-              <a:rPr lang="it-IT" sz="2000" dirty="0">
-                <a:latin typeface="Segoe UI"/>
-              </a:rPr>
-              <a:t> </a:t>
-            </a:r>
-            <a:r>
-              <a:rPr lang="it-IT" sz="2000" err="1">
-                <a:latin typeface="Segoe UI"/>
-              </a:rPr>
-              <a:t>bridging</a:t>
-            </a:r>
-            <a:r>
-              <a:rPr lang="it-IT" sz="2000" dirty="0">
-                <a:latin typeface="Segoe UI"/>
-              </a:rPr>
-              <a:t> </a:t>
-            </a:r>
-            <a:r>
-              <a:rPr lang="it-IT" sz="2000" err="1">
-                <a:latin typeface="Segoe UI"/>
-              </a:rPr>
-              <a:t>accessibility</a:t>
-            </a:r>
-            <a:r>
-              <a:rPr lang="it-IT" sz="2000" dirty="0">
-                <a:latin typeface="Segoe UI"/>
-              </a:rPr>
-              <a:t> theory with mobile practice</a:t>
-            </a:r>
-            <a:endParaRPr lang="it-IT" dirty="0">
-              <a:latin typeface="Segoe UI"/>
-            </a:endParaRPr>
-          </a:p>
-          <a:p>
-            <a:pPr algn="just"/>
-            <a:endParaRPr lang="it-IT" sz="2000" b="1" dirty="0">
-              <a:latin typeface="Segoe UI"/>
-            </a:endParaRPr>
-          </a:p>
-        </p:txBody>
-      </p:sp>
-      <p:sp>
-        <p:nvSpPr>
-          <p:cNvPr id="3" name="CasellaDiTesto 2">
-            <a:extLst>
-              <a:ext uri="{FF2B5EF4-FFF2-40B4-BE49-F238E27FC236}">
-                <a16:creationId xmlns:a16="http://schemas.microsoft.com/office/drawing/2014/main" id="{EC67B8E0-6741-1BDA-961D-2F34F3607431}"/>
-              </a:ext>
-            </a:extLst>
-          </p:cNvPr>
-          <p:cNvSpPr txBox="1"/>
-          <p:nvPr/>
-        </p:nvSpPr>
-        <p:spPr>
-          <a:xfrm>
-            <a:off x="8518560" y="6482191"/>
-            <a:ext cx="629247" cy="261610"/>
-          </a:xfrm>
-          <a:prstGeom prst="rect">
-            <a:avLst/>
-          </a:prstGeom>
-          <a:noFill/>
-        </p:spPr>
-        <p:txBody>
-          <a:bodyPr wrap="square" lIns="91440" tIns="45720" rIns="91440" bIns="45720" rtlCol="0" anchor="t">
-            <a:spAutoFit/>
-          </a:bodyPr>
-          <a:lstStyle/>
-          <a:p>
-            <a:pPr algn="r"/>
-            <a:r>
-              <a:rPr lang="it-IT" sz="1100" dirty="0">
-                <a:solidFill>
-                  <a:schemeClr val="bg1"/>
-                </a:solidFill>
-                <a:latin typeface="Segoe UI"/>
-              </a:rPr>
-              <a:t>12/17</a:t>
-            </a:r>
-            <a:endParaRPr lang="it-IT" dirty="0">
-              <a:solidFill>
-                <a:schemeClr val="bg1"/>
-              </a:solidFill>
-            </a:endParaRPr>
-          </a:p>
-        </p:txBody>
-      </p:sp>
-    </p:spTree>
-    <p:extLst>
-      <p:ext uri="{BB962C8B-B14F-4D97-AF65-F5344CB8AC3E}">
-        <p14:creationId xmlns:p14="http://schemas.microsoft.com/office/powerpoint/2010/main" val="1646661074"/>
-      </p:ext>
-    </p:extLst>
-  </p:cSld>
-  <p:clrMapOvr>
-    <a:masterClrMapping/>
-  </p:clrMapOvr>
-</p:sld>
-</file>
-
-<file path=ppt/slides/slide13.xml><?xml version="1.0" encoding="utf-8"?>
-<p:sld xmlns:a="http://schemas.openxmlformats.org/drawingml/2006/main" xmlns:r="http://schemas.openxmlformats.org/officeDocument/2006/relationships" xmlns:p="http://schemas.openxmlformats.org/presentationml/2006/main">
-  <p:cSld>
-    <p:spTree>
-      <p:nvGrpSpPr>
-        <p:cNvPr id="1" name="Shape 98">
-          <a:extLst>
-            <a:ext uri="{FF2B5EF4-FFF2-40B4-BE49-F238E27FC236}">
               <a16:creationId xmlns:a16="http://schemas.microsoft.com/office/drawing/2014/main" id="{74E76E6A-D927-07A3-9A30-6B26D1E5F4B3}"/>
             </a:ext>
           </a:extLst>
@@ -12052,8 +11131,8 @@
         </p:nvSpPr>
         <p:spPr>
           <a:xfrm>
-            <a:off x="322244" y="997027"/>
-            <a:ext cx="8169006" cy="707886"/>
+            <a:off x="322244" y="969485"/>
+            <a:ext cx="8361801" cy="5847755"/>
           </a:xfrm>
           <a:prstGeom prst="rect">
             <a:avLst/>
@@ -12079,17 +11158,240 @@
               <a:rPr lang="en-US" sz="2000" dirty="0">
                 <a:latin typeface="Segoe UI"/>
               </a:rPr>
-              <a:t> First structured methodology for quantifying mobile accessibility implementation across frameworks</a:t>
-            </a:r>
+              <a:t> Evidence-based methodology for quantifying mobile accessibility implementation across frameworks</a:t>
+            </a:r>
+          </a:p>
+          <a:p>
+            <a:endParaRPr lang="en-US" sz="2000" dirty="0">
+              <a:latin typeface="Segoe UI"/>
+            </a:endParaRPr>
+          </a:p>
+          <a:p>
+            <a:r>
+              <a:rPr lang="en-US" sz="2000" dirty="0">
+                <a:latin typeface="Segoe UI"/>
+              </a:rPr>
+              <a:t>🔢</a:t>
+            </a:r>
+            <a:r>
+              <a:rPr lang="en-US" sz="2000" b="1" dirty="0">
+                <a:latin typeface="Segoe UI"/>
+              </a:rPr>
+              <a:t> Implementation Overhead (IMO)</a:t>
+            </a:r>
+            <a:endParaRPr lang="en-US" sz="2000" dirty="0">
+              <a:latin typeface="Segoe UI"/>
+            </a:endParaRPr>
+          </a:p>
+          <a:p>
+            <a:r>
+              <a:rPr lang="en-US" sz="2000" dirty="0">
+                <a:latin typeface="Segoe UI"/>
+              </a:rPr>
+              <a:t>Direct code cost measurement for equivalent functionality</a:t>
+            </a:r>
+            <a:endParaRPr lang="en-US">
+              <a:latin typeface="Segoe UI"/>
+            </a:endParaRPr>
+          </a:p>
+          <a:p>
+            <a:endParaRPr lang="en-US" sz="2000" dirty="0">
+              <a:latin typeface="Segoe UI"/>
+            </a:endParaRPr>
+          </a:p>
+          <a:p>
+            <a:r>
+              <a:rPr lang="en-US" sz="2000" dirty="0">
+                <a:latin typeface="Segoe UI"/>
+              </a:rPr>
+              <a:t>📱 </a:t>
+            </a:r>
+            <a:r>
+              <a:rPr lang="en-US" sz="2000" b="1" dirty="0">
+                <a:latin typeface="Segoe UI"/>
+              </a:rPr>
+              <a:t>Screen Reader Support Score (SRSS)</a:t>
+            </a:r>
+            <a:r>
+              <a:rPr lang="en-US" sz="2000" dirty="0">
+                <a:latin typeface="Segoe UI"/>
+              </a:rPr>
+              <a:t>: </a:t>
+            </a:r>
+            <a:endParaRPr lang="en-US" dirty="0">
+              <a:latin typeface="Segoe UI"/>
+            </a:endParaRPr>
+          </a:p>
+          <a:p>
+            <a:r>
+              <a:rPr lang="en-US" sz="2000" dirty="0">
+                <a:latin typeface="Segoe UI"/>
+              </a:rPr>
+              <a:t>Likert scale based on </a:t>
+            </a:r>
+            <a:r>
+              <a:rPr lang="en-US" sz="2000" err="1">
+                <a:latin typeface="Segoe UI"/>
+              </a:rPr>
+              <a:t>VoiceOver</a:t>
+            </a:r>
+            <a:r>
+              <a:rPr lang="en-US" sz="2000" dirty="0">
+                <a:latin typeface="Segoe UI"/>
+              </a:rPr>
+              <a:t>/</a:t>
+            </a:r>
+            <a:r>
+              <a:rPr lang="en-US" sz="2000" err="1">
+                <a:latin typeface="Segoe UI"/>
+              </a:rPr>
+              <a:t>TalkBack</a:t>
+            </a:r>
+            <a:r>
+              <a:rPr lang="en-US" sz="2000" dirty="0">
+                <a:latin typeface="Segoe UI"/>
+              </a:rPr>
+              <a:t> functionality</a:t>
+            </a:r>
+            <a:endParaRPr lang="en-US" dirty="0">
+              <a:latin typeface="Segoe UI"/>
+            </a:endParaRPr>
+          </a:p>
+          <a:p>
+            <a:endParaRPr lang="en-US" sz="2000" dirty="0">
+              <a:latin typeface="Segoe UI"/>
+            </a:endParaRPr>
+          </a:p>
+          <a:p>
+            <a:r>
+              <a:rPr lang="en-US" sz="2000" dirty="0">
+                <a:latin typeface="Segoe UI"/>
+              </a:rPr>
+              <a:t>✅ </a:t>
+            </a:r>
+            <a:r>
+              <a:rPr lang="en-US" sz="2000" b="1" dirty="0">
+                <a:latin typeface="Segoe UI"/>
+              </a:rPr>
+              <a:t>WCAG Compliance Ratio (WCR)</a:t>
+            </a:r>
+            <a:r>
+              <a:rPr lang="en-US" sz="2000" dirty="0">
+                <a:latin typeface="Segoe UI"/>
+              </a:rPr>
+              <a:t>: </a:t>
+            </a:r>
+            <a:endParaRPr lang="en-US" dirty="0">
+              <a:latin typeface="Segoe UI"/>
+            </a:endParaRPr>
+          </a:p>
+          <a:p>
+            <a:r>
+              <a:rPr lang="en-US" sz="2000" dirty="0">
+                <a:latin typeface="Segoe UI"/>
+              </a:rPr>
+              <a:t>Standards adherence tracking (A/AA/AAA levels)</a:t>
+            </a:r>
+            <a:endParaRPr lang="en-US">
+              <a:latin typeface="Segoe UI"/>
+            </a:endParaRPr>
+          </a:p>
+          <a:p>
+            <a:endParaRPr lang="en-US" sz="2000" dirty="0">
+              <a:latin typeface="Segoe UI"/>
+            </a:endParaRPr>
+          </a:p>
+          <a:p>
+            <a:r>
+              <a:rPr lang="en-US" sz="2000" dirty="0">
+                <a:latin typeface="Segoe UI"/>
+              </a:rPr>
+              <a:t>⚙️ </a:t>
+            </a:r>
+            <a:r>
+              <a:rPr lang="en-US" sz="2000" b="1" dirty="0">
+                <a:latin typeface="Segoe UI"/>
+              </a:rPr>
+              <a:t>Complexity Impact Factor (CIF)</a:t>
+            </a:r>
+            <a:r>
+              <a:rPr lang="en-US" sz="2000" dirty="0">
+                <a:latin typeface="Segoe UI"/>
+              </a:rPr>
+              <a:t>: </a:t>
+            </a:r>
+            <a:endParaRPr lang="en-US" dirty="0">
+              <a:latin typeface="Segoe UI"/>
+            </a:endParaRPr>
+          </a:p>
+          <a:p>
+            <a:r>
+              <a:rPr lang="en-US" sz="2000" dirty="0">
+                <a:latin typeface="Segoe UI"/>
+              </a:rPr>
+              <a:t>Development difficulty classification (Low/Medium/High)</a:t>
+            </a:r>
+            <a:endParaRPr lang="en-US">
+              <a:latin typeface="Segoe UI"/>
+            </a:endParaRPr>
+          </a:p>
+          <a:p>
+            <a:endParaRPr lang="en-US" sz="2000" dirty="0">
+              <a:latin typeface="Segoe UI"/>
+            </a:endParaRPr>
+          </a:p>
+          <a:p>
+            <a:r>
+              <a:rPr lang="en-US" sz="2000" dirty="0">
+                <a:latin typeface="Segoe UI"/>
+              </a:rPr>
+              <a:t>⏱️</a:t>
+            </a:r>
+            <a:r>
+              <a:rPr lang="en-US" sz="2000" b="1" dirty="0">
+                <a:latin typeface="Segoe UI"/>
+              </a:rPr>
+              <a:t> Development Time Estimate (DTE)</a:t>
+            </a:r>
+            <a:r>
+              <a:rPr lang="en-US" sz="2000" dirty="0">
+                <a:latin typeface="Segoe UI"/>
+              </a:rPr>
+              <a:t>: </a:t>
+            </a:r>
+            <a:endParaRPr lang="en-US" dirty="0">
+              <a:latin typeface="Segoe UI"/>
+            </a:endParaRPr>
+          </a:p>
+          <a:p>
+            <a:r>
+              <a:rPr lang="en-US" sz="2000" dirty="0">
+                <a:latin typeface="Segoe UI"/>
+              </a:rPr>
+              <a:t>Resource planning with complexity adjustments</a:t>
+            </a:r>
+            <a:endParaRPr lang="en-US">
+              <a:latin typeface="Segoe UI"/>
+            </a:endParaRPr>
+          </a:p>
+          <a:p>
+            <a:endParaRPr lang="en-US" dirty="0">
+              <a:latin typeface="Segoe UI"/>
+            </a:endParaRPr>
+          </a:p>
+          <a:p>
+            <a:endParaRPr lang="en-US" sz="2000" dirty="0">
+              <a:latin typeface="Segoe UI"/>
+            </a:endParaRPr>
           </a:p>
         </p:txBody>
       </p:sp>
       <p:pic>
         <p:nvPicPr>
-          <p:cNvPr id="8" name="Immagine 7" descr="Immagine che contiene testo, schermata, Carattere, numero&#10;&#10;Il contenuto generato dall&amp;#39;IA potrebbe non essere corretto.">
+          <p:cNvPr id="7" name="Immagine 6" descr="Lens - Free interface icons">
             <a:extLst>
               <a:ext uri="{FF2B5EF4-FFF2-40B4-BE49-F238E27FC236}">
-                <a16:creationId xmlns:a16="http://schemas.microsoft.com/office/drawing/2014/main" id="{240A9F30-5467-9785-0620-359114DA45F2}"/>
+                <a16:creationId xmlns:a16="http://schemas.microsoft.com/office/drawing/2014/main" id="{F166B7BE-7A42-D51C-FBED-9D4F2EB8478A}"/>
               </a:ext>
             </a:extLst>
           </p:cNvPr>
@@ -12106,8 +11408,8 @@
         </p:blipFill>
         <p:spPr>
           <a:xfrm>
-            <a:off x="950204" y="1929393"/>
-            <a:ext cx="7353760" cy="3742853"/>
+            <a:off x="8017353" y="3431582"/>
+            <a:ext cx="669619" cy="710933"/>
           </a:xfrm>
           <a:prstGeom prst="rect">
             <a:avLst/>
@@ -12127,7 +11429,7 @@
 </p:sld>
 </file>
 
-<file path=ppt/slides/slide14.xml><?xml version="1.0" encoding="utf-8"?>
+<file path=ppt/slides/slide13.xml><?xml version="1.0" encoding="utf-8"?>
 <p:sld xmlns:a="http://schemas.openxmlformats.org/drawingml/2006/main" xmlns:r="http://schemas.openxmlformats.org/officeDocument/2006/relationships" xmlns:p="http://schemas.openxmlformats.org/presentationml/2006/main">
   <p:cSld>
     <p:spTree>
@@ -12369,7 +11671,7 @@
         <p:spPr>
           <a:xfrm>
             <a:off x="315940" y="962003"/>
-            <a:ext cx="8515877" cy="4708981"/>
+            <a:ext cx="8515877" cy="1938992"/>
           </a:xfrm>
           <a:prstGeom prst="rect">
             <a:avLst/>
@@ -12537,297 +11839,6 @@
               <a:buChar char="•"/>
             </a:pPr>
             <a:endParaRPr lang="it-IT" sz="2000" dirty="0"/>
-          </a:p>
-          <a:p>
-            <a:pPr algn="just"/>
-            <a:r>
-              <a:rPr lang="it-IT" sz="2000" b="1" dirty="0" err="1">
-                <a:latin typeface="Segoe UI"/>
-              </a:rPr>
-              <a:t>Implementation</a:t>
-            </a:r>
-            <a:r>
-              <a:rPr lang="it-IT" sz="2000" b="1" dirty="0">
-                <a:latin typeface="Segoe UI"/>
-              </a:rPr>
-              <a:t> </a:t>
-            </a:r>
-            <a:r>
-              <a:rPr lang="it-IT" sz="2000" b="1" dirty="0" err="1">
-                <a:latin typeface="Segoe UI"/>
-              </a:rPr>
-              <a:t>findings</a:t>
-            </a:r>
-            <a:r>
-              <a:rPr lang="it-IT" sz="2000" b="1" dirty="0">
-                <a:latin typeface="Segoe UI"/>
-              </a:rPr>
-              <a:t>:</a:t>
-            </a:r>
-            <a:endParaRPr lang="it-IT">
-              <a:latin typeface="Segoe UI"/>
-            </a:endParaRPr>
-          </a:p>
-          <a:p>
-            <a:pPr marL="285750" indent="-285750" algn="just">
-              <a:buFont typeface="Arial"/>
-              <a:buChar char="•"/>
-            </a:pPr>
-            <a:r>
-              <a:rPr lang="it-IT" sz="2000" b="1" dirty="0">
-                <a:latin typeface="Segoe UI"/>
-              </a:rPr>
-              <a:t>React Native:</a:t>
-            </a:r>
-            <a:r>
-              <a:rPr lang="it-IT" sz="2000" dirty="0">
-                <a:latin typeface="Segoe UI"/>
-              </a:rPr>
-              <a:t> </a:t>
-            </a:r>
-            <a:r>
-              <a:rPr lang="it-IT" sz="2000" err="1">
-                <a:latin typeface="Segoe UI"/>
-              </a:rPr>
-              <a:t>Higher</a:t>
-            </a:r>
-            <a:r>
-              <a:rPr lang="it-IT" sz="2000" dirty="0">
-                <a:latin typeface="Segoe UI"/>
-              </a:rPr>
-              <a:t> </a:t>
-            </a:r>
-            <a:r>
-              <a:rPr lang="it-IT" sz="2000" err="1">
-                <a:latin typeface="Segoe UI"/>
-              </a:rPr>
-              <a:t>implementation</a:t>
-            </a:r>
-            <a:r>
-              <a:rPr lang="it-IT" sz="2000" dirty="0">
-                <a:latin typeface="Segoe UI"/>
-              </a:rPr>
-              <a:t> overhead, </a:t>
-            </a:r>
-            <a:r>
-              <a:rPr lang="it-IT" sz="2000" err="1">
-                <a:latin typeface="Segoe UI"/>
-              </a:rPr>
-              <a:t>better</a:t>
-            </a:r>
-            <a:r>
-              <a:rPr lang="it-IT" sz="2000" dirty="0">
-                <a:latin typeface="Segoe UI"/>
-              </a:rPr>
-              <a:t> native </a:t>
-            </a:r>
-            <a:r>
-              <a:rPr lang="it-IT" sz="2000" err="1">
-                <a:latin typeface="Segoe UI"/>
-              </a:rPr>
-              <a:t>integration</a:t>
-            </a:r>
-            <a:endParaRPr lang="it-IT">
-              <a:latin typeface="Segoe UI"/>
-            </a:endParaRPr>
-          </a:p>
-          <a:p>
-            <a:pPr marL="285750" indent="-285750" algn="just">
-              <a:buFont typeface="Arial"/>
-              <a:buChar char="•"/>
-            </a:pPr>
-            <a:r>
-              <a:rPr lang="it-IT" sz="2000" b="1" dirty="0">
-                <a:latin typeface="Segoe UI"/>
-              </a:rPr>
-              <a:t>Flutter:</a:t>
-            </a:r>
-            <a:r>
-              <a:rPr lang="it-IT" sz="2000" dirty="0">
-                <a:latin typeface="Segoe UI"/>
-              </a:rPr>
-              <a:t> Lower baseline </a:t>
-            </a:r>
-            <a:r>
-              <a:rPr lang="it-IT" sz="2000" err="1">
-                <a:latin typeface="Segoe UI"/>
-              </a:rPr>
-              <a:t>accessibility</a:t>
-            </a:r>
-            <a:r>
-              <a:rPr lang="it-IT" sz="2000" dirty="0">
-                <a:latin typeface="Segoe UI"/>
-              </a:rPr>
-              <a:t>, </a:t>
-            </a:r>
-            <a:r>
-              <a:rPr lang="it-IT" sz="2000" err="1">
-                <a:latin typeface="Segoe UI"/>
-              </a:rPr>
-              <a:t>requires</a:t>
-            </a:r>
-            <a:r>
-              <a:rPr lang="it-IT" sz="2000" dirty="0">
-                <a:latin typeface="Segoe UI"/>
-              </a:rPr>
-              <a:t> more </a:t>
-            </a:r>
-            <a:r>
-              <a:rPr lang="it-IT" sz="2000" err="1">
-                <a:latin typeface="Segoe UI"/>
-              </a:rPr>
-              <a:t>manual</a:t>
-            </a:r>
-            <a:r>
-              <a:rPr lang="it-IT" sz="2000" dirty="0">
-                <a:latin typeface="Segoe UI"/>
-              </a:rPr>
-              <a:t> </a:t>
-            </a:r>
-            <a:r>
-              <a:rPr lang="it-IT" sz="2000" err="1">
-                <a:latin typeface="Segoe UI"/>
-              </a:rPr>
-              <a:t>implementation</a:t>
-            </a:r>
-            <a:endParaRPr lang="it-IT">
-              <a:latin typeface="Segoe UI"/>
-            </a:endParaRPr>
-          </a:p>
-          <a:p>
-            <a:pPr marL="285750" indent="-285750" algn="just">
-              <a:buFont typeface="Arial"/>
-              <a:buChar char="•"/>
-            </a:pPr>
-            <a:r>
-              <a:rPr lang="it-IT" sz="2000" b="1" dirty="0">
-                <a:latin typeface="Segoe UI"/>
-              </a:rPr>
-              <a:t>Code </a:t>
-            </a:r>
-            <a:r>
-              <a:rPr lang="it-IT" sz="2000" b="1" err="1">
-                <a:latin typeface="Segoe UI"/>
-              </a:rPr>
-              <a:t>verbosity</a:t>
-            </a:r>
-            <a:r>
-              <a:rPr lang="it-IT" sz="2000" b="1" dirty="0">
-                <a:latin typeface="Segoe UI"/>
-              </a:rPr>
-              <a:t>:</a:t>
-            </a:r>
-            <a:r>
-              <a:rPr lang="it-IT" sz="2000" dirty="0">
-                <a:latin typeface="Segoe UI"/>
-              </a:rPr>
-              <a:t> React Native more concise for </a:t>
-            </a:r>
-            <a:r>
-              <a:rPr lang="it-IT" sz="2000" err="1">
-                <a:latin typeface="Segoe UI"/>
-              </a:rPr>
-              <a:t>accessibility</a:t>
-            </a:r>
-            <a:r>
-              <a:rPr lang="it-IT" sz="2000" dirty="0">
-                <a:latin typeface="Segoe UI"/>
-              </a:rPr>
-              <a:t> features</a:t>
-            </a:r>
-          </a:p>
-          <a:p>
-            <a:pPr marL="285750" indent="-285750" algn="just">
-              <a:buFont typeface="Arial"/>
-              <a:buChar char="•"/>
-            </a:pPr>
-            <a:endParaRPr lang="it-IT" sz="2000" dirty="0">
-              <a:latin typeface="Segoe UI"/>
-            </a:endParaRPr>
-          </a:p>
-          <a:p>
-            <a:pPr algn="just"/>
-            <a:r>
-              <a:rPr lang="it-IT" sz="2000" b="1" dirty="0">
-                <a:latin typeface="Segoe UI"/>
-              </a:rPr>
-              <a:t>Cross-Platform Insights:</a:t>
-            </a:r>
-            <a:r>
-              <a:rPr lang="it-IT" sz="2000" dirty="0">
-                <a:latin typeface="Segoe UI"/>
-              </a:rPr>
-              <a:t> Framework </a:t>
-            </a:r>
-            <a:r>
-              <a:rPr lang="it-IT" sz="2000" err="1">
-                <a:latin typeface="Segoe UI"/>
-              </a:rPr>
-              <a:t>selection</a:t>
-            </a:r>
-            <a:r>
-              <a:rPr lang="it-IT" sz="2000" dirty="0">
-                <a:latin typeface="Segoe UI"/>
-              </a:rPr>
-              <a:t> </a:t>
-            </a:r>
-            <a:r>
-              <a:rPr lang="it-IT" sz="2000" err="1">
-                <a:latin typeface="Segoe UI"/>
-              </a:rPr>
-              <a:t>significantly</a:t>
-            </a:r>
-            <a:r>
-              <a:rPr lang="it-IT" sz="2000" dirty="0">
-                <a:latin typeface="Segoe UI"/>
-              </a:rPr>
-              <a:t> impacts </a:t>
-            </a:r>
-            <a:r>
-              <a:rPr lang="it-IT" sz="2000" err="1">
-                <a:latin typeface="Segoe UI"/>
-              </a:rPr>
-              <a:t>accessibility</a:t>
-            </a:r>
-            <a:r>
-              <a:rPr lang="it-IT" sz="2000" dirty="0">
-                <a:latin typeface="Segoe UI"/>
-              </a:rPr>
-              <a:t> </a:t>
-            </a:r>
-            <a:r>
-              <a:rPr lang="it-IT" sz="2000" err="1">
-                <a:latin typeface="Segoe UI"/>
-              </a:rPr>
-              <a:t>implementation</a:t>
-            </a:r>
-            <a:r>
-              <a:rPr lang="it-IT" sz="2000" dirty="0">
-                <a:latin typeface="Segoe UI"/>
-              </a:rPr>
-              <a:t> </a:t>
-            </a:r>
-            <a:r>
-              <a:rPr lang="it-IT" sz="2000" err="1">
-                <a:latin typeface="Segoe UI"/>
-              </a:rPr>
-              <a:t>complexity</a:t>
-            </a:r>
-            <a:r>
-              <a:rPr lang="it-IT" sz="2000" dirty="0">
-                <a:latin typeface="Segoe UI"/>
-              </a:rPr>
-              <a:t> and developer </a:t>
-            </a:r>
-            <a:r>
-              <a:rPr lang="it-IT" sz="2000" err="1">
-                <a:latin typeface="Segoe UI"/>
-              </a:rPr>
-              <a:t>experience</a:t>
-            </a:r>
-            <a:endParaRPr lang="it-IT" err="1">
-              <a:latin typeface="Segoe UI"/>
-            </a:endParaRPr>
           </a:p>
           <a:p>
             <a:pPr algn="just"/>
@@ -12881,6 +11892,66 @@
           </a:p>
         </p:txBody>
       </p:sp>
+      <p:pic>
+        <p:nvPicPr>
+          <p:cNvPr id="2" name="Immagine 1" descr="Immagine che contiene testo, schermata, Carattere, numero&#10;&#10;Il contenuto generato dall&amp;#39;IA potrebbe non essere corretto.">
+            <a:extLst>
+              <a:ext uri="{FF2B5EF4-FFF2-40B4-BE49-F238E27FC236}">
+                <a16:creationId xmlns:a16="http://schemas.microsoft.com/office/drawing/2014/main" id="{D980DDB7-46BB-D1E2-C9EA-8FA37757E9FE}"/>
+              </a:ext>
+            </a:extLst>
+          </p:cNvPr>
+          <p:cNvPicPr>
+            <a:picLocks noChangeAspect="1"/>
+          </p:cNvPicPr>
+          <p:nvPr/>
+        </p:nvPicPr>
+        <p:blipFill>
+          <a:blip r:embed="rId3"/>
+          <a:stretch>
+            <a:fillRect/>
+          </a:stretch>
+        </p:blipFill>
+        <p:spPr>
+          <a:xfrm>
+            <a:off x="165253" y="2668231"/>
+            <a:ext cx="8813494" cy="2196320"/>
+          </a:xfrm>
+          <a:prstGeom prst="rect">
+            <a:avLst/>
+          </a:prstGeom>
+        </p:spPr>
+      </p:pic>
+      <p:pic>
+        <p:nvPicPr>
+          <p:cNvPr id="5" name="Immagine 4" descr="Immagine che contiene testo, Carattere, schermata, Elementi grafici&#10;&#10;Il contenuto generato dall&amp;#39;IA potrebbe non essere corretto.">
+            <a:extLst>
+              <a:ext uri="{FF2B5EF4-FFF2-40B4-BE49-F238E27FC236}">
+                <a16:creationId xmlns:a16="http://schemas.microsoft.com/office/drawing/2014/main" id="{3DC1CE92-071B-5B93-0AD6-7BEF15A5FE30}"/>
+              </a:ext>
+            </a:extLst>
+          </p:cNvPr>
+          <p:cNvPicPr>
+            <a:picLocks noChangeAspect="1"/>
+          </p:cNvPicPr>
+          <p:nvPr/>
+        </p:nvPicPr>
+        <p:blipFill>
+          <a:blip r:embed="rId4"/>
+          <a:stretch>
+            <a:fillRect/>
+          </a:stretch>
+        </p:blipFill>
+        <p:spPr>
+          <a:xfrm>
+            <a:off x="1046602" y="5238322"/>
+            <a:ext cx="7064567" cy="540223"/>
+          </a:xfrm>
+          <a:prstGeom prst="rect">
+            <a:avLst/>
+          </a:prstGeom>
+        </p:spPr>
+      </p:pic>
     </p:spTree>
     <p:extLst>
       <p:ext uri="{BB962C8B-B14F-4D97-AF65-F5344CB8AC3E}">
@@ -12894,7 +11965,7 @@
 </p:sld>
 </file>
 
-<file path=ppt/slides/slide15.xml><?xml version="1.0" encoding="utf-8"?>
+<file path=ppt/slides/slide14.xml><?xml version="1.0" encoding="utf-8"?>
 <p:sld xmlns:a="http://schemas.openxmlformats.org/drawingml/2006/main" xmlns:r="http://schemas.openxmlformats.org/officeDocument/2006/relationships" xmlns:p="http://schemas.openxmlformats.org/presentationml/2006/main">
   <p:cSld>
     <p:spTree>
@@ -13358,7 +12429,7 @@
 </p:sld>
 </file>
 
-<file path=ppt/slides/slide16.xml><?xml version="1.0" encoding="utf-8"?>
+<file path=ppt/slides/slide15.xml><?xml version="1.0" encoding="utf-8"?>
 <p:sld xmlns:a="http://schemas.openxmlformats.org/drawingml/2006/main" xmlns:r="http://schemas.openxmlformats.org/officeDocument/2006/relationships" xmlns:p="http://schemas.openxmlformats.org/presentationml/2006/main">
   <p:cSld>
     <p:spTree>
@@ -13677,7 +12748,7 @@
         <p:spPr>
           <a:xfrm>
             <a:off x="606927" y="3935663"/>
-            <a:ext cx="8117304" cy="2246769"/>
+            <a:ext cx="8117304" cy="1631216"/>
           </a:xfrm>
           <a:prstGeom prst="rect">
             <a:avLst/>
@@ -13709,18 +12780,24 @@
               <a:buChar char="•"/>
             </a:pPr>
             <a:r>
+              <a:rPr lang="en-US" sz="2000" dirty="0">
+                <a:latin typeface="Segoe UI"/>
+              </a:rPr>
+              <a:t>Choose </a:t>
+            </a:r>
+            <a:r>
               <a:rPr lang="en-US" sz="2000" b="1" dirty="0">
                 <a:latin typeface="Segoe UI"/>
               </a:rPr>
-              <a:t>React Native:</a:t>
+              <a:t>React Native</a:t>
             </a:r>
             <a:r>
               <a:rPr lang="en-US" sz="2000" dirty="0">
                 <a:latin typeface="Segoe UI"/>
               </a:rPr>
-              <a:t> Property-based model - 45% less code, better platform integration</a:t>
-            </a:r>
-            <a:endParaRPr lang="en-US"/>
+              <a:t> when: Rapid development, web accessibility experience, tight deadlines</a:t>
+            </a:r>
+            <a:endParaRPr lang="en-US" dirty="0"/>
           </a:p>
           <a:p>
             <a:pPr marL="342900" indent="-342900">
@@ -13728,37 +12805,27 @@
               <a:buChar char="•"/>
             </a:pPr>
             <a:r>
+              <a:rPr lang="en-US" sz="2000" dirty="0">
+                <a:latin typeface="Segoe UI"/>
+                <a:cs typeface="Segoe UI"/>
+              </a:rPr>
+              <a:t>Choose </a:t>
+            </a:r>
+            <a:r>
               <a:rPr lang="en-US" sz="2000" b="1" dirty="0">
                 <a:latin typeface="Segoe UI"/>
-              </a:rPr>
-              <a:t>Flutter:</a:t>
+                <a:cs typeface="Segoe UI"/>
+              </a:rPr>
+              <a:t>Flutter </a:t>
             </a:r>
             <a:r>
               <a:rPr lang="en-US" sz="2000" dirty="0">
                 <a:latin typeface="Segoe UI"/>
-              </a:rPr>
-              <a:t> Widget-based model - more explicit semantics, higher implementation cost</a:t>
-            </a:r>
-            <a:endParaRPr lang="en-US"/>
-          </a:p>
-          <a:p>
-            <a:pPr marL="342900" indent="-342900">
-              <a:buFont typeface="Arial"/>
-              <a:buChar char="•"/>
-            </a:pPr>
-            <a:r>
-              <a:rPr lang="en-US" sz="2000" b="1" dirty="0">
-                <a:latin typeface="Segoe UI"/>
-              </a:rPr>
-              <a:t>Framework selection significantly impacts</a:t>
-            </a:r>
-            <a:r>
-              <a:rPr lang="en-US" sz="2000" dirty="0">
-                <a:latin typeface="Segoe UI"/>
-              </a:rPr>
-              <a:t> accessibility development efficiency</a:t>
-            </a:r>
-            <a:endParaRPr lang="en-US"/>
+                <a:cs typeface="Segoe UI"/>
+              </a:rPr>
+              <a:t>when: Complex custom components, long-term maintenance teams, granular control</a:t>
+            </a:r>
+            <a:endParaRPr lang="en-US" dirty="0"/>
           </a:p>
         </p:txBody>
       </p:sp>
@@ -13805,7 +12872,7 @@
 </p:sld>
 </file>
 
-<file path=ppt/slides/slide17.xml><?xml version="1.0" encoding="utf-8"?>
+<file path=ppt/slides/slide16.xml><?xml version="1.0" encoding="utf-8"?>
 <p:sld xmlns:a="http://schemas.openxmlformats.org/drawingml/2006/main" xmlns:r="http://schemas.openxmlformats.org/officeDocument/2006/relationships" xmlns:p="http://schemas.openxmlformats.org/presentationml/2006/main">
   <p:cSld>
     <p:spTree>
@@ -14104,7 +13171,7 @@
         <p:spPr>
           <a:xfrm>
             <a:off x="317734" y="961109"/>
-            <a:ext cx="5376859" cy="5940088"/>
+            <a:ext cx="8764545" cy="3170099"/>
           </a:xfrm>
           <a:prstGeom prst="rect">
             <a:avLst/>
@@ -14124,46 +13191,51 @@
               <a:rPr lang="en-US" sz="2000" b="1" dirty="0">
                 <a:latin typeface="Segoe UI"/>
               </a:rPr>
-              <a:t>Key contributions:</a:t>
+              <a:t>Key contributions</a:t>
+            </a:r>
+            <a:r>
+              <a:rPr lang="en-US" sz="2000" dirty="0">
+                <a:latin typeface="Segoe UI"/>
+              </a:rPr>
+              <a:t>:</a:t>
             </a:r>
             <a:endParaRPr lang="it-IT" sz="2000">
               <a:latin typeface="Segoe UI"/>
             </a:endParaRPr>
           </a:p>
           <a:p>
-            <a:pPr marL="285750" indent="-285750">
-              <a:buFont typeface="Arial"/>
-              <a:buChar char="•"/>
-            </a:pPr>
-            <a:r>
-              <a:rPr lang="en-US" sz="2000" b="1" dirty="0">
-                <a:latin typeface="Segoe UI"/>
-              </a:rPr>
-              <a:t>First quantitative framework</a:t>
-            </a:r>
             <a:r>
               <a:rPr lang="en-US" sz="2000" dirty="0">
                 <a:latin typeface="Segoe UI"/>
-              </a:rPr>
-              <a:t> for mobile accessibility implementation cost assessment</a:t>
-            </a:r>
-          </a:p>
-          <a:p>
-            <a:pPr marL="285750" indent="-285750">
-              <a:buFont typeface="Arial"/>
-              <a:buChar char="•"/>
-            </a:pPr>
-            <a:r>
-              <a:rPr lang="en-US" sz="2000" b="1" dirty="0">
-                <a:latin typeface="Segoe UI"/>
-              </a:rPr>
-              <a:t>Systematic methodology</a:t>
-            </a:r>
+                <a:cs typeface="Segoe UI"/>
+              </a:rPr>
+              <a:t>- Extended research framework from Flutter-only to comparative analysis</a:t>
+            </a:r>
+            <a:endParaRPr lang="en-US" dirty="0"/>
+          </a:p>
+          <a:p>
             <a:r>
               <a:rPr lang="en-US" sz="2000" dirty="0">
                 <a:latin typeface="Segoe UI"/>
               </a:rPr>
-              <a:t> transforming abstract WCAG principles into practical code patterns</a:t>
+              <a:t>- First quantitative framework for mobile accessibility cost assessment  </a:t>
+            </a:r>
+            <a:endParaRPr lang="en-US" dirty="0"/>
+          </a:p>
+          <a:p>
+            <a:r>
+              <a:rPr lang="en-US" sz="2000" dirty="0">
+                <a:latin typeface="Segoe UI"/>
+              </a:rPr>
+              <a:t>- 45% implementation overhead reduction with React Native</a:t>
+            </a:r>
+          </a:p>
+          <a:p>
+            <a:r>
+              <a:rPr lang="en-US" sz="2000" dirty="0">
+                <a:latin typeface="Segoe UI"/>
+              </a:rPr>
+              <a:t>- Systematic methodology bridging WCAG theory to mobile practice</a:t>
             </a:r>
           </a:p>
           <a:p>
@@ -14176,88 +13248,75 @@
               <a:rPr lang="en-US" sz="2000" b="1" dirty="0">
                 <a:latin typeface="Segoe UI"/>
               </a:rPr>
-              <a:t>Practical impact:</a:t>
-            </a:r>
-          </a:p>
-          <a:p>
-            <a:pPr marL="285750" indent="-285750">
-              <a:buFont typeface="Arial"/>
-              <a:buChar char="•"/>
-            </a:pPr>
+              <a:t>Research answers:</a:t>
+            </a:r>
+          </a:p>
+          <a:p>
+            <a:r>
+              <a:rPr lang="en-US" sz="2000" dirty="0">
+                <a:latin typeface="Segoe UI"/>
+              </a:rPr>
+              <a:t>- </a:t>
+            </a:r>
             <a:r>
               <a:rPr lang="en-US" sz="2000" b="1" dirty="0">
                 <a:latin typeface="Segoe UI"/>
               </a:rPr>
-              <a:t>Developers:</a:t>
+              <a:t>RQ1</a:t>
             </a:r>
             <a:r>
               <a:rPr lang="en-US" sz="2000" dirty="0">
                 <a:latin typeface="Segoe UI"/>
               </a:rPr>
-              <a:t> Clear cost-benefit analysis for accessibility implementation prioritization</a:t>
-            </a:r>
-            <a:endParaRPr lang="en-US" dirty="0">
+              <a:t>: Neither framework accessible by default (38% vs 32%) </a:t>
+            </a:r>
+            <a:endParaRPr lang="en-US" sz="2000">
               <a:latin typeface="Segoe UI"/>
             </a:endParaRPr>
           </a:p>
           <a:p>
-            <a:pPr marL="285750" indent="-285750">
-              <a:buFont typeface="Arial"/>
-              <a:buChar char="•"/>
-            </a:pPr>
+            <a:r>
+              <a:rPr lang="en-US" sz="2000" dirty="0">
+                <a:latin typeface="Segoe UI"/>
+              </a:rPr>
+              <a:t>- </a:t>
+            </a:r>
             <a:r>
               <a:rPr lang="en-US" sz="2000" b="1" dirty="0">
                 <a:latin typeface="Segoe UI"/>
               </a:rPr>
-              <a:t>Organizations:</a:t>
+              <a:t>RQ2</a:t>
             </a:r>
             <a:r>
               <a:rPr lang="en-US" sz="2000" dirty="0">
                 <a:latin typeface="Segoe UI"/>
               </a:rPr>
-              <a:t> Evidence-based framework selection guidance for accessible mobile projects</a:t>
-            </a:r>
-            <a:endParaRPr lang="en-US" dirty="0">
+              <a:t>: Both achieve 100% WCAG compliance with proper implementation </a:t>
+            </a:r>
+            <a:endParaRPr lang="en-US" sz="2000">
               <a:latin typeface="Segoe UI"/>
             </a:endParaRPr>
           </a:p>
           <a:p>
-            <a:pPr marL="285750" indent="-285750">
-              <a:buFont typeface="Arial"/>
-              <a:buChar char="•"/>
-            </a:pPr>
+            <a:r>
+              <a:rPr lang="en-US" sz="2000" dirty="0">
+                <a:latin typeface="Segoe UI"/>
+              </a:rPr>
+              <a:t>- </a:t>
+            </a:r>
             <a:r>
               <a:rPr lang="en-US" sz="2000" b="1" dirty="0">
                 <a:latin typeface="Segoe UI"/>
               </a:rPr>
-              <a:t>Academic community:</a:t>
+              <a:t>RQ3</a:t>
             </a:r>
             <a:r>
               <a:rPr lang="en-US" sz="2000" dirty="0">
                 <a:latin typeface="Segoe UI"/>
               </a:rPr>
-              <a:t> Reproducible methodology for accessibility evaluation </a:t>
-            </a:r>
-          </a:p>
-          <a:p>
-            <a:pPr marL="285750" indent="-285750">
-              <a:buFont typeface="Arial"/>
-              <a:buChar char="•"/>
-            </a:pPr>
-            <a:endParaRPr lang="en-US" sz="2000" dirty="0">
-              <a:latin typeface="Segoe UI"/>
-            </a:endParaRPr>
-          </a:p>
-          <a:p>
-            <a:pPr>
-              <a:buFont typeface="Arial"/>
-            </a:pPr>
-            <a:endParaRPr lang="en-US" sz="2000" dirty="0">
-              <a:latin typeface="Segoe UI"/>
-            </a:endParaRPr>
-          </a:p>
-          <a:p>
-            <a:endParaRPr lang="en-US" sz="2000" b="1" dirty="0">
+              <a:t>: React Native requires 45% less code for equivalent accessibility</a:t>
+            </a:r>
+            <a:endParaRPr lang="en-US">
               <a:latin typeface="Segoe UI"/>
             </a:endParaRPr>
           </a:p>
@@ -14265,10 +13324,10 @@
       </p:sp>
       <p:pic>
         <p:nvPicPr>
-          <p:cNvPr id="2" name="Immagine 1" descr="How Much Can I Contribute to My TFSA?">
+          <p:cNvPr id="10" name="Immagine 9" descr="Immagine che contiene simbolo, Carattere, Elementi grafici, logo&#10;&#10;Il contenuto generato dall&amp;#39;IA potrebbe non essere corretto.">
             <a:extLst>
               <a:ext uri="{FF2B5EF4-FFF2-40B4-BE49-F238E27FC236}">
-                <a16:creationId xmlns:a16="http://schemas.microsoft.com/office/drawing/2014/main" id="{F509C94F-5272-79C9-76B2-4CE797C7DE1F}"/>
+                <a16:creationId xmlns:a16="http://schemas.microsoft.com/office/drawing/2014/main" id="{C7E6B5DB-9120-E854-A01B-484402609BFE}"/>
               </a:ext>
             </a:extLst>
           </p:cNvPr>
@@ -14285,8 +13344,8 @@
         </p:blipFill>
         <p:spPr>
           <a:xfrm>
-            <a:off x="6078557" y="1284726"/>
-            <a:ext cx="2743199" cy="1864835"/>
+            <a:off x="2686838" y="4103782"/>
+            <a:ext cx="1663345" cy="1983037"/>
           </a:xfrm>
           <a:prstGeom prst="rect">
             <a:avLst/>
@@ -14295,10 +13354,10 @@
       </p:pic>
       <p:pic>
         <p:nvPicPr>
-          <p:cNvPr id="4" name="Immagine 3" descr="What Research Psychologists Do – Association for Psychological Science – APS">
+          <p:cNvPr id="11" name="Immagine 10" descr="Research - Free marketing icons">
             <a:extLst>
               <a:ext uri="{FF2B5EF4-FFF2-40B4-BE49-F238E27FC236}">
-                <a16:creationId xmlns:a16="http://schemas.microsoft.com/office/drawing/2014/main" id="{3C1DB109-B9F4-CD6C-80FA-6DDDD33F5694}"/>
+                <a16:creationId xmlns:a16="http://schemas.microsoft.com/office/drawing/2014/main" id="{37CBD625-1E4C-BB19-6F9E-6C1AF96E524E}"/>
               </a:ext>
             </a:extLst>
           </p:cNvPr>
@@ -14315,8 +13374,8 @@
         </p:blipFill>
         <p:spPr>
           <a:xfrm>
-            <a:off x="6078557" y="3613915"/>
-            <a:ext cx="2743199" cy="1888628"/>
+            <a:off x="5096777" y="4117554"/>
+            <a:ext cx="1663346" cy="1955495"/>
           </a:xfrm>
           <a:prstGeom prst="rect">
             <a:avLst/>
@@ -15284,6 +14343,18 @@
               <a:rPr lang="it-IT" sz="2000" dirty="0">
                 <a:latin typeface="Segoe UI"/>
               </a:rPr>
+              <a:t> </a:t>
+            </a:r>
+            <a:r>
+              <a:rPr lang="it-IT" sz="2000" dirty="0" err="1">
+                <a:latin typeface="Segoe UI"/>
+              </a:rPr>
+              <a:t>might</a:t>
+            </a:r>
+            <a:r>
+              <a:rPr lang="it-IT" sz="2000" dirty="0">
+                <a:latin typeface="Segoe UI"/>
+              </a:rPr>
               <a:t> </a:t>
             </a:r>
             <a:r>
@@ -15302,13 +14373,25 @@
               <a:rPr lang="it-IT" sz="2000" dirty="0" err="1">
                 <a:latin typeface="Segoe UI"/>
               </a:rPr>
-              <a:t>motor-impaired</a:t>
+              <a:t>different</a:t>
             </a:r>
             <a:r>
               <a:rPr lang="it-IT" sz="2000" dirty="0">
                 <a:latin typeface="Segoe UI"/>
               </a:rPr>
-              <a:t> users</a:t>
+              <a:t> </a:t>
+            </a:r>
+            <a:r>
+              <a:rPr lang="it-IT" sz="2000" dirty="0" err="1">
+                <a:latin typeface="Segoe UI"/>
+              </a:rPr>
+              <a:t>categories</a:t>
+            </a:r>
+            <a:r>
+              <a:rPr lang="it-IT" sz="2000" dirty="0">
+                <a:latin typeface="Segoe UI"/>
+              </a:rPr>
+              <a:t> of users</a:t>
             </a:r>
             <a:endParaRPr lang="it-IT">
               <a:latin typeface="Segoe UI"/>
@@ -18452,7 +17535,7 @@
         <p:spPr>
           <a:xfrm>
             <a:off x="315940" y="962003"/>
-            <a:ext cx="8515877" cy="3385542"/>
+            <a:ext cx="8515877" cy="3693319"/>
           </a:xfrm>
           <a:prstGeom prst="rect">
             <a:avLst/>
@@ -18473,19 +17556,7 @@
               <a:t>Core </a:t>
             </a:r>
             <a:r>
-              <a:rPr lang="it-IT" sz="2000" b="1" err="1">
-                <a:latin typeface="Segoe UI"/>
-              </a:rPr>
-              <a:t>application</a:t>
-            </a:r>
-            <a:r>
-              <a:rPr lang="it-IT" sz="2000" b="1" dirty="0">
-                <a:latin typeface="Segoe UI"/>
-              </a:rPr>
-              <a:t> </a:t>
-            </a:r>
-            <a:r>
-              <a:rPr lang="it-IT" sz="2000" b="1" err="1">
+              <a:rPr lang="it-IT" sz="2000" b="1" dirty="0" err="1">
                 <a:latin typeface="Segoe UI"/>
               </a:rPr>
               <a:t>sections</a:t>
@@ -18608,7 +17679,7 @@
               <a:rPr lang="it-IT" sz="2000" b="1" dirty="0">
                 <a:latin typeface="Segoe UI"/>
               </a:rPr>
-              <a:t>Tools Screen</a:t>
+              <a:t>Tools - Settings</a:t>
             </a:r>
             <a:r>
               <a:rPr lang="it-IT" sz="2000" dirty="0">
@@ -18617,22 +17688,73 @@
               <a:t>: Resource </a:t>
             </a:r>
             <a:r>
+              <a:rPr lang="it-IT" sz="2000" dirty="0" err="1">
+                <a:latin typeface="Segoe UI"/>
+              </a:rPr>
+              <a:t>catalog</a:t>
+            </a:r>
+            <a:r>
+              <a:rPr lang="it-IT" sz="2000" dirty="0">
+                <a:latin typeface="Segoe UI"/>
+              </a:rPr>
+              <a:t> for testing and common settings</a:t>
+            </a:r>
+          </a:p>
+          <a:p>
+            <a:pPr algn="just"/>
+            <a:r>
+              <a:rPr lang="it-IT" sz="2000" dirty="0">
+                <a:latin typeface="Segoe UI"/>
+              </a:rPr>
+              <a:t>📊 </a:t>
+            </a:r>
+            <a:r>
+              <a:rPr lang="it-IT" sz="2000" b="1" dirty="0">
+                <a:latin typeface="Segoe UI"/>
+              </a:rPr>
+              <a:t>Framework </a:t>
+            </a:r>
+            <a:r>
+              <a:rPr lang="it-IT" sz="2000" b="1" err="1">
+                <a:latin typeface="Segoe UI"/>
+              </a:rPr>
+              <a:t>Comparison</a:t>
+            </a:r>
+            <a:r>
+              <a:rPr lang="it-IT" sz="2000" dirty="0">
+                <a:latin typeface="Segoe UI"/>
+              </a:rPr>
+              <a:t>: </a:t>
+            </a:r>
+            <a:r>
               <a:rPr lang="it-IT" sz="2000" err="1">
                 <a:latin typeface="Segoe UI"/>
               </a:rPr>
-              <a:t>catalog</a:t>
+              <a:t>Evidence-based</a:t>
             </a:r>
             <a:r>
               <a:rPr lang="it-IT" sz="2000" dirty="0">
                 <a:latin typeface="Segoe UI"/>
               </a:rPr>
-              <a:t> for testing and </a:t>
+              <a:t> </a:t>
             </a:r>
             <a:r>
               <a:rPr lang="it-IT" sz="2000" err="1">
                 <a:latin typeface="Segoe UI"/>
               </a:rPr>
               <a:t>evaluation</a:t>
+            </a:r>
+            <a:r>
+              <a:rPr lang="it-IT" sz="2000" dirty="0">
+                <a:latin typeface="Segoe UI"/>
+              </a:rPr>
+              <a:t> </a:t>
+            </a:r>
+            <a:r>
+              <a:rPr lang="it-IT" sz="2000" err="1">
+                <a:latin typeface="Segoe UI"/>
+              </a:rPr>
+              <a:t>methodology</a:t>
             </a:r>
             <a:endParaRPr lang="it-IT">
               <a:latin typeface="Segoe UI"/>
@@ -18644,87 +17766,33 @@
               <a:rPr lang="it-IT" sz="2000" dirty="0">
                 <a:latin typeface="Segoe UI"/>
               </a:rPr>
-              <a:t>📊 </a:t>
+              <a:t>👥 </a:t>
+            </a:r>
+            <a:r>
+              <a:rPr lang="it-IT" sz="2000" b="1" dirty="0" err="1">
+                <a:latin typeface="Segoe UI"/>
+              </a:rPr>
+              <a:t>Instruction</a:t>
             </a:r>
             <a:r>
               <a:rPr lang="it-IT" sz="2000" b="1" dirty="0">
                 <a:latin typeface="Segoe UI"/>
               </a:rPr>
-              <a:t>Framework </a:t>
-            </a:r>
-            <a:r>
-              <a:rPr lang="it-IT" sz="2000" b="1" err="1">
-                <a:latin typeface="Segoe UI"/>
-              </a:rPr>
-              <a:t>Comparison</a:t>
+              <a:t> &amp; Community</a:t>
             </a:r>
             <a:r>
               <a:rPr lang="it-IT" sz="2000" dirty="0">
                 <a:latin typeface="Segoe UI"/>
               </a:rPr>
-              <a:t>: </a:t>
-            </a:r>
-            <a:r>
-              <a:rPr lang="it-IT" sz="2000" err="1">
-                <a:latin typeface="Segoe UI"/>
-              </a:rPr>
-              <a:t>Evidence-based</a:t>
-            </a:r>
-            <a:r>
-              <a:rPr lang="it-IT" sz="2000" dirty="0">
-                <a:latin typeface="Segoe UI"/>
-              </a:rPr>
-              <a:t> </a:t>
-            </a:r>
-            <a:r>
-              <a:rPr lang="it-IT" sz="2000" err="1">
-                <a:latin typeface="Segoe UI"/>
-              </a:rPr>
-              <a:t>evaluation</a:t>
-            </a:r>
-            <a:r>
-              <a:rPr lang="it-IT" sz="2000" dirty="0">
-                <a:latin typeface="Segoe UI"/>
-              </a:rPr>
-              <a:t> </a:t>
-            </a:r>
-            <a:r>
-              <a:rPr lang="it-IT" sz="2000" err="1">
-                <a:latin typeface="Segoe UI"/>
-              </a:rPr>
-              <a:t>methodology</a:t>
-            </a:r>
-            <a:endParaRPr lang="it-IT">
-              <a:latin typeface="Segoe UI"/>
-            </a:endParaRPr>
-          </a:p>
-          <a:p>
-            <a:pPr algn="just"/>
-            <a:r>
-              <a:rPr lang="it-IT" sz="2000" dirty="0">
-                <a:latin typeface="Segoe UI"/>
-              </a:rPr>
-              <a:t>👥 </a:t>
-            </a:r>
-            <a:r>
-              <a:rPr lang="it-IT" sz="2000" b="1" dirty="0">
-                <a:latin typeface="Segoe UI"/>
-              </a:rPr>
-              <a:t>Community Integration</a:t>
-            </a:r>
-            <a:r>
-              <a:rPr lang="it-IT" sz="2000" dirty="0">
-                <a:latin typeface="Segoe UI"/>
-              </a:rPr>
-              <a:t>: Social learning and collaborative </a:t>
-            </a:r>
-            <a:r>
-              <a:rPr lang="it-IT" sz="2000" err="1">
+              <a:t>: Social learning &amp; collaborative </a:t>
+            </a:r>
+            <a:r>
+              <a:rPr lang="it-IT" sz="2000" dirty="0" err="1">
                 <a:latin typeface="Segoe UI"/>
               </a:rPr>
               <a:t>resources</a:t>
             </a:r>
-            <a:endParaRPr lang="it-IT">
+            <a:endParaRPr lang="it-IT" dirty="0">
               <a:latin typeface="Segoe UI"/>
             </a:endParaRPr>
           </a:p>
@@ -18739,174 +17807,275 @@
             <a:r>
               <a:rPr lang="it-IT" sz="2000" b="1" dirty="0" err="1">
                 <a:latin typeface="Segoe UI"/>
+                <a:cs typeface="Segoe UI"/>
               </a:rPr>
               <a:t>Research</a:t>
             </a:r>
             <a:r>
               <a:rPr lang="it-IT" sz="2000" b="1" dirty="0">
                 <a:latin typeface="Segoe UI"/>
+                <a:cs typeface="Segoe UI"/>
               </a:rPr>
               <a:t> </a:t>
             </a:r>
             <a:r>
               <a:rPr lang="it-IT" sz="2000" b="1" dirty="0" err="1">
                 <a:latin typeface="Segoe UI"/>
+                <a:cs typeface="Segoe UI"/>
               </a:rPr>
               <a:t>innovation</a:t>
             </a:r>
             <a:r>
               <a:rPr lang="it-IT" sz="2000" dirty="0">
                 <a:latin typeface="Segoe UI"/>
+                <a:cs typeface="Segoe UI"/>
               </a:rPr>
               <a:t>: </a:t>
             </a:r>
             <a:r>
               <a:rPr lang="it-IT" sz="2000" dirty="0" err="1">
                 <a:latin typeface="Segoe UI"/>
+                <a:cs typeface="Segoe UI"/>
               </a:rPr>
               <a:t>Every</a:t>
             </a:r>
             <a:r>
               <a:rPr lang="it-IT" sz="2000" dirty="0">
                 <a:latin typeface="Segoe UI"/>
+                <a:cs typeface="Segoe UI"/>
               </a:rPr>
               <a:t> screen </a:t>
             </a:r>
             <a:r>
               <a:rPr lang="it-IT" sz="2000" dirty="0" err="1">
                 <a:latin typeface="Segoe UI"/>
+                <a:cs typeface="Segoe UI"/>
               </a:rPr>
               <a:t>analyzed</a:t>
             </a:r>
             <a:r>
               <a:rPr lang="it-IT" sz="2000" dirty="0">
                 <a:latin typeface="Segoe UI"/>
+                <a:cs typeface="Segoe UI"/>
               </a:rPr>
               <a:t> </a:t>
             </a:r>
             <a:r>
               <a:rPr lang="it-IT" sz="2000" dirty="0" err="1">
                 <a:latin typeface="Segoe UI"/>
+                <a:cs typeface="Segoe UI"/>
               </a:rPr>
               <a:t>as</a:t>
             </a:r>
             <a:r>
               <a:rPr lang="it-IT" sz="2000" dirty="0">
                 <a:latin typeface="Segoe UI"/>
-              </a:rPr>
-              <a:t> case study</a:t>
-            </a:r>
-            <a:endParaRPr lang="it-IT" dirty="0">
-              <a:latin typeface="Segoe UI"/>
-            </a:endParaRPr>
-          </a:p>
-          <a:p>
-            <a:pPr marL="285750" indent="-285750" algn="just">
-              <a:buFont typeface="Arial"/>
-              <a:buChar char="•"/>
-            </a:pPr>
+                <a:cs typeface="Segoe UI"/>
+              </a:rPr>
+              <a:t> case study</a:t>
+            </a:r>
+            <a:endParaRPr lang="it-IT" dirty="0"/>
+          </a:p>
+          <a:p>
+            <a:pPr algn="just"/>
+            <a:r>
+              <a:rPr lang="it-IT" sz="2000" dirty="0">
+                <a:latin typeface="Segoe UI"/>
+                <a:cs typeface="Segoe UI"/>
+              </a:rPr>
+              <a:t>- </a:t>
+            </a:r>
             <a:r>
               <a:rPr lang="it-IT" sz="2000" b="1" dirty="0">
                 <a:latin typeface="Segoe UI"/>
+                <a:cs typeface="Segoe UI"/>
+              </a:rPr>
+              <a:t>Dual </a:t>
+            </a:r>
+            <a:r>
+              <a:rPr lang="it-IT" sz="2000" b="1" dirty="0" err="1">
+                <a:latin typeface="Segoe UI"/>
+                <a:cs typeface="Segoe UI"/>
+              </a:rPr>
+              <a:t>methodology</a:t>
+            </a:r>
+            <a:r>
+              <a:rPr lang="it-IT" sz="2000" dirty="0">
+                <a:latin typeface="Segoe UI"/>
+                <a:cs typeface="Segoe UI"/>
+              </a:rPr>
+              <a:t>: </a:t>
+            </a:r>
+            <a:r>
+              <a:rPr lang="it-IT" sz="2000" dirty="0" err="1">
+                <a:latin typeface="Segoe UI"/>
+                <a:cs typeface="Segoe UI"/>
+              </a:rPr>
+              <a:t>Both</a:t>
+            </a:r>
+            <a:r>
+              <a:rPr lang="it-IT" sz="2000" dirty="0">
+                <a:latin typeface="Segoe UI"/>
+                <a:cs typeface="Segoe UI"/>
+              </a:rPr>
+              <a:t> </a:t>
+            </a:r>
+            <a:r>
+              <a:rPr lang="it-IT" sz="2000" dirty="0" err="1">
+                <a:latin typeface="Segoe UI"/>
+                <a:cs typeface="Segoe UI"/>
+              </a:rPr>
+              <a:t>research</a:t>
+            </a:r>
+            <a:r>
+              <a:rPr lang="it-IT" sz="2000" dirty="0">
+                <a:latin typeface="Segoe UI"/>
+                <a:cs typeface="Segoe UI"/>
+              </a:rPr>
+              <a:t> </a:t>
+            </a:r>
+            <a:r>
+              <a:rPr lang="it-IT" sz="2000" dirty="0" err="1">
+                <a:latin typeface="Segoe UI"/>
+                <a:cs typeface="Segoe UI"/>
+              </a:rPr>
+              <a:t>vehicle</a:t>
+            </a:r>
+            <a:r>
+              <a:rPr lang="it-IT" sz="2000" dirty="0">
+                <a:latin typeface="Segoe UI"/>
+                <a:cs typeface="Segoe UI"/>
+              </a:rPr>
+              <a:t> &amp; educational tool</a:t>
+            </a:r>
+            <a:endParaRPr lang="it-IT" dirty="0"/>
+          </a:p>
+          <a:p>
+            <a:pPr algn="just"/>
+            <a:r>
+              <a:rPr lang="it-IT" sz="2000" dirty="0">
+                <a:latin typeface="Segoe UI"/>
+                <a:cs typeface="Segoe UI"/>
+              </a:rPr>
+              <a:t>- </a:t>
+            </a:r>
+            <a:r>
+              <a:rPr lang="it-IT" sz="2000" b="1" dirty="0">
+                <a:latin typeface="Segoe UI"/>
+                <a:cs typeface="Segoe UI"/>
               </a:rPr>
               <a:t>20+ </a:t>
             </a:r>
             <a:r>
               <a:rPr lang="it-IT" sz="2000" b="1" dirty="0" err="1">
                 <a:latin typeface="Segoe UI"/>
+                <a:cs typeface="Segoe UI"/>
               </a:rPr>
               <a:t>components</a:t>
             </a:r>
             <a:r>
+              <a:rPr lang="it-IT" sz="2000" b="1" dirty="0">
+                <a:latin typeface="Segoe UI"/>
+                <a:cs typeface="Segoe UI"/>
+              </a:rPr>
+              <a:t> </a:t>
+            </a:r>
+            <a:r>
+              <a:rPr lang="it-IT" sz="2000" b="1" dirty="0" err="1">
+                <a:latin typeface="Segoe UI"/>
+                <a:cs typeface="Segoe UI"/>
+              </a:rPr>
+              <a:t>tested</a:t>
+            </a:r>
+            <a:r>
               <a:rPr lang="it-IT" sz="2000" dirty="0">
                 <a:latin typeface="Segoe UI"/>
+                <a:cs typeface="Segoe UI"/>
+              </a:rPr>
+              <a:t> with </a:t>
+            </a:r>
+            <a:r>
+              <a:rPr lang="it-IT" sz="2000" dirty="0" err="1">
+                <a:latin typeface="Segoe UI"/>
+                <a:cs typeface="Segoe UI"/>
+              </a:rPr>
+              <a:t>TalkBack</a:t>
+            </a:r>
+            <a:r>
+              <a:rPr lang="it-IT" sz="2000" dirty="0">
+                <a:latin typeface="Segoe UI"/>
+                <a:cs typeface="Segoe UI"/>
+              </a:rPr>
+              <a:t> and VoiceOver</a:t>
+            </a:r>
+            <a:endParaRPr lang="it-IT" dirty="0"/>
+          </a:p>
+          <a:p>
+            <a:pPr algn="just"/>
+            <a:r>
+              <a:rPr lang="it-IT" sz="2000" dirty="0">
+                <a:latin typeface="Segoe UI"/>
+                <a:cs typeface="Segoe UI"/>
+              </a:rPr>
+              <a:t>- </a:t>
+            </a:r>
+            <a:r>
+              <a:rPr lang="it-IT" sz="2000" b="1" dirty="0">
+                <a:latin typeface="Segoe UI"/>
+                <a:cs typeface="Segoe UI"/>
+              </a:rPr>
+              <a:t>Cross-</a:t>
+            </a:r>
+            <a:r>
+              <a:rPr lang="it-IT" sz="2000" b="1" dirty="0" err="1">
+                <a:latin typeface="Segoe UI"/>
+                <a:cs typeface="Segoe UI"/>
+              </a:rPr>
+              <a:t>platform</a:t>
+            </a:r>
+            <a:r>
+              <a:rPr lang="it-IT" sz="2000" b="1" dirty="0">
+                <a:latin typeface="Segoe UI"/>
+                <a:cs typeface="Segoe UI"/>
               </a:rPr>
               <a:t> </a:t>
             </a:r>
             <a:r>
+              <a:rPr lang="it-IT" sz="2000" b="1" dirty="0" err="1">
+                <a:latin typeface="Segoe UI"/>
+                <a:cs typeface="Segoe UI"/>
+              </a:rPr>
+              <a:t>validation</a:t>
+            </a:r>
+            <a:r>
+              <a:rPr lang="it-IT" sz="2000" dirty="0">
+                <a:latin typeface="Segoe UI"/>
+                <a:cs typeface="Segoe UI"/>
+              </a:rPr>
+              <a:t> </a:t>
+            </a:r>
+            <a:r>
               <a:rPr lang="it-IT" sz="2000" dirty="0" err="1">
                 <a:latin typeface="Segoe UI"/>
-              </a:rPr>
-              <a:t>tested</a:t>
+                <a:cs typeface="Segoe UI"/>
+              </a:rPr>
+              <a:t>ensuring</a:t>
             </a:r>
             <a:r>
               <a:rPr lang="it-IT" sz="2000" dirty="0">
                 <a:latin typeface="Segoe UI"/>
-              </a:rPr>
-              <a:t> with </a:t>
+                <a:cs typeface="Segoe UI"/>
+              </a:rPr>
+              <a:t> patterns work </a:t>
             </a:r>
             <a:r>
               <a:rPr lang="it-IT" sz="2000" dirty="0" err="1">
                 <a:latin typeface="Segoe UI"/>
-              </a:rPr>
-              <a:t>TalkBack</a:t>
-            </a:r>
-            <a:r>
-              <a:rPr lang="it-IT" sz="2000" dirty="0">
-                <a:latin typeface="Segoe UI"/>
-              </a:rPr>
-              <a:t> and VoiceOver</a:t>
-            </a:r>
-            <a:endParaRPr lang="it-IT" dirty="0">
-              <a:latin typeface="Segoe UI"/>
-            </a:endParaRPr>
-          </a:p>
-          <a:p>
-            <a:pPr marL="285750" indent="-285750" algn="just">
-              <a:buFont typeface="Arial"/>
-              <a:buChar char="•"/>
-            </a:pPr>
-            <a:r>
-              <a:rPr lang="it-IT" sz="2000" b="1" dirty="0">
-                <a:latin typeface="Segoe UI"/>
-              </a:rPr>
-              <a:t>Cross-</a:t>
-            </a:r>
-            <a:r>
-              <a:rPr lang="it-IT" sz="2000" b="1" dirty="0" err="1">
-                <a:latin typeface="Segoe UI"/>
-              </a:rPr>
-              <a:t>platform</a:t>
-            </a:r>
-            <a:r>
-              <a:rPr lang="it-IT" sz="2000" b="1" dirty="0">
-                <a:latin typeface="Segoe UI"/>
-              </a:rPr>
-              <a:t> </a:t>
-            </a:r>
-            <a:r>
-              <a:rPr lang="it-IT" sz="2000" b="1" dirty="0" err="1">
-                <a:latin typeface="Segoe UI"/>
-              </a:rPr>
-              <a:t>validation</a:t>
-            </a:r>
-            <a:r>
-              <a:rPr lang="it-IT" sz="2000" dirty="0">
-                <a:latin typeface="Segoe UI"/>
-              </a:rPr>
-              <a:t> </a:t>
-            </a:r>
-            <a:r>
-              <a:rPr lang="it-IT" sz="2000" dirty="0" err="1">
-                <a:latin typeface="Segoe UI"/>
-              </a:rPr>
-              <a:t>ensuring</a:t>
-            </a:r>
-            <a:r>
-              <a:rPr lang="it-IT" sz="2000" dirty="0">
-                <a:latin typeface="Segoe UI"/>
-              </a:rPr>
-              <a:t> patterns work </a:t>
-            </a:r>
-            <a:r>
-              <a:rPr lang="it-IT" sz="2000" dirty="0" err="1">
-                <a:latin typeface="Segoe UI"/>
+                <a:cs typeface="Segoe UI"/>
               </a:rPr>
               <a:t>universally</a:t>
             </a:r>
-            <a:endParaRPr lang="it-IT" dirty="0" err="1">
-              <a:latin typeface="Segoe UI"/>
-            </a:endParaRPr>
+            <a:endParaRPr lang="it-IT" dirty="0" err="1"/>
           </a:p>
           <a:p>
             <a:pPr algn="just"/>
@@ -19448,13 +18617,58 @@
             </a:endParaRPr>
           </a:p>
           <a:p>
-            <a:pPr algn="just"/>
+            <a:pPr algn="ctr"/>
             <a:r>
               <a:rPr lang="it-IT" sz="2000" b="1" dirty="0">
                 <a:latin typeface="Segoe UI"/>
               </a:rPr>
-              <a:t>Basic workflow:</a:t>
-            </a:r>
+              <a:t>Basic workflow - </a:t>
+            </a:r>
+            <a:r>
+              <a:rPr lang="it-IT" sz="2000" dirty="0" err="1">
+                <a:latin typeface="Segoe UI"/>
+              </a:rPr>
+              <a:t>Enabling</a:t>
+            </a:r>
+            <a:r>
+              <a:rPr lang="it-IT" sz="2000" dirty="0">
+                <a:latin typeface="Segoe UI"/>
+              </a:rPr>
+              <a:t> data-</a:t>
+            </a:r>
+            <a:r>
+              <a:rPr lang="it-IT" sz="2000" dirty="0" err="1">
+                <a:latin typeface="Segoe UI"/>
+              </a:rPr>
+              <a:t>driven</a:t>
+            </a:r>
+            <a:r>
+              <a:rPr lang="it-IT" sz="2000" dirty="0">
+                <a:latin typeface="Segoe UI"/>
+              </a:rPr>
+              <a:t> </a:t>
+            </a:r>
+            <a:r>
+              <a:rPr lang="it-IT" sz="2000" dirty="0" err="1">
+                <a:latin typeface="Segoe UI"/>
+              </a:rPr>
+              <a:t>accessibility</a:t>
+            </a:r>
+            <a:r>
+              <a:rPr lang="it-IT" sz="2000" dirty="0">
+                <a:latin typeface="Segoe UI"/>
+              </a:rPr>
+              <a:t> </a:t>
+            </a:r>
+            <a:r>
+              <a:rPr lang="it-IT" sz="2000" dirty="0" err="1">
+                <a:latin typeface="Segoe UI"/>
+              </a:rPr>
+              <a:t>decisions</a:t>
+            </a:r>
+            <a:endParaRPr lang="it-IT" sz="2000" b="1" dirty="0" err="1">
+              <a:latin typeface="Segoe UI"/>
+            </a:endParaRPr>
           </a:p>
           <a:p>
             <a:pPr algn="just"/>

</xml_diff>

<commit_message>
Script for defense - drafts
</commit_message>
<xml_diff>
--- a/Thesis Presentation/Presentation Gabriel Rovesti.pptx
+++ b/Thesis Presentation/Presentation Gabriel Rovesti.pptx
@@ -262,6 +262,7 @@
   <p1510:revLst>
     <p1510:client id="{625D73A8-2971-33D0-7F96-EA3FA7DFDCDD}" v="152" dt="2025-07-07T17:42:36.729"/>
     <p1510:client id="{63ABD6D2-6AA7-A9AD-CFE8-E7CF9E0D030A}" v="622" dt="2025-07-07T17:03:40.833"/>
+    <p1510:client id="{CF76EE9D-CBDD-9B20-5D03-D1C89A151C1B}" v="161" dt="2025-07-08T07:35:57.076"/>
   </p1510:revLst>
 </p1510:revInfo>
 </file>
@@ -360,7 +361,7 @@
           <a:p>
             <a:fld id="{6469F890-3609-4E18-B68A-510CF7125ACB}" type="datetimeFigureOut">
               <a:rPr lang="it-IT" smtClean="0"/>
-              <a:t>07/07/2025</a:t>
+              <a:t>08/07/2025</a:t>
             </a:fld>
             <a:endParaRPr lang="it-IT"/>
           </a:p>
@@ -9808,8 +9809,8 @@
         </p:nvSpPr>
         <p:spPr>
           <a:xfrm>
-            <a:off x="8302200" y="6479700"/>
-            <a:ext cx="384600" cy="378300"/>
+            <a:off x="8115043" y="6559910"/>
+            <a:ext cx="651967" cy="231248"/>
           </a:xfrm>
           <a:prstGeom prst="rect">
             <a:avLst/>
@@ -9837,107 +9838,6 @@
               <a:buNone/>
             </a:pPr>
             <a:endParaRPr/>
-          </a:p>
-        </p:txBody>
-      </p:sp>
-      <p:sp>
-        <p:nvSpPr>
-          <p:cNvPr id="23" name="CasellaDiTesto 22">
-            <a:extLst>
-              <a:ext uri="{FF2B5EF4-FFF2-40B4-BE49-F238E27FC236}">
-                <a16:creationId xmlns:a16="http://schemas.microsoft.com/office/drawing/2014/main" id="{025AE551-3F25-D1F9-C10E-4BCDC26AB293}"/>
-              </a:ext>
-            </a:extLst>
-          </p:cNvPr>
-          <p:cNvSpPr txBox="1"/>
-          <p:nvPr/>
-        </p:nvSpPr>
-        <p:spPr>
-          <a:xfrm>
-            <a:off x="4781846" y="6482191"/>
-            <a:ext cx="3911435" cy="261610"/>
-          </a:xfrm>
-          <a:prstGeom prst="rect">
-            <a:avLst/>
-          </a:prstGeom>
-          <a:noFill/>
-        </p:spPr>
-        <p:txBody>
-          <a:bodyPr wrap="square" lIns="91440" tIns="45720" rIns="91440" bIns="45720" rtlCol="0" anchor="t">
-            <a:spAutoFit/>
-          </a:bodyPr>
-          <a:lstStyle/>
-          <a:p>
-            <a:pPr algn="r"/>
-            <a:r>
-              <a:rPr lang="it-IT" sz="1100" dirty="0">
-                <a:solidFill>
-                  <a:schemeClr val="bg1"/>
-                </a:solidFill>
-                <a:latin typeface="Segoe UI"/>
-              </a:rPr>
-              <a:t>G. </a:t>
-            </a:r>
-            <a:r>
-              <a:rPr lang="it-IT" sz="1100" err="1">
-                <a:solidFill>
-                  <a:schemeClr val="bg1"/>
-                </a:solidFill>
-                <a:latin typeface="Segoe UI"/>
-              </a:rPr>
-              <a:t>Rovesti</a:t>
-            </a:r>
-            <a:r>
-              <a:rPr lang="it-IT" sz="1100" dirty="0">
-                <a:solidFill>
-                  <a:schemeClr val="bg1"/>
-                </a:solidFill>
-                <a:latin typeface="Segoe UI"/>
-              </a:rPr>
-              <a:t> - </a:t>
-            </a:r>
-            <a:r>
-              <a:rPr lang="it-IT" sz="1100" err="1">
-                <a:solidFill>
-                  <a:schemeClr val="bg1"/>
-                </a:solidFill>
-                <a:latin typeface="Segoe UI"/>
-              </a:rPr>
-              <a:t>Designing</a:t>
-            </a:r>
-            <a:r>
-              <a:rPr lang="it-IT" sz="1100" dirty="0">
-                <a:solidFill>
-                  <a:schemeClr val="bg1"/>
-                </a:solidFill>
-                <a:latin typeface="Segoe UI"/>
-              </a:rPr>
-              <a:t> an </a:t>
-            </a:r>
-            <a:r>
-              <a:rPr lang="it-IT" sz="1100" err="1">
-                <a:solidFill>
-                  <a:schemeClr val="bg1"/>
-                </a:solidFill>
-                <a:latin typeface="Segoe UI"/>
-              </a:rPr>
-              <a:t>accessibility</a:t>
-            </a:r>
-            <a:r>
-              <a:rPr lang="it-IT" sz="1100" dirty="0">
-                <a:solidFill>
-                  <a:schemeClr val="bg1"/>
-                </a:solidFill>
-                <a:latin typeface="Segoe UI"/>
-              </a:rPr>
-              <a:t> learning toolkit</a:t>
-            </a:r>
-            <a:endParaRPr lang="it-IT" dirty="0">
-              <a:solidFill>
-                <a:schemeClr val="bg1"/>
-              </a:solidFill>
-              <a:latin typeface="Segoe UI"/>
-            </a:endParaRPr>
           </a:p>
         </p:txBody>
       </p:sp>
@@ -10077,6 +9977,107 @@
           </a:prstGeom>
         </p:spPr>
       </p:pic>
+      <p:sp>
+        <p:nvSpPr>
+          <p:cNvPr id="4" name="CasellaDiTesto 3">
+            <a:extLst>
+              <a:ext uri="{FF2B5EF4-FFF2-40B4-BE49-F238E27FC236}">
+                <a16:creationId xmlns:a16="http://schemas.microsoft.com/office/drawing/2014/main" id="{F93BEF33-1711-8C99-B241-E7A9D101CF39}"/>
+              </a:ext>
+            </a:extLst>
+          </p:cNvPr>
+          <p:cNvSpPr txBox="1"/>
+          <p:nvPr/>
+        </p:nvSpPr>
+        <p:spPr>
+          <a:xfrm>
+            <a:off x="4781846" y="6482191"/>
+            <a:ext cx="3911435" cy="261610"/>
+          </a:xfrm>
+          <a:prstGeom prst="rect">
+            <a:avLst/>
+          </a:prstGeom>
+          <a:noFill/>
+        </p:spPr>
+        <p:txBody>
+          <a:bodyPr wrap="square" lIns="91440" tIns="45720" rIns="91440" bIns="45720" rtlCol="0" anchor="t">
+            <a:spAutoFit/>
+          </a:bodyPr>
+          <a:lstStyle/>
+          <a:p>
+            <a:pPr algn="r"/>
+            <a:r>
+              <a:rPr lang="it-IT" sz="1100" dirty="0">
+                <a:solidFill>
+                  <a:schemeClr val="bg1"/>
+                </a:solidFill>
+                <a:latin typeface="Segoe UI"/>
+              </a:rPr>
+              <a:t>G. </a:t>
+            </a:r>
+            <a:r>
+              <a:rPr lang="it-IT" sz="1100" err="1">
+                <a:solidFill>
+                  <a:schemeClr val="bg1"/>
+                </a:solidFill>
+                <a:latin typeface="Segoe UI"/>
+              </a:rPr>
+              <a:t>Rovesti</a:t>
+            </a:r>
+            <a:r>
+              <a:rPr lang="it-IT" sz="1100" dirty="0">
+                <a:solidFill>
+                  <a:schemeClr val="bg1"/>
+                </a:solidFill>
+                <a:latin typeface="Segoe UI"/>
+              </a:rPr>
+              <a:t> - </a:t>
+            </a:r>
+            <a:r>
+              <a:rPr lang="it-IT" sz="1100" err="1">
+                <a:solidFill>
+                  <a:schemeClr val="bg1"/>
+                </a:solidFill>
+                <a:latin typeface="Segoe UI"/>
+              </a:rPr>
+              <a:t>Designing</a:t>
+            </a:r>
+            <a:r>
+              <a:rPr lang="it-IT" sz="1100" dirty="0">
+                <a:solidFill>
+                  <a:schemeClr val="bg1"/>
+                </a:solidFill>
+                <a:latin typeface="Segoe UI"/>
+              </a:rPr>
+              <a:t> an </a:t>
+            </a:r>
+            <a:r>
+              <a:rPr lang="it-IT" sz="1100" err="1">
+                <a:solidFill>
+                  <a:schemeClr val="bg1"/>
+                </a:solidFill>
+                <a:latin typeface="Segoe UI"/>
+              </a:rPr>
+              <a:t>accessibility</a:t>
+            </a:r>
+            <a:r>
+              <a:rPr lang="it-IT" sz="1100" dirty="0">
+                <a:solidFill>
+                  <a:schemeClr val="bg1"/>
+                </a:solidFill>
+                <a:latin typeface="Segoe UI"/>
+              </a:rPr>
+              <a:t> learning toolkit</a:t>
+            </a:r>
+            <a:endParaRPr lang="it-IT" dirty="0">
+              <a:solidFill>
+                <a:schemeClr val="bg1"/>
+              </a:solidFill>
+              <a:latin typeface="Segoe UI"/>
+            </a:endParaRPr>
+          </a:p>
+        </p:txBody>
+      </p:sp>
     </p:spTree>
     <p:extLst>
       <p:ext uri="{BB962C8B-B14F-4D97-AF65-F5344CB8AC3E}">
@@ -10195,8 +10196,8 @@
         </p:nvSpPr>
         <p:spPr>
           <a:xfrm>
-            <a:off x="8302200" y="6479700"/>
-            <a:ext cx="384600" cy="378300"/>
+            <a:off x="8081863" y="6465929"/>
+            <a:ext cx="632479" cy="392071"/>
           </a:xfrm>
           <a:prstGeom prst="rect">
             <a:avLst/>
@@ -10224,107 +10225,6 @@
               <a:buNone/>
             </a:pPr>
             <a:endParaRPr/>
-          </a:p>
-        </p:txBody>
-      </p:sp>
-      <p:sp>
-        <p:nvSpPr>
-          <p:cNvPr id="23" name="CasellaDiTesto 22">
-            <a:extLst>
-              <a:ext uri="{FF2B5EF4-FFF2-40B4-BE49-F238E27FC236}">
-                <a16:creationId xmlns:a16="http://schemas.microsoft.com/office/drawing/2014/main" id="{6D1E4B38-66B6-74A6-3EC6-8FE33C8E9579}"/>
-              </a:ext>
-            </a:extLst>
-          </p:cNvPr>
-          <p:cNvSpPr txBox="1"/>
-          <p:nvPr/>
-        </p:nvSpPr>
-        <p:spPr>
-          <a:xfrm>
-            <a:off x="4781846" y="6482191"/>
-            <a:ext cx="3911435" cy="261610"/>
-          </a:xfrm>
-          <a:prstGeom prst="rect">
-            <a:avLst/>
-          </a:prstGeom>
-          <a:noFill/>
-        </p:spPr>
-        <p:txBody>
-          <a:bodyPr wrap="square" lIns="91440" tIns="45720" rIns="91440" bIns="45720" rtlCol="0" anchor="t">
-            <a:spAutoFit/>
-          </a:bodyPr>
-          <a:lstStyle/>
-          <a:p>
-            <a:pPr algn="r"/>
-            <a:r>
-              <a:rPr lang="it-IT" sz="1100" dirty="0">
-                <a:solidFill>
-                  <a:schemeClr val="bg1"/>
-                </a:solidFill>
-                <a:latin typeface="Segoe UI"/>
-              </a:rPr>
-              <a:t>G. </a:t>
-            </a:r>
-            <a:r>
-              <a:rPr lang="it-IT" sz="1100" err="1">
-                <a:solidFill>
-                  <a:schemeClr val="bg1"/>
-                </a:solidFill>
-                <a:latin typeface="Segoe UI"/>
-              </a:rPr>
-              <a:t>Rovesti</a:t>
-            </a:r>
-            <a:r>
-              <a:rPr lang="it-IT" sz="1100" dirty="0">
-                <a:solidFill>
-                  <a:schemeClr val="bg1"/>
-                </a:solidFill>
-                <a:latin typeface="Segoe UI"/>
-              </a:rPr>
-              <a:t> - </a:t>
-            </a:r>
-            <a:r>
-              <a:rPr lang="it-IT" sz="1100" err="1">
-                <a:solidFill>
-                  <a:schemeClr val="bg1"/>
-                </a:solidFill>
-                <a:latin typeface="Segoe UI"/>
-              </a:rPr>
-              <a:t>Designing</a:t>
-            </a:r>
-            <a:r>
-              <a:rPr lang="it-IT" sz="1100" dirty="0">
-                <a:solidFill>
-                  <a:schemeClr val="bg1"/>
-                </a:solidFill>
-                <a:latin typeface="Segoe UI"/>
-              </a:rPr>
-              <a:t> an </a:t>
-            </a:r>
-            <a:r>
-              <a:rPr lang="it-IT" sz="1100" err="1">
-                <a:solidFill>
-                  <a:schemeClr val="bg1"/>
-                </a:solidFill>
-                <a:latin typeface="Segoe UI"/>
-              </a:rPr>
-              <a:t>accessibility</a:t>
-            </a:r>
-            <a:r>
-              <a:rPr lang="it-IT" sz="1100" dirty="0">
-                <a:solidFill>
-                  <a:schemeClr val="bg1"/>
-                </a:solidFill>
-                <a:latin typeface="Segoe UI"/>
-              </a:rPr>
-              <a:t> learning toolkit</a:t>
-            </a:r>
-            <a:endParaRPr lang="it-IT" dirty="0">
-              <a:solidFill>
-                <a:schemeClr val="bg1"/>
-              </a:solidFill>
-              <a:latin typeface="Segoe UI"/>
-            </a:endParaRPr>
           </a:p>
         </p:txBody>
       </p:sp>
@@ -10800,6 +10700,107 @@
           </a:prstGeom>
         </p:spPr>
       </p:pic>
+      <p:sp>
+        <p:nvSpPr>
+          <p:cNvPr id="5" name="CasellaDiTesto 4">
+            <a:extLst>
+              <a:ext uri="{FF2B5EF4-FFF2-40B4-BE49-F238E27FC236}">
+                <a16:creationId xmlns:a16="http://schemas.microsoft.com/office/drawing/2014/main" id="{9E18373F-9D44-70E3-E4DA-93AFE7BF6AAC}"/>
+              </a:ext>
+            </a:extLst>
+          </p:cNvPr>
+          <p:cNvSpPr txBox="1"/>
+          <p:nvPr/>
+        </p:nvSpPr>
+        <p:spPr>
+          <a:xfrm>
+            <a:off x="4781846" y="6482191"/>
+            <a:ext cx="3911435" cy="261610"/>
+          </a:xfrm>
+          <a:prstGeom prst="rect">
+            <a:avLst/>
+          </a:prstGeom>
+          <a:noFill/>
+        </p:spPr>
+        <p:txBody>
+          <a:bodyPr wrap="square" lIns="91440" tIns="45720" rIns="91440" bIns="45720" rtlCol="0" anchor="t">
+            <a:spAutoFit/>
+          </a:bodyPr>
+          <a:lstStyle/>
+          <a:p>
+            <a:pPr algn="r"/>
+            <a:r>
+              <a:rPr lang="it-IT" sz="1100" dirty="0">
+                <a:solidFill>
+                  <a:schemeClr val="bg1"/>
+                </a:solidFill>
+                <a:latin typeface="Segoe UI"/>
+              </a:rPr>
+              <a:t>G. </a:t>
+            </a:r>
+            <a:r>
+              <a:rPr lang="it-IT" sz="1100" err="1">
+                <a:solidFill>
+                  <a:schemeClr val="bg1"/>
+                </a:solidFill>
+                <a:latin typeface="Segoe UI"/>
+              </a:rPr>
+              <a:t>Rovesti</a:t>
+            </a:r>
+            <a:r>
+              <a:rPr lang="it-IT" sz="1100" dirty="0">
+                <a:solidFill>
+                  <a:schemeClr val="bg1"/>
+                </a:solidFill>
+                <a:latin typeface="Segoe UI"/>
+              </a:rPr>
+              <a:t> - </a:t>
+            </a:r>
+            <a:r>
+              <a:rPr lang="it-IT" sz="1100" err="1">
+                <a:solidFill>
+                  <a:schemeClr val="bg1"/>
+                </a:solidFill>
+                <a:latin typeface="Segoe UI"/>
+              </a:rPr>
+              <a:t>Designing</a:t>
+            </a:r>
+            <a:r>
+              <a:rPr lang="it-IT" sz="1100" dirty="0">
+                <a:solidFill>
+                  <a:schemeClr val="bg1"/>
+                </a:solidFill>
+                <a:latin typeface="Segoe UI"/>
+              </a:rPr>
+              <a:t> an </a:t>
+            </a:r>
+            <a:r>
+              <a:rPr lang="it-IT" sz="1100" err="1">
+                <a:solidFill>
+                  <a:schemeClr val="bg1"/>
+                </a:solidFill>
+                <a:latin typeface="Segoe UI"/>
+              </a:rPr>
+              <a:t>accessibility</a:t>
+            </a:r>
+            <a:r>
+              <a:rPr lang="it-IT" sz="1100" dirty="0">
+                <a:solidFill>
+                  <a:schemeClr val="bg1"/>
+                </a:solidFill>
+                <a:latin typeface="Segoe UI"/>
+              </a:rPr>
+              <a:t> learning toolkit</a:t>
+            </a:r>
+            <a:endParaRPr lang="it-IT" dirty="0">
+              <a:solidFill>
+                <a:schemeClr val="bg1"/>
+              </a:solidFill>
+              <a:latin typeface="Segoe UI"/>
+            </a:endParaRPr>
+          </a:p>
+        </p:txBody>
+      </p:sp>
     </p:spTree>
     <p:extLst>
       <p:ext uri="{BB962C8B-B14F-4D97-AF65-F5344CB8AC3E}">
@@ -10938,8 +10939,8 @@
         </p:nvSpPr>
         <p:spPr>
           <a:xfrm>
-            <a:off x="8302200" y="6479700"/>
-            <a:ext cx="384600" cy="378300"/>
+            <a:off x="7737586" y="6479700"/>
+            <a:ext cx="976756" cy="378300"/>
           </a:xfrm>
           <a:prstGeom prst="rect">
             <a:avLst/>
@@ -10972,153 +10973,6 @@
       </p:sp>
       <p:sp>
         <p:nvSpPr>
-          <p:cNvPr id="23" name="CasellaDiTesto 22">
-            <a:extLst>
-              <a:ext uri="{FF2B5EF4-FFF2-40B4-BE49-F238E27FC236}">
-                <a16:creationId xmlns:a16="http://schemas.microsoft.com/office/drawing/2014/main" id="{033AAAAD-64F7-BAF2-433B-B03FB452E0CB}"/>
-              </a:ext>
-            </a:extLst>
-          </p:cNvPr>
-          <p:cNvSpPr txBox="1"/>
-          <p:nvPr/>
-        </p:nvSpPr>
-        <p:spPr>
-          <a:xfrm>
-            <a:off x="4781846" y="6482191"/>
-            <a:ext cx="3911435" cy="261610"/>
-          </a:xfrm>
-          <a:prstGeom prst="rect">
-            <a:avLst/>
-          </a:prstGeom>
-          <a:noFill/>
-        </p:spPr>
-        <p:txBody>
-          <a:bodyPr wrap="square" lIns="91440" tIns="45720" rIns="91440" bIns="45720" rtlCol="0" anchor="t">
-            <a:spAutoFit/>
-          </a:bodyPr>
-          <a:lstStyle/>
-          <a:p>
-            <a:pPr algn="r"/>
-            <a:r>
-              <a:rPr lang="it-IT" sz="1100" dirty="0">
-                <a:solidFill>
-                  <a:schemeClr val="bg1"/>
-                </a:solidFill>
-                <a:latin typeface="Segoe UI"/>
-              </a:rPr>
-              <a:t>G. </a:t>
-            </a:r>
-            <a:r>
-              <a:rPr lang="it-IT" sz="1100" err="1">
-                <a:solidFill>
-                  <a:schemeClr val="bg1"/>
-                </a:solidFill>
-                <a:latin typeface="Segoe UI"/>
-              </a:rPr>
-              <a:t>Rovesti</a:t>
-            </a:r>
-            <a:r>
-              <a:rPr lang="it-IT" sz="1100" dirty="0">
-                <a:solidFill>
-                  <a:schemeClr val="bg1"/>
-                </a:solidFill>
-                <a:latin typeface="Segoe UI"/>
-              </a:rPr>
-              <a:t> - </a:t>
-            </a:r>
-            <a:r>
-              <a:rPr lang="it-IT" sz="1100" err="1">
-                <a:solidFill>
-                  <a:schemeClr val="bg1"/>
-                </a:solidFill>
-                <a:latin typeface="Segoe UI"/>
-              </a:rPr>
-              <a:t>Designing</a:t>
-            </a:r>
-            <a:r>
-              <a:rPr lang="it-IT" sz="1100" dirty="0">
-                <a:solidFill>
-                  <a:schemeClr val="bg1"/>
-                </a:solidFill>
-                <a:latin typeface="Segoe UI"/>
-              </a:rPr>
-              <a:t> an </a:t>
-            </a:r>
-            <a:r>
-              <a:rPr lang="it-IT" sz="1100" err="1">
-                <a:solidFill>
-                  <a:schemeClr val="bg1"/>
-                </a:solidFill>
-                <a:latin typeface="Segoe UI"/>
-              </a:rPr>
-              <a:t>accessibility</a:t>
-            </a:r>
-            <a:r>
-              <a:rPr lang="it-IT" sz="1100" dirty="0">
-                <a:solidFill>
-                  <a:schemeClr val="bg1"/>
-                </a:solidFill>
-                <a:latin typeface="Segoe UI"/>
-              </a:rPr>
-              <a:t> learning toolkit</a:t>
-            </a:r>
-            <a:endParaRPr lang="it-IT" dirty="0">
-              <a:solidFill>
-                <a:schemeClr val="bg1"/>
-              </a:solidFill>
-              <a:latin typeface="Segoe UI"/>
-            </a:endParaRPr>
-          </a:p>
-        </p:txBody>
-      </p:sp>
-      <p:sp>
-        <p:nvSpPr>
-          <p:cNvPr id="3" name="CasellaDiTesto 2">
-            <a:extLst>
-              <a:ext uri="{FF2B5EF4-FFF2-40B4-BE49-F238E27FC236}">
-                <a16:creationId xmlns:a16="http://schemas.microsoft.com/office/drawing/2014/main" id="{68909120-0CC1-E9FA-7264-1C04913FE666}"/>
-              </a:ext>
-            </a:extLst>
-          </p:cNvPr>
-          <p:cNvSpPr txBox="1"/>
-          <p:nvPr/>
-        </p:nvSpPr>
-        <p:spPr>
-          <a:xfrm>
-            <a:off x="8477247" y="6482191"/>
-            <a:ext cx="670560" cy="261610"/>
-          </a:xfrm>
-          <a:prstGeom prst="rect">
-            <a:avLst/>
-          </a:prstGeom>
-          <a:noFill/>
-        </p:spPr>
-        <p:txBody>
-          <a:bodyPr wrap="square" lIns="91440" tIns="45720" rIns="91440" bIns="45720" rtlCol="0" anchor="t">
-            <a:spAutoFit/>
-          </a:bodyPr>
-          <a:lstStyle/>
-          <a:p>
-            <a:pPr algn="r"/>
-            <a:r>
-              <a:rPr lang="it-IT" sz="1100" dirty="0">
-                <a:solidFill>
-                  <a:schemeClr val="bg1"/>
-                </a:solidFill>
-                <a:latin typeface="Segoe UI"/>
-              </a:rPr>
-              <a:t>13/17</a:t>
-            </a:r>
-            <a:endParaRPr lang="it-IT" dirty="0">
-              <a:solidFill>
-                <a:schemeClr val="bg1"/>
-              </a:solidFill>
-            </a:endParaRPr>
-          </a:p>
-        </p:txBody>
-      </p:sp>
-      <p:sp>
-        <p:nvSpPr>
           <p:cNvPr id="4" name="CasellaDiTesto 3">
             <a:extLst>
               <a:ext uri="{FF2B5EF4-FFF2-40B4-BE49-F238E27FC236}">
@@ -11131,8 +10985,8 @@
         </p:nvSpPr>
         <p:spPr>
           <a:xfrm>
-            <a:off x="322244" y="969485"/>
-            <a:ext cx="8361801" cy="5847755"/>
+            <a:off x="349786" y="997027"/>
+            <a:ext cx="8361801" cy="5324535"/>
           </a:xfrm>
           <a:prstGeom prst="rect">
             <a:avLst/>
@@ -11370,17 +11224,7 @@
               </a:rPr>
               <a:t>Resource planning with complexity adjustments</a:t>
             </a:r>
-            <a:endParaRPr lang="en-US">
-              <a:latin typeface="Segoe UI"/>
-            </a:endParaRPr>
-          </a:p>
-          <a:p>
             <a:endParaRPr lang="en-US" dirty="0">
-              <a:latin typeface="Segoe UI"/>
-            </a:endParaRPr>
-          </a:p>
-          <a:p>
-            <a:endParaRPr lang="en-US" sz="2000" dirty="0">
               <a:latin typeface="Segoe UI"/>
             </a:endParaRPr>
           </a:p>
@@ -11416,6 +11260,153 @@
           </a:prstGeom>
         </p:spPr>
       </p:pic>
+      <p:sp>
+        <p:nvSpPr>
+          <p:cNvPr id="5" name="CasellaDiTesto 4">
+            <a:extLst>
+              <a:ext uri="{FF2B5EF4-FFF2-40B4-BE49-F238E27FC236}">
+                <a16:creationId xmlns:a16="http://schemas.microsoft.com/office/drawing/2014/main" id="{1FA9DBDD-5936-DFC2-600D-A951B7399F28}"/>
+              </a:ext>
+            </a:extLst>
+          </p:cNvPr>
+          <p:cNvSpPr txBox="1"/>
+          <p:nvPr/>
+        </p:nvSpPr>
+        <p:spPr>
+          <a:xfrm>
+            <a:off x="4781846" y="6482191"/>
+            <a:ext cx="3911435" cy="261610"/>
+          </a:xfrm>
+          <a:prstGeom prst="rect">
+            <a:avLst/>
+          </a:prstGeom>
+          <a:noFill/>
+        </p:spPr>
+        <p:txBody>
+          <a:bodyPr wrap="square" lIns="91440" tIns="45720" rIns="91440" bIns="45720" rtlCol="0" anchor="t">
+            <a:spAutoFit/>
+          </a:bodyPr>
+          <a:lstStyle/>
+          <a:p>
+            <a:pPr algn="r"/>
+            <a:r>
+              <a:rPr lang="it-IT" sz="1100" dirty="0">
+                <a:solidFill>
+                  <a:schemeClr val="bg1"/>
+                </a:solidFill>
+                <a:latin typeface="Segoe UI"/>
+              </a:rPr>
+              <a:t>G. </a:t>
+            </a:r>
+            <a:r>
+              <a:rPr lang="it-IT" sz="1100" err="1">
+                <a:solidFill>
+                  <a:schemeClr val="bg1"/>
+                </a:solidFill>
+                <a:latin typeface="Segoe UI"/>
+              </a:rPr>
+              <a:t>Rovesti</a:t>
+            </a:r>
+            <a:r>
+              <a:rPr lang="it-IT" sz="1100" dirty="0">
+                <a:solidFill>
+                  <a:schemeClr val="bg1"/>
+                </a:solidFill>
+                <a:latin typeface="Segoe UI"/>
+              </a:rPr>
+              <a:t> - </a:t>
+            </a:r>
+            <a:r>
+              <a:rPr lang="it-IT" sz="1100" err="1">
+                <a:solidFill>
+                  <a:schemeClr val="bg1"/>
+                </a:solidFill>
+                <a:latin typeface="Segoe UI"/>
+              </a:rPr>
+              <a:t>Designing</a:t>
+            </a:r>
+            <a:r>
+              <a:rPr lang="it-IT" sz="1100" dirty="0">
+                <a:solidFill>
+                  <a:schemeClr val="bg1"/>
+                </a:solidFill>
+                <a:latin typeface="Segoe UI"/>
+              </a:rPr>
+              <a:t> an </a:t>
+            </a:r>
+            <a:r>
+              <a:rPr lang="it-IT" sz="1100" err="1">
+                <a:solidFill>
+                  <a:schemeClr val="bg1"/>
+                </a:solidFill>
+                <a:latin typeface="Segoe UI"/>
+              </a:rPr>
+              <a:t>accessibility</a:t>
+            </a:r>
+            <a:r>
+              <a:rPr lang="it-IT" sz="1100" dirty="0">
+                <a:solidFill>
+                  <a:schemeClr val="bg1"/>
+                </a:solidFill>
+                <a:latin typeface="Segoe UI"/>
+              </a:rPr>
+              <a:t> learning toolkit</a:t>
+            </a:r>
+            <a:endParaRPr lang="it-IT" dirty="0">
+              <a:solidFill>
+                <a:schemeClr val="bg1"/>
+              </a:solidFill>
+              <a:latin typeface="Segoe UI"/>
+            </a:endParaRPr>
+          </a:p>
+        </p:txBody>
+      </p:sp>
+      <p:sp>
+        <p:nvSpPr>
+          <p:cNvPr id="8" name="CasellaDiTesto 7">
+            <a:extLst>
+              <a:ext uri="{FF2B5EF4-FFF2-40B4-BE49-F238E27FC236}">
+                <a16:creationId xmlns:a16="http://schemas.microsoft.com/office/drawing/2014/main" id="{02D313A1-0E48-1D32-7204-487568AB7EB8}"/>
+              </a:ext>
+            </a:extLst>
+          </p:cNvPr>
+          <p:cNvSpPr txBox="1"/>
+          <p:nvPr/>
+        </p:nvSpPr>
+        <p:spPr>
+          <a:xfrm>
+            <a:off x="8491018" y="6482191"/>
+            <a:ext cx="656789" cy="261610"/>
+          </a:xfrm>
+          <a:prstGeom prst="rect">
+            <a:avLst/>
+          </a:prstGeom>
+          <a:noFill/>
+        </p:spPr>
+        <p:txBody>
+          <a:bodyPr wrap="square" lIns="91440" tIns="45720" rIns="91440" bIns="45720" rtlCol="0" anchor="t">
+            <a:spAutoFit/>
+          </a:bodyPr>
+          <a:lstStyle/>
+          <a:p>
+            <a:pPr algn="r"/>
+            <a:r>
+              <a:rPr lang="it-IT" sz="1100" dirty="0">
+                <a:solidFill>
+                  <a:schemeClr val="bg1"/>
+                </a:solidFill>
+                <a:latin typeface="Segoe UI"/>
+              </a:rPr>
+              <a:t>12/17</a:t>
+            </a:r>
+            <a:endParaRPr lang="it-IT" dirty="0">
+              <a:solidFill>
+                <a:schemeClr val="bg1"/>
+              </a:solidFill>
+            </a:endParaRPr>
+          </a:p>
+        </p:txBody>
+      </p:sp>
     </p:spTree>
     <p:extLst>
       <p:ext uri="{BB962C8B-B14F-4D97-AF65-F5344CB8AC3E}">
@@ -12223,52 +12214,6 @@
           </a:p>
         </p:txBody>
       </p:sp>
-      <p:sp>
-        <p:nvSpPr>
-          <p:cNvPr id="3" name="CasellaDiTesto 2">
-            <a:extLst>
-              <a:ext uri="{FF2B5EF4-FFF2-40B4-BE49-F238E27FC236}">
-                <a16:creationId xmlns:a16="http://schemas.microsoft.com/office/drawing/2014/main" id="{E970368A-6D6E-29DC-CC30-86AF7852C5B4}"/>
-              </a:ext>
-            </a:extLst>
-          </p:cNvPr>
-          <p:cNvSpPr txBox="1"/>
-          <p:nvPr/>
-        </p:nvSpPr>
-        <p:spPr>
-          <a:xfrm>
-            <a:off x="8518560" y="6495962"/>
-            <a:ext cx="629247" cy="261610"/>
-          </a:xfrm>
-          <a:prstGeom prst="rect">
-            <a:avLst/>
-          </a:prstGeom>
-          <a:noFill/>
-        </p:spPr>
-        <p:txBody>
-          <a:bodyPr wrap="square" lIns="91440" tIns="45720" rIns="91440" bIns="45720" rtlCol="0" anchor="t">
-            <a:spAutoFit/>
-          </a:bodyPr>
-          <a:lstStyle/>
-          <a:p>
-            <a:pPr algn="r"/>
-            <a:r>
-              <a:rPr lang="it-IT" sz="1100" dirty="0">
-                <a:solidFill>
-                  <a:schemeClr val="bg1"/>
-                </a:solidFill>
-                <a:latin typeface="Segoe UI"/>
-              </a:rPr>
-              <a:t>15/17</a:t>
-            </a:r>
-            <a:endParaRPr lang="it-IT" dirty="0">
-              <a:solidFill>
-                <a:schemeClr val="bg1"/>
-              </a:solidFill>
-            </a:endParaRPr>
-          </a:p>
-        </p:txBody>
-      </p:sp>
       <p:pic>
         <p:nvPicPr>
           <p:cNvPr id="4" name="Immagine 3" descr="Immagine che contiene testo, schermata, Carattere, numero&#10;&#10;Il contenuto generato dall&amp;#39;IA potrebbe non essere corretto.">
@@ -12413,6 +12358,52 @@
               <a:t>: React Native scores higher across all component types</a:t>
             </a:r>
             <a:endParaRPr lang="en-US"/>
+          </a:p>
+        </p:txBody>
+      </p:sp>
+      <p:sp>
+        <p:nvSpPr>
+          <p:cNvPr id="6" name="CasellaDiTesto 5">
+            <a:extLst>
+              <a:ext uri="{FF2B5EF4-FFF2-40B4-BE49-F238E27FC236}">
+                <a16:creationId xmlns:a16="http://schemas.microsoft.com/office/drawing/2014/main" id="{A5AA00A2-BB66-B415-2650-72E84B660058}"/>
+              </a:ext>
+            </a:extLst>
+          </p:cNvPr>
+          <p:cNvSpPr txBox="1"/>
+          <p:nvPr/>
+        </p:nvSpPr>
+        <p:spPr>
+          <a:xfrm>
+            <a:off x="8538371" y="6482191"/>
+            <a:ext cx="609436" cy="261610"/>
+          </a:xfrm>
+          <a:prstGeom prst="rect">
+            <a:avLst/>
+          </a:prstGeom>
+          <a:noFill/>
+        </p:spPr>
+        <p:txBody>
+          <a:bodyPr wrap="square" lIns="91440" tIns="45720" rIns="91440" bIns="45720" rtlCol="0" anchor="t">
+            <a:spAutoFit/>
+          </a:bodyPr>
+          <a:lstStyle/>
+          <a:p>
+            <a:pPr algn="r"/>
+            <a:r>
+              <a:rPr lang="it-IT" sz="1100" dirty="0">
+                <a:solidFill>
+                  <a:schemeClr val="bg1"/>
+                </a:solidFill>
+                <a:latin typeface="Segoe UI"/>
+              </a:rPr>
+              <a:t>15/17</a:t>
+            </a:r>
+            <a:endParaRPr lang="it-IT" dirty="0">
+              <a:solidFill>
+                <a:schemeClr val="bg1"/>
+              </a:solidFill>
+            </a:endParaRPr>
           </a:p>
         </p:txBody>
       </p:sp>
@@ -13851,107 +13842,6 @@
           </a:p>
         </p:txBody>
       </p:sp>
-      <p:sp>
-        <p:nvSpPr>
-          <p:cNvPr id="23" name="CasellaDiTesto 22">
-            <a:extLst>
-              <a:ext uri="{FF2B5EF4-FFF2-40B4-BE49-F238E27FC236}">
-                <a16:creationId xmlns:a16="http://schemas.microsoft.com/office/drawing/2014/main" id="{AF603ACE-A4D0-C670-23C2-8C6330CFDDF7}"/>
-              </a:ext>
-            </a:extLst>
-          </p:cNvPr>
-          <p:cNvSpPr txBox="1"/>
-          <p:nvPr/>
-        </p:nvSpPr>
-        <p:spPr>
-          <a:xfrm>
-            <a:off x="4781846" y="6482191"/>
-            <a:ext cx="3911435" cy="261610"/>
-          </a:xfrm>
-          <a:prstGeom prst="rect">
-            <a:avLst/>
-          </a:prstGeom>
-          <a:noFill/>
-        </p:spPr>
-        <p:txBody>
-          <a:bodyPr wrap="square" lIns="91440" tIns="45720" rIns="91440" bIns="45720" rtlCol="0" anchor="t">
-            <a:spAutoFit/>
-          </a:bodyPr>
-          <a:lstStyle/>
-          <a:p>
-            <a:pPr algn="r"/>
-            <a:r>
-              <a:rPr lang="it-IT" sz="1100" dirty="0">
-                <a:solidFill>
-                  <a:schemeClr val="bg1"/>
-                </a:solidFill>
-                <a:latin typeface="Segoe UI"/>
-              </a:rPr>
-              <a:t>G. </a:t>
-            </a:r>
-            <a:r>
-              <a:rPr lang="it-IT" sz="1100" err="1">
-                <a:solidFill>
-                  <a:schemeClr val="bg1"/>
-                </a:solidFill>
-                <a:latin typeface="Segoe UI"/>
-              </a:rPr>
-              <a:t>Rovesti</a:t>
-            </a:r>
-            <a:r>
-              <a:rPr lang="it-IT" sz="1100" dirty="0">
-                <a:solidFill>
-                  <a:schemeClr val="bg1"/>
-                </a:solidFill>
-                <a:latin typeface="Segoe UI"/>
-              </a:rPr>
-              <a:t> - </a:t>
-            </a:r>
-            <a:r>
-              <a:rPr lang="it-IT" sz="1100" err="1">
-                <a:solidFill>
-                  <a:schemeClr val="bg1"/>
-                </a:solidFill>
-                <a:latin typeface="Segoe UI"/>
-              </a:rPr>
-              <a:t>Designing</a:t>
-            </a:r>
-            <a:r>
-              <a:rPr lang="it-IT" sz="1100" dirty="0">
-                <a:solidFill>
-                  <a:schemeClr val="bg1"/>
-                </a:solidFill>
-                <a:latin typeface="Segoe UI"/>
-              </a:rPr>
-              <a:t> an </a:t>
-            </a:r>
-            <a:r>
-              <a:rPr lang="it-IT" sz="1100" err="1">
-                <a:solidFill>
-                  <a:schemeClr val="bg1"/>
-                </a:solidFill>
-                <a:latin typeface="Segoe UI"/>
-              </a:rPr>
-              <a:t>accessibility</a:t>
-            </a:r>
-            <a:r>
-              <a:rPr lang="it-IT" sz="1100" dirty="0">
-                <a:solidFill>
-                  <a:schemeClr val="bg1"/>
-                </a:solidFill>
-                <a:latin typeface="Segoe UI"/>
-              </a:rPr>
-              <a:t> learning toolkit</a:t>
-            </a:r>
-            <a:endParaRPr lang="it-IT" dirty="0">
-              <a:solidFill>
-                <a:schemeClr val="bg1"/>
-              </a:solidFill>
-              <a:latin typeface="Segoe UI"/>
-            </a:endParaRPr>
-          </a:p>
-        </p:txBody>
-      </p:sp>
       <p:pic>
         <p:nvPicPr>
           <p:cNvPr id="5" name="Immagine 4" descr="Accessibility and Its Role in Modern Web Design | PDD">
@@ -14014,10 +13904,111 @@
       </p:pic>
       <p:sp>
         <p:nvSpPr>
-          <p:cNvPr id="2" name="CasellaDiTesto 1">
+          <p:cNvPr id="15" name="CasellaDiTesto 14">
             <a:extLst>
               <a:ext uri="{FF2B5EF4-FFF2-40B4-BE49-F238E27FC236}">
-                <a16:creationId xmlns:a16="http://schemas.microsoft.com/office/drawing/2014/main" id="{C9E53E83-E1B8-6D20-F495-DDBD1FF2EBAF}"/>
+                <a16:creationId xmlns:a16="http://schemas.microsoft.com/office/drawing/2014/main" id="{02E3ACB9-97AA-EDB0-7E53-F2DD684E6A09}"/>
+              </a:ext>
+            </a:extLst>
+          </p:cNvPr>
+          <p:cNvSpPr txBox="1"/>
+          <p:nvPr/>
+        </p:nvSpPr>
+        <p:spPr>
+          <a:xfrm>
+            <a:off x="4781846" y="6482191"/>
+            <a:ext cx="3911435" cy="261610"/>
+          </a:xfrm>
+          <a:prstGeom prst="rect">
+            <a:avLst/>
+          </a:prstGeom>
+          <a:noFill/>
+        </p:spPr>
+        <p:txBody>
+          <a:bodyPr wrap="square" lIns="91440" tIns="45720" rIns="91440" bIns="45720" rtlCol="0" anchor="t">
+            <a:spAutoFit/>
+          </a:bodyPr>
+          <a:lstStyle/>
+          <a:p>
+            <a:pPr algn="r"/>
+            <a:r>
+              <a:rPr lang="it-IT" sz="1100" dirty="0">
+                <a:solidFill>
+                  <a:schemeClr val="bg1"/>
+                </a:solidFill>
+                <a:latin typeface="Segoe UI"/>
+              </a:rPr>
+              <a:t>G. </a:t>
+            </a:r>
+            <a:r>
+              <a:rPr lang="it-IT" sz="1100" err="1">
+                <a:solidFill>
+                  <a:schemeClr val="bg1"/>
+                </a:solidFill>
+                <a:latin typeface="Segoe UI"/>
+              </a:rPr>
+              <a:t>Rovesti</a:t>
+            </a:r>
+            <a:r>
+              <a:rPr lang="it-IT" sz="1100" dirty="0">
+                <a:solidFill>
+                  <a:schemeClr val="bg1"/>
+                </a:solidFill>
+                <a:latin typeface="Segoe UI"/>
+              </a:rPr>
+              <a:t> - </a:t>
+            </a:r>
+            <a:r>
+              <a:rPr lang="it-IT" sz="1100" err="1">
+                <a:solidFill>
+                  <a:schemeClr val="bg1"/>
+                </a:solidFill>
+                <a:latin typeface="Segoe UI"/>
+              </a:rPr>
+              <a:t>Designing</a:t>
+            </a:r>
+            <a:r>
+              <a:rPr lang="it-IT" sz="1100" dirty="0">
+                <a:solidFill>
+                  <a:schemeClr val="bg1"/>
+                </a:solidFill>
+                <a:latin typeface="Segoe UI"/>
+              </a:rPr>
+              <a:t> an </a:t>
+            </a:r>
+            <a:r>
+              <a:rPr lang="it-IT" sz="1100" err="1">
+                <a:solidFill>
+                  <a:schemeClr val="bg1"/>
+                </a:solidFill>
+                <a:latin typeface="Segoe UI"/>
+              </a:rPr>
+              <a:t>accessibility</a:t>
+            </a:r>
+            <a:r>
+              <a:rPr lang="it-IT" sz="1100" dirty="0">
+                <a:solidFill>
+                  <a:schemeClr val="bg1"/>
+                </a:solidFill>
+                <a:latin typeface="Segoe UI"/>
+              </a:rPr>
+              <a:t> learning toolkit</a:t>
+            </a:r>
+            <a:endParaRPr lang="it-IT" dirty="0">
+              <a:solidFill>
+                <a:schemeClr val="bg1"/>
+              </a:solidFill>
+              <a:latin typeface="Segoe UI"/>
+            </a:endParaRPr>
+          </a:p>
+        </p:txBody>
+      </p:sp>
+      <p:sp>
+        <p:nvSpPr>
+          <p:cNvPr id="17" name="CasellaDiTesto 16">
+            <a:extLst>
+              <a:ext uri="{FF2B5EF4-FFF2-40B4-BE49-F238E27FC236}">
+                <a16:creationId xmlns:a16="http://schemas.microsoft.com/office/drawing/2014/main" id="{692DEFCB-D513-1CAA-0CD1-ED611DD0E742}"/>
               </a:ext>
             </a:extLst>
           </p:cNvPr>
@@ -14663,61 +14654,7 @@
                 </a:solidFill>
                 <a:latin typeface="Segoe UI"/>
               </a:rPr>
-              <a:t>G. </a:t>
-            </a:r>
-            <a:r>
-              <a:rPr lang="it-IT" sz="1100" err="1">
-                <a:solidFill>
-                  <a:schemeClr val="bg1"/>
-                </a:solidFill>
-                <a:latin typeface="Segoe UI"/>
-              </a:rPr>
-              <a:t>Rovesti</a:t>
-            </a:r>
-            <a:r>
-              <a:rPr lang="it-IT" sz="1100" dirty="0">
-                <a:solidFill>
-                  <a:schemeClr val="bg1"/>
-                </a:solidFill>
-                <a:latin typeface="Segoe UI"/>
-              </a:rPr>
-              <a:t> - </a:t>
-            </a:r>
-            <a:r>
-              <a:rPr lang="it-IT" sz="1100" err="1">
-                <a:solidFill>
-                  <a:schemeClr val="bg1"/>
-                </a:solidFill>
-                <a:latin typeface="Segoe UI"/>
-              </a:rPr>
-              <a:t>Designing</a:t>
-            </a:r>
-            <a:r>
-              <a:rPr lang="it-IT" sz="1100" dirty="0">
-                <a:solidFill>
-                  <a:schemeClr val="bg1"/>
-                </a:solidFill>
-                <a:latin typeface="Segoe UI"/>
-              </a:rPr>
-              <a:t> an </a:t>
-            </a:r>
-            <a:r>
-              <a:rPr lang="it-IT" sz="1100" err="1">
-                <a:solidFill>
-                  <a:schemeClr val="bg1"/>
-                </a:solidFill>
-                <a:latin typeface="Segoe UI"/>
-              </a:rPr>
-              <a:t>accessibility</a:t>
-            </a:r>
-            <a:r>
-              <a:rPr lang="it-IT" sz="1100" dirty="0">
-                <a:solidFill>
-                  <a:schemeClr val="bg1"/>
-                </a:solidFill>
-                <a:latin typeface="Segoe UI"/>
-              </a:rPr>
-              <a:t> learning toolkit</a:t>
+              <a:t>G. Rovesti - Designing an accessibility learning toolkit</a:t>
             </a:r>
             <a:endParaRPr lang="it-IT" dirty="0">
               <a:solidFill>
@@ -14790,10 +14727,10 @@
       </p:pic>
       <p:sp>
         <p:nvSpPr>
-          <p:cNvPr id="8" name="CasellaDiTesto 7">
+          <p:cNvPr id="5" name="CasellaDiTesto 4">
             <a:extLst>
               <a:ext uri="{FF2B5EF4-FFF2-40B4-BE49-F238E27FC236}">
-                <a16:creationId xmlns:a16="http://schemas.microsoft.com/office/drawing/2014/main" id="{C476ADA0-C76E-3DD8-5E59-706BBA772DBD}"/>
+                <a16:creationId xmlns:a16="http://schemas.microsoft.com/office/drawing/2014/main" id="{69A2056E-62FA-1A95-A766-83C19185F9BE}"/>
               </a:ext>
             </a:extLst>
           </p:cNvPr>
@@ -14802,8 +14739,8 @@
         </p:nvSpPr>
         <p:spPr>
           <a:xfrm>
-            <a:off x="8511634" y="6455455"/>
-            <a:ext cx="636173" cy="261610"/>
+            <a:off x="8538371" y="6482191"/>
+            <a:ext cx="609436" cy="261610"/>
           </a:xfrm>
           <a:prstGeom prst="rect">
             <a:avLst/>
@@ -15664,10 +15601,10 @@
       </p:pic>
       <p:sp>
         <p:nvSpPr>
-          <p:cNvPr id="5" name="CasellaDiTesto 4">
+          <p:cNvPr id="6" name="CasellaDiTesto 5">
             <a:extLst>
               <a:ext uri="{FF2B5EF4-FFF2-40B4-BE49-F238E27FC236}">
-                <a16:creationId xmlns:a16="http://schemas.microsoft.com/office/drawing/2014/main" id="{45049497-DD10-9673-22EC-A8EED98CC191}"/>
+                <a16:creationId xmlns:a16="http://schemas.microsoft.com/office/drawing/2014/main" id="{A5330E72-86C3-D0C4-A0E1-91315405442C}"/>
               </a:ext>
             </a:extLst>
           </p:cNvPr>
@@ -15676,8 +15613,8 @@
         </p:nvSpPr>
         <p:spPr>
           <a:xfrm>
-            <a:off x="8525004" y="6495559"/>
-            <a:ext cx="622803" cy="261610"/>
+            <a:off x="8538371" y="6482191"/>
+            <a:ext cx="609436" cy="261610"/>
           </a:xfrm>
           <a:prstGeom prst="rect">
             <a:avLst/>
@@ -16455,10 +16392,10 @@
       </p:pic>
       <p:sp>
         <p:nvSpPr>
-          <p:cNvPr id="5" name="CasellaDiTesto 4">
+          <p:cNvPr id="6" name="CasellaDiTesto 5">
             <a:extLst>
               <a:ext uri="{FF2B5EF4-FFF2-40B4-BE49-F238E27FC236}">
-                <a16:creationId xmlns:a16="http://schemas.microsoft.com/office/drawing/2014/main" id="{59F4B896-E913-5EC7-0225-F20899A7626E}"/>
+                <a16:creationId xmlns:a16="http://schemas.microsoft.com/office/drawing/2014/main" id="{A6781579-6834-9946-EAF5-54A6A734B96A}"/>
               </a:ext>
             </a:extLst>
           </p:cNvPr>
@@ -16467,8 +16404,8 @@
         </p:nvSpPr>
         <p:spPr>
           <a:xfrm>
-            <a:off x="8498266" y="6495559"/>
-            <a:ext cx="649541" cy="261610"/>
+            <a:off x="8538371" y="6482191"/>
+            <a:ext cx="609436" cy="261610"/>
           </a:xfrm>
           <a:prstGeom prst="rect">
             <a:avLst/>
@@ -18147,10 +18084,10 @@
       </p:pic>
       <p:sp>
         <p:nvSpPr>
-          <p:cNvPr id="17" name="CasellaDiTesto 16">
+          <p:cNvPr id="3" name="CasellaDiTesto 2">
             <a:extLst>
               <a:ext uri="{FF2B5EF4-FFF2-40B4-BE49-F238E27FC236}">
-                <a16:creationId xmlns:a16="http://schemas.microsoft.com/office/drawing/2014/main" id="{B2D8B8B4-D3EC-2977-296E-2041569AD074}"/>
+                <a16:creationId xmlns:a16="http://schemas.microsoft.com/office/drawing/2014/main" id="{F590BC50-3610-7B20-EAF0-8D1936482577}"/>
               </a:ext>
             </a:extLst>
           </p:cNvPr>
@@ -18159,8 +18096,8 @@
         </p:nvSpPr>
         <p:spPr>
           <a:xfrm>
-            <a:off x="8525003" y="6495559"/>
-            <a:ext cx="622804" cy="261610"/>
+            <a:off x="8538371" y="6482191"/>
+            <a:ext cx="609436" cy="261610"/>
           </a:xfrm>
           <a:prstGeom prst="rect">
             <a:avLst/>

</xml_diff>

<commit_message>
Slight fixes from supervisor mail
</commit_message>
<xml_diff>
--- a/Thesis Presentation/Presentation Gabriel Rovesti.pptx
+++ b/Thesis Presentation/Presentation Gabriel Rovesti.pptx
@@ -260,9 +260,8 @@
 <file path=ppt/revisionInfo.xml><?xml version="1.0" encoding="utf-8"?>
 <p1510:revInfo xmlns:a="http://schemas.openxmlformats.org/drawingml/2006/main" xmlns:r="http://schemas.openxmlformats.org/officeDocument/2006/relationships" xmlns:p1510="http://schemas.microsoft.com/office/powerpoint/2015/10/main">
   <p1510:revLst>
-    <p1510:client id="{625D73A8-2971-33D0-7F96-EA3FA7DFDCDD}" v="152" dt="2025-07-07T17:42:36.729"/>
-    <p1510:client id="{63ABD6D2-6AA7-A9AD-CFE8-E7CF9E0D030A}" v="622" dt="2025-07-07T17:03:40.833"/>
-    <p1510:client id="{CF76EE9D-CBDD-9B20-5D03-D1C89A151C1B}" v="161" dt="2025-07-08T07:35:57.076"/>
+    <p1510:client id="{1D759D07-F260-6530-72C1-4EC9929CCA64}" v="158" dt="2025-07-09T14:45:12.816"/>
+    <p1510:client id="{41ACB71F-2355-3F93-36AD-B2AF0FA0873D}" v="85" dt="2025-07-11T12:59:37.305"/>
   </p1510:revLst>
 </p1510:revInfo>
 </file>
@@ -361,7 +360,7 @@
           <a:p>
             <a:fld id="{6469F890-3609-4E18-B68A-510CF7125ACB}" type="datetimeFigureOut">
               <a:rPr lang="it-IT" smtClean="0"/>
-              <a:t>08/07/2025</a:t>
+              <a:t>11/07/2025</a:t>
             </a:fld>
             <a:endParaRPr lang="it-IT"/>
           </a:p>
@@ -9485,9 +9484,9 @@
                 <a:latin typeface="Segoe UI"/>
                 <a:ea typeface="Calibri"/>
               </a:rPr>
-              <a:t> </a:t>
-            </a:r>
-            <a:endParaRPr lang="it-IT" sz="1800">
+              <a:t> – ID: 2103389</a:t>
+            </a:r>
+            <a:endParaRPr lang="it-IT" sz="1800" dirty="0">
               <a:latin typeface="Segoe UI"/>
               <a:ea typeface="Calibri"/>
             </a:endParaRPr>
@@ -13195,39 +13194,63 @@
             </a:endParaRPr>
           </a:p>
           <a:p>
+            <a:pPr marL="342900" indent="-342900">
+              <a:buFont typeface="Arial"/>
+              <a:buChar char="•"/>
+            </a:pPr>
             <a:r>
               <a:rPr lang="en-US" sz="2000" dirty="0">
                 <a:latin typeface="Segoe UI"/>
+              </a:rPr>
+              <a:t>Extended</a:t>
+            </a:r>
+            <a:r>
+              <a:rPr lang="en-US" sz="2000" dirty="0">
+                <a:latin typeface="Segoe UI"/>
                 <a:cs typeface="Segoe UI"/>
               </a:rPr>
-              <a:t>- Extended research framework from Flutter-only to comparative analysis</a:t>
+              <a:t> research framework from Flutter-only to comparative analysis</a:t>
             </a:r>
             <a:endParaRPr lang="en-US" dirty="0"/>
           </a:p>
           <a:p>
+            <a:pPr marL="342900" indent="-342900">
+              <a:buFont typeface="Arial"/>
+              <a:buChar char="•"/>
+            </a:pPr>
             <a:r>
               <a:rPr lang="en-US" sz="2000" dirty="0">
                 <a:latin typeface="Segoe UI"/>
               </a:rPr>
-              <a:t>- First quantitative framework for mobile accessibility cost assessment  </a:t>
+              <a:t>First quantitative framework for mobile accessibility cost assessment  </a:t>
             </a:r>
             <a:endParaRPr lang="en-US" dirty="0"/>
           </a:p>
           <a:p>
+            <a:pPr marL="800100" lvl="1" indent="-342900">
+              <a:buFont typeface="Courier New"/>
+              <a:buChar char="o"/>
+            </a:pPr>
             <a:r>
               <a:rPr lang="en-US" sz="2000" dirty="0">
                 <a:latin typeface="Segoe UI"/>
               </a:rPr>
-              <a:t>- 45% implementation overhead reduction with React Native</a:t>
-            </a:r>
-          </a:p>
-          <a:p>
+              <a:t>45% implementation overhead reduction with React Native</a:t>
+            </a:r>
+            <a:endParaRPr lang="en-US" dirty="0"/>
+          </a:p>
+          <a:p>
+            <a:pPr marL="342900" indent="-342900">
+              <a:buFont typeface="Arial"/>
+              <a:buChar char="•"/>
+            </a:pPr>
             <a:r>
               <a:rPr lang="en-US" sz="2000" dirty="0">
                 <a:latin typeface="Segoe UI"/>
               </a:rPr>
-              <a:t>- Systematic methodology bridging WCAG theory to mobile practice</a:t>
-            </a:r>
+              <a:t>Systematic methodology bridging WCAG theory to mobile practice</a:t>
+            </a:r>
+            <a:endParaRPr lang="en-US" dirty="0"/>
           </a:p>
           <a:p>
             <a:endParaRPr lang="en-US" sz="2000" dirty="0">
@@ -13243,71 +13266,62 @@
             </a:r>
           </a:p>
           <a:p>
+            <a:pPr marL="342900" indent="-342900">
+              <a:buFont typeface="Arial"/>
+              <a:buChar char="•"/>
+            </a:pPr>
+            <a:r>
+              <a:rPr lang="en-US" sz="2000" b="1" dirty="0">
+                <a:latin typeface="Segoe UI"/>
+              </a:rPr>
+              <a:t>RQ1</a:t>
+            </a:r>
             <a:r>
               <a:rPr lang="en-US" sz="2000" dirty="0">
                 <a:latin typeface="Segoe UI"/>
               </a:rPr>
-              <a:t>- </a:t>
-            </a:r>
+              <a:t>: No framework accessible by default (38% vs 32%) </a:t>
+            </a:r>
+          </a:p>
+          <a:p>
+            <a:pPr marL="342900" indent="-342900">
+              <a:buFont typeface="Arial"/>
+              <a:buChar char="•"/>
+            </a:pPr>
             <a:r>
               <a:rPr lang="en-US" sz="2000" b="1" dirty="0">
                 <a:latin typeface="Segoe UI"/>
               </a:rPr>
-              <a:t>RQ1</a:t>
+              <a:t>RQ2</a:t>
             </a:r>
             <a:r>
               <a:rPr lang="en-US" sz="2000" dirty="0">
                 <a:latin typeface="Segoe UI"/>
               </a:rPr>
-              <a:t>: Neither framework accessible by default (38% vs 32%) </a:t>
-            </a:r>
-            <a:endParaRPr lang="en-US" sz="2000">
+              <a:t>: Both achieve 100% WCAG compliance with proper implementation </a:t>
+            </a:r>
+            <a:endParaRPr lang="en-US">
               <a:latin typeface="Segoe UI"/>
             </a:endParaRPr>
           </a:p>
           <a:p>
+            <a:pPr marL="342900" indent="-342900">
+              <a:buFont typeface="Arial"/>
+              <a:buChar char="•"/>
+            </a:pPr>
+            <a:r>
+              <a:rPr lang="en-US" sz="2000" b="1" dirty="0">
+                <a:latin typeface="Segoe UI"/>
+              </a:rPr>
+              <a:t>RQ3</a:t>
+            </a:r>
             <a:r>
               <a:rPr lang="en-US" sz="2000" dirty="0">
                 <a:latin typeface="Segoe UI"/>
               </a:rPr>
-              <a:t>- </a:t>
-            </a:r>
-            <a:r>
-              <a:rPr lang="en-US" sz="2000" b="1" dirty="0">
-                <a:latin typeface="Segoe UI"/>
-              </a:rPr>
-              <a:t>RQ2</a:t>
-            </a:r>
-            <a:r>
-              <a:rPr lang="en-US" sz="2000" dirty="0">
-                <a:latin typeface="Segoe UI"/>
-              </a:rPr>
-              <a:t>: Both achieve 100% WCAG compliance with proper implementation </a:t>
-            </a:r>
-            <a:endParaRPr lang="en-US" sz="2000">
-              <a:latin typeface="Segoe UI"/>
-            </a:endParaRPr>
-          </a:p>
-          <a:p>
-            <a:r>
-              <a:rPr lang="en-US" sz="2000" dirty="0">
-                <a:latin typeface="Segoe UI"/>
-              </a:rPr>
-              <a:t>- </a:t>
-            </a:r>
-            <a:r>
-              <a:rPr lang="en-US" sz="2000" b="1" dirty="0">
-                <a:latin typeface="Segoe UI"/>
-              </a:rPr>
-              <a:t>RQ3</a:t>
-            </a:r>
-            <a:r>
-              <a:rPr lang="en-US" sz="2000" dirty="0">
-                <a:latin typeface="Segoe UI"/>
-              </a:rPr>
               <a:t>: React Native requires 45% less code for equivalent accessibility</a:t>
             </a:r>
-            <a:endParaRPr lang="en-US">
+            <a:endParaRPr lang="en-US" dirty="0">
               <a:latin typeface="Segoe UI"/>
             </a:endParaRPr>
           </a:p>
@@ -13405,91 +13419,6 @@
       </p:grpSpPr>
       <p:sp>
         <p:nvSpPr>
-          <p:cNvPr id="99" name="Shape 99"/>
-          <p:cNvSpPr txBox="1">
-            <a:spLocks noGrp="1"/>
-          </p:cNvSpPr>
-          <p:nvPr>
-            <p:ph type="title" idx="4294967295"/>
-          </p:nvPr>
-        </p:nvSpPr>
-        <p:spPr>
-          <a:xfrm>
-            <a:off x="457200" y="-182567"/>
-            <a:ext cx="6750237" cy="1261540"/>
-          </a:xfrm>
-          <a:prstGeom prst="rect">
-            <a:avLst/>
-          </a:prstGeom>
-        </p:spPr>
-        <p:txBody>
-          <a:bodyPr spcFirstLastPara="1" wrap="square" lIns="82925" tIns="82925" rIns="82925" bIns="82925" anchor="ctr" anchorCtr="0">
-            <a:noAutofit/>
-          </a:bodyPr>
-          <a:lstStyle/>
-          <a:p>
-            <a:pPr indent="0">
-              <a:buNone/>
-            </a:pPr>
-            <a:r>
-              <a:rPr lang="it-IT" sz="3000" dirty="0">
-                <a:solidFill>
-                  <a:srgbClr val="FFFFFF"/>
-                </a:solidFill>
-                <a:latin typeface="Segoe UI"/>
-              </a:rPr>
-              <a:t>First and </a:t>
-            </a:r>
-            <a:r>
-              <a:rPr lang="it-IT" sz="3000" dirty="0" err="1">
-                <a:solidFill>
-                  <a:srgbClr val="FFFFFF"/>
-                </a:solidFill>
-                <a:latin typeface="Segoe UI"/>
-              </a:rPr>
-              <a:t>not</a:t>
-            </a:r>
-            <a:r>
-              <a:rPr lang="it-IT" sz="3000" dirty="0">
-                <a:solidFill>
-                  <a:srgbClr val="FFFFFF"/>
-                </a:solidFill>
-                <a:latin typeface="Segoe UI"/>
-              </a:rPr>
-              <a:t> </a:t>
-            </a:r>
-            <a:r>
-              <a:rPr lang="it-IT" sz="3000" dirty="0" err="1">
-                <a:solidFill>
-                  <a:srgbClr val="FFFFFF"/>
-                </a:solidFill>
-                <a:latin typeface="Segoe UI"/>
-              </a:rPr>
-              <a:t>least</a:t>
-            </a:r>
-            <a:r>
-              <a:rPr lang="it-IT" sz="3000" dirty="0">
-                <a:solidFill>
-                  <a:srgbClr val="FFFFFF"/>
-                </a:solidFill>
-                <a:latin typeface="Segoe UI"/>
-              </a:rPr>
-              <a:t>: Mobile </a:t>
-            </a:r>
-            <a:r>
-              <a:rPr lang="it-IT" sz="3000" dirty="0" err="1">
-                <a:solidFill>
-                  <a:srgbClr val="FFFFFF"/>
-                </a:solidFill>
-                <a:latin typeface="Segoe UI"/>
-              </a:rPr>
-              <a:t>accessibility</a:t>
-            </a:r>
-          </a:p>
-        </p:txBody>
-      </p:sp>
-      <p:sp>
-        <p:nvSpPr>
           <p:cNvPr id="101" name="Shape 101"/>
           <p:cNvSpPr/>
           <p:nvPr/>
@@ -14049,6 +13978,246 @@
           </a:p>
         </p:txBody>
       </p:sp>
+      <p:sp>
+        <p:nvSpPr>
+          <p:cNvPr id="20" name="Shape 99">
+            <a:extLst>
+              <a:ext uri="{FF2B5EF4-FFF2-40B4-BE49-F238E27FC236}">
+                <a16:creationId xmlns:a16="http://schemas.microsoft.com/office/drawing/2014/main" id="{8A0F8872-BF75-949E-0A25-96FFB1B80E6A}"/>
+              </a:ext>
+            </a:extLst>
+          </p:cNvPr>
+          <p:cNvSpPr txBox="1">
+            <a:spLocks/>
+          </p:cNvSpPr>
+          <p:nvPr/>
+        </p:nvSpPr>
+        <p:spPr>
+          <a:xfrm>
+            <a:off x="457200" y="-182567"/>
+            <a:ext cx="6714148" cy="1225926"/>
+          </a:xfrm>
+          <a:prstGeom prst="rect">
+            <a:avLst/>
+          </a:prstGeom>
+          <a:noFill/>
+          <a:ln>
+            <a:noFill/>
+          </a:ln>
+        </p:spPr>
+        <p:txBody>
+          <a:bodyPr spcFirstLastPara="1" wrap="square" lIns="82925" tIns="82925" rIns="82925" bIns="82925" anchor="ctr" anchorCtr="0">
+            <a:noAutofit/>
+          </a:bodyPr>
+          <a:lstStyle>
+            <a:defPPr marR="0" lvl="0" algn="l" rtl="0">
+              <a:lnSpc>
+                <a:spcPct val="100000"/>
+              </a:lnSpc>
+              <a:spcBef>
+                <a:spcPts val="0"/>
+              </a:spcBef>
+              <a:spcAft>
+                <a:spcPts val="0"/>
+              </a:spcAft>
+            </a:defPPr>
+            <a:lvl1pPr marL="0" marR="0" lvl="0" indent="-82550" algn="l" rtl="0" eaLnBrk="1" hangingPunct="1">
+              <a:lnSpc>
+                <a:spcPct val="93000"/>
+              </a:lnSpc>
+              <a:spcBef>
+                <a:spcPts val="0"/>
+              </a:spcBef>
+              <a:spcAft>
+                <a:spcPts val="0"/>
+              </a:spcAft>
+              <a:buSzPts val="1300"/>
+              <a:buChar char="●"/>
+              <a:defRPr sz="1300" b="0" i="0" u="none" strike="noStrike" cap="none">
+                <a:solidFill>
+                  <a:srgbClr val="000000"/>
+                </a:solidFill>
+                <a:latin typeface="Arial"/>
+                <a:ea typeface="Arial"/>
+                <a:cs typeface="Arial"/>
+                <a:sym typeface="Arial"/>
+              </a:defRPr>
+            </a:lvl1pPr>
+            <a:lvl2pPr marL="673100" marR="0" lvl="1" indent="-336550" algn="l" rtl="0">
+              <a:lnSpc>
+                <a:spcPct val="93000"/>
+              </a:lnSpc>
+              <a:spcBef>
+                <a:spcPts val="0"/>
+              </a:spcBef>
+              <a:spcAft>
+                <a:spcPts val="0"/>
+              </a:spcAft>
+              <a:buSzPts val="1300"/>
+              <a:buChar char="○"/>
+              <a:defRPr sz="1300"/>
+            </a:lvl2pPr>
+            <a:lvl3pPr marL="1041400" marR="0" lvl="2" indent="-298450" algn="l" rtl="0">
+              <a:lnSpc>
+                <a:spcPct val="93000"/>
+              </a:lnSpc>
+              <a:spcBef>
+                <a:spcPts val="0"/>
+              </a:spcBef>
+              <a:spcAft>
+                <a:spcPts val="0"/>
+              </a:spcAft>
+              <a:buSzPts val="1300"/>
+              <a:buChar char="■"/>
+              <a:defRPr sz="1300"/>
+            </a:lvl3pPr>
+            <a:lvl4pPr marL="1447800" marR="0" lvl="3" indent="-285750" algn="l" rtl="0">
+              <a:lnSpc>
+                <a:spcPct val="93000"/>
+              </a:lnSpc>
+              <a:spcBef>
+                <a:spcPts val="0"/>
+              </a:spcBef>
+              <a:spcAft>
+                <a:spcPts val="0"/>
+              </a:spcAft>
+              <a:buSzPts val="1300"/>
+              <a:buChar char="●"/>
+              <a:defRPr sz="1300"/>
+            </a:lvl4pPr>
+            <a:lvl5pPr marL="1866900" marR="0" lvl="4" indent="-285750" algn="l" rtl="0">
+              <a:lnSpc>
+                <a:spcPct val="93000"/>
+              </a:lnSpc>
+              <a:spcBef>
+                <a:spcPts val="0"/>
+              </a:spcBef>
+              <a:spcAft>
+                <a:spcPts val="0"/>
+              </a:spcAft>
+              <a:buSzPts val="1300"/>
+              <a:buChar char="○"/>
+              <a:defRPr sz="1300"/>
+            </a:lvl5pPr>
+            <a:lvl6pPr marL="2286000" marR="0" lvl="5" indent="-298450" algn="l" rtl="0">
+              <a:lnSpc>
+                <a:spcPct val="93000"/>
+              </a:lnSpc>
+              <a:spcBef>
+                <a:spcPts val="0"/>
+              </a:spcBef>
+              <a:spcAft>
+                <a:spcPts val="0"/>
+              </a:spcAft>
+              <a:buSzPts val="1300"/>
+              <a:buChar char="■"/>
+              <a:defRPr sz="1300"/>
+            </a:lvl6pPr>
+            <a:lvl7pPr marL="3111500" marR="0" lvl="6" indent="-285750" algn="l" rtl="0">
+              <a:lnSpc>
+                <a:spcPct val="93000"/>
+              </a:lnSpc>
+              <a:spcBef>
+                <a:spcPts val="0"/>
+              </a:spcBef>
+              <a:spcAft>
+                <a:spcPts val="0"/>
+              </a:spcAft>
+              <a:buSzPts val="1300"/>
+              <a:buChar char="●"/>
+              <a:defRPr sz="1300"/>
+            </a:lvl7pPr>
+            <a:lvl8pPr marL="4356100" marR="0" lvl="7" indent="-285750" algn="l" rtl="0">
+              <a:lnSpc>
+                <a:spcPct val="93000"/>
+              </a:lnSpc>
+              <a:spcBef>
+                <a:spcPts val="0"/>
+              </a:spcBef>
+              <a:spcAft>
+                <a:spcPts val="0"/>
+              </a:spcAft>
+              <a:buSzPts val="1300"/>
+              <a:buChar char="○"/>
+              <a:defRPr sz="1300"/>
+            </a:lvl8pPr>
+            <a:lvl9pPr marL="6019800" marR="0" lvl="8" indent="-298450" algn="l" rtl="0">
+              <a:lnSpc>
+                <a:spcPct val="93000"/>
+              </a:lnSpc>
+              <a:spcBef>
+                <a:spcPts val="0"/>
+              </a:spcBef>
+              <a:spcAft>
+                <a:spcPts val="0"/>
+              </a:spcAft>
+              <a:buSzPts val="1300"/>
+              <a:buChar char="■"/>
+              <a:defRPr sz="1300"/>
+            </a:lvl9pPr>
+          </a:lstStyle>
+          <a:p>
+            <a:pPr indent="0">
+              <a:buNone/>
+            </a:pPr>
+            <a:r>
+              <a:rPr lang="it-IT" sz="3000" dirty="0">
+                <a:solidFill>
+                  <a:srgbClr val="FFFFFF"/>
+                </a:solidFill>
+                <a:latin typeface="Segoe UI"/>
+              </a:rPr>
+              <a:t>First and </a:t>
+            </a:r>
+            <a:r>
+              <a:rPr lang="it-IT" sz="3000" dirty="0" err="1">
+                <a:solidFill>
+                  <a:srgbClr val="FFFFFF"/>
+                </a:solidFill>
+                <a:latin typeface="Segoe UI"/>
+              </a:rPr>
+              <a:t>not</a:t>
+            </a:r>
+            <a:r>
+              <a:rPr lang="it-IT" sz="3000" dirty="0">
+                <a:solidFill>
+                  <a:srgbClr val="FFFFFF"/>
+                </a:solidFill>
+                <a:latin typeface="Segoe UI"/>
+              </a:rPr>
+              <a:t> </a:t>
+            </a:r>
+            <a:r>
+              <a:rPr lang="it-IT" sz="3000" dirty="0" err="1">
+                <a:solidFill>
+                  <a:srgbClr val="FFFFFF"/>
+                </a:solidFill>
+                <a:latin typeface="Segoe UI"/>
+              </a:rPr>
+              <a:t>least</a:t>
+            </a:r>
+            <a:r>
+              <a:rPr lang="it-IT" sz="3000" dirty="0">
+                <a:solidFill>
+                  <a:srgbClr val="FFFFFF"/>
+                </a:solidFill>
+                <a:latin typeface="Segoe UI"/>
+              </a:rPr>
+              <a:t>: Mobile </a:t>
+            </a:r>
+            <a:r>
+              <a:rPr lang="it-IT" sz="3000" dirty="0" err="1">
+                <a:solidFill>
+                  <a:srgbClr val="FFFFFF"/>
+                </a:solidFill>
+                <a:latin typeface="Segoe UI"/>
+              </a:rPr>
+              <a:t>accessibility</a:t>
+            </a:r>
+            <a:endParaRPr lang="it-IT" dirty="0" err="1"/>
+          </a:p>
+        </p:txBody>
+      </p:sp>
     </p:spTree>
   </p:cSld>
   <p:clrMapOvr>
@@ -14080,88 +14249,6 @@
           <a:chExt cx="0" cy="0"/>
         </a:xfrm>
       </p:grpSpPr>
-      <p:sp>
-        <p:nvSpPr>
-          <p:cNvPr id="99" name="Shape 99">
-            <a:extLst>
-              <a:ext uri="{FF2B5EF4-FFF2-40B4-BE49-F238E27FC236}">
-                <a16:creationId xmlns:a16="http://schemas.microsoft.com/office/drawing/2014/main" id="{7A48B57C-E9BF-1080-4C6E-E130D343BBFF}"/>
-              </a:ext>
-            </a:extLst>
-          </p:cNvPr>
-          <p:cNvSpPr txBox="1">
-            <a:spLocks noGrp="1"/>
-          </p:cNvSpPr>
-          <p:nvPr>
-            <p:ph type="title" idx="4294967295"/>
-          </p:nvPr>
-        </p:nvSpPr>
-        <p:spPr>
-          <a:xfrm>
-            <a:off x="457200" y="-182567"/>
-            <a:ext cx="6750237" cy="1261540"/>
-          </a:xfrm>
-          <a:prstGeom prst="rect">
-            <a:avLst/>
-          </a:prstGeom>
-        </p:spPr>
-        <p:txBody>
-          <a:bodyPr spcFirstLastPara="1" wrap="square" lIns="82925" tIns="82925" rIns="82925" bIns="82925" anchor="ctr" anchorCtr="0">
-            <a:noAutofit/>
-          </a:bodyPr>
-          <a:lstStyle/>
-          <a:p>
-            <a:pPr indent="0">
-              <a:buNone/>
-            </a:pPr>
-            <a:r>
-              <a:rPr lang="it-IT" sz="3000" dirty="0">
-                <a:solidFill>
-                  <a:srgbClr val="FFFFFF"/>
-                </a:solidFill>
-                <a:latin typeface="Segoe UI"/>
-              </a:rPr>
-              <a:t>First and </a:t>
-            </a:r>
-            <a:r>
-              <a:rPr lang="it-IT" sz="3000" dirty="0" err="1">
-                <a:solidFill>
-                  <a:srgbClr val="FFFFFF"/>
-                </a:solidFill>
-                <a:latin typeface="Segoe UI"/>
-              </a:rPr>
-              <a:t>not</a:t>
-            </a:r>
-            <a:r>
-              <a:rPr lang="it-IT" sz="3000" dirty="0">
-                <a:solidFill>
-                  <a:srgbClr val="FFFFFF"/>
-                </a:solidFill>
-                <a:latin typeface="Segoe UI"/>
-              </a:rPr>
-              <a:t> </a:t>
-            </a:r>
-            <a:r>
-              <a:rPr lang="it-IT" sz="3000" dirty="0" err="1">
-                <a:solidFill>
-                  <a:srgbClr val="FFFFFF"/>
-                </a:solidFill>
-                <a:latin typeface="Segoe UI"/>
-              </a:rPr>
-              <a:t>least</a:t>
-            </a:r>
-            <a:r>
-              <a:rPr lang="it-IT" sz="3000" dirty="0">
-                <a:solidFill>
-                  <a:srgbClr val="FFFFFF"/>
-                </a:solidFill>
-                <a:latin typeface="Segoe UI"/>
-              </a:rPr>
-              <a:t>: Mobile challenges </a:t>
-            </a:r>
-          </a:p>
-        </p:txBody>
-      </p:sp>
       <p:sp>
         <p:nvSpPr>
           <p:cNvPr id="101" name="Shape 101">
@@ -14771,6 +14858,237 @@
           </a:p>
         </p:txBody>
       </p:sp>
+      <p:sp>
+        <p:nvSpPr>
+          <p:cNvPr id="9" name="Shape 99">
+            <a:extLst>
+              <a:ext uri="{FF2B5EF4-FFF2-40B4-BE49-F238E27FC236}">
+                <a16:creationId xmlns:a16="http://schemas.microsoft.com/office/drawing/2014/main" id="{C190D3FF-7227-259B-E7AB-7821A472E8F7}"/>
+              </a:ext>
+            </a:extLst>
+          </p:cNvPr>
+          <p:cNvSpPr txBox="1">
+            <a:spLocks/>
+          </p:cNvSpPr>
+          <p:nvPr/>
+        </p:nvSpPr>
+        <p:spPr>
+          <a:xfrm>
+            <a:off x="457200" y="-182567"/>
+            <a:ext cx="6817310" cy="1210142"/>
+          </a:xfrm>
+          <a:prstGeom prst="rect">
+            <a:avLst/>
+          </a:prstGeom>
+          <a:noFill/>
+          <a:ln>
+            <a:noFill/>
+          </a:ln>
+        </p:spPr>
+        <p:txBody>
+          <a:bodyPr spcFirstLastPara="1" wrap="square" lIns="82925" tIns="82925" rIns="82925" bIns="82925" anchor="ctr" anchorCtr="0">
+            <a:noAutofit/>
+          </a:bodyPr>
+          <a:lstStyle>
+            <a:defPPr marR="0" lvl="0" algn="l" rtl="0">
+              <a:lnSpc>
+                <a:spcPct val="100000"/>
+              </a:lnSpc>
+              <a:spcBef>
+                <a:spcPts val="0"/>
+              </a:spcBef>
+              <a:spcAft>
+                <a:spcPts val="0"/>
+              </a:spcAft>
+            </a:defPPr>
+            <a:lvl1pPr marL="0" marR="0" lvl="0" indent="-82550" algn="l" rtl="0" eaLnBrk="1" hangingPunct="1">
+              <a:lnSpc>
+                <a:spcPct val="93000"/>
+              </a:lnSpc>
+              <a:spcBef>
+                <a:spcPts val="0"/>
+              </a:spcBef>
+              <a:spcAft>
+                <a:spcPts val="0"/>
+              </a:spcAft>
+              <a:buSzPts val="1300"/>
+              <a:buChar char="●"/>
+              <a:defRPr sz="1300" b="0" i="0" u="none" strike="noStrike" cap="none">
+                <a:solidFill>
+                  <a:srgbClr val="000000"/>
+                </a:solidFill>
+                <a:latin typeface="Arial"/>
+                <a:ea typeface="Arial"/>
+                <a:cs typeface="Arial"/>
+                <a:sym typeface="Arial"/>
+              </a:defRPr>
+            </a:lvl1pPr>
+            <a:lvl2pPr marL="673100" marR="0" lvl="1" indent="-336550" algn="l" rtl="0">
+              <a:lnSpc>
+                <a:spcPct val="93000"/>
+              </a:lnSpc>
+              <a:spcBef>
+                <a:spcPts val="0"/>
+              </a:spcBef>
+              <a:spcAft>
+                <a:spcPts val="0"/>
+              </a:spcAft>
+              <a:buSzPts val="1300"/>
+              <a:buChar char="○"/>
+              <a:defRPr sz="1300"/>
+            </a:lvl2pPr>
+            <a:lvl3pPr marL="1041400" marR="0" lvl="2" indent="-298450" algn="l" rtl="0">
+              <a:lnSpc>
+                <a:spcPct val="93000"/>
+              </a:lnSpc>
+              <a:spcBef>
+                <a:spcPts val="0"/>
+              </a:spcBef>
+              <a:spcAft>
+                <a:spcPts val="0"/>
+              </a:spcAft>
+              <a:buSzPts val="1300"/>
+              <a:buChar char="■"/>
+              <a:defRPr sz="1300"/>
+            </a:lvl3pPr>
+            <a:lvl4pPr marL="1447800" marR="0" lvl="3" indent="-285750" algn="l" rtl="0">
+              <a:lnSpc>
+                <a:spcPct val="93000"/>
+              </a:lnSpc>
+              <a:spcBef>
+                <a:spcPts val="0"/>
+              </a:spcBef>
+              <a:spcAft>
+                <a:spcPts val="0"/>
+              </a:spcAft>
+              <a:buSzPts val="1300"/>
+              <a:buChar char="●"/>
+              <a:defRPr sz="1300"/>
+            </a:lvl4pPr>
+            <a:lvl5pPr marL="1866900" marR="0" lvl="4" indent="-285750" algn="l" rtl="0">
+              <a:lnSpc>
+                <a:spcPct val="93000"/>
+              </a:lnSpc>
+              <a:spcBef>
+                <a:spcPts val="0"/>
+              </a:spcBef>
+              <a:spcAft>
+                <a:spcPts val="0"/>
+              </a:spcAft>
+              <a:buSzPts val="1300"/>
+              <a:buChar char="○"/>
+              <a:defRPr sz="1300"/>
+            </a:lvl5pPr>
+            <a:lvl6pPr marL="2286000" marR="0" lvl="5" indent="-298450" algn="l" rtl="0">
+              <a:lnSpc>
+                <a:spcPct val="93000"/>
+              </a:lnSpc>
+              <a:spcBef>
+                <a:spcPts val="0"/>
+              </a:spcBef>
+              <a:spcAft>
+                <a:spcPts val="0"/>
+              </a:spcAft>
+              <a:buSzPts val="1300"/>
+              <a:buChar char="■"/>
+              <a:defRPr sz="1300"/>
+            </a:lvl6pPr>
+            <a:lvl7pPr marL="3111500" marR="0" lvl="6" indent="-285750" algn="l" rtl="0">
+              <a:lnSpc>
+                <a:spcPct val="93000"/>
+              </a:lnSpc>
+              <a:spcBef>
+                <a:spcPts val="0"/>
+              </a:spcBef>
+              <a:spcAft>
+                <a:spcPts val="0"/>
+              </a:spcAft>
+              <a:buSzPts val="1300"/>
+              <a:buChar char="●"/>
+              <a:defRPr sz="1300"/>
+            </a:lvl7pPr>
+            <a:lvl8pPr marL="4356100" marR="0" lvl="7" indent="-285750" algn="l" rtl="0">
+              <a:lnSpc>
+                <a:spcPct val="93000"/>
+              </a:lnSpc>
+              <a:spcBef>
+                <a:spcPts val="0"/>
+              </a:spcBef>
+              <a:spcAft>
+                <a:spcPts val="0"/>
+              </a:spcAft>
+              <a:buSzPts val="1300"/>
+              <a:buChar char="○"/>
+              <a:defRPr sz="1300"/>
+            </a:lvl8pPr>
+            <a:lvl9pPr marL="6019800" marR="0" lvl="8" indent="-298450" algn="l" rtl="0">
+              <a:lnSpc>
+                <a:spcPct val="93000"/>
+              </a:lnSpc>
+              <a:spcBef>
+                <a:spcPts val="0"/>
+              </a:spcBef>
+              <a:spcAft>
+                <a:spcPts val="0"/>
+              </a:spcAft>
+              <a:buSzPts val="1300"/>
+              <a:buChar char="■"/>
+              <a:defRPr sz="1300"/>
+            </a:lvl9pPr>
+          </a:lstStyle>
+          <a:p>
+            <a:pPr indent="0">
+              <a:buNone/>
+            </a:pPr>
+            <a:r>
+              <a:rPr lang="it-IT" sz="3000" dirty="0">
+                <a:solidFill>
+                  <a:srgbClr val="FFFFFF"/>
+                </a:solidFill>
+                <a:latin typeface="Segoe UI"/>
+              </a:rPr>
+              <a:t>First and </a:t>
+            </a:r>
+            <a:r>
+              <a:rPr lang="it-IT" sz="3000" dirty="0" err="1">
+                <a:solidFill>
+                  <a:srgbClr val="FFFFFF"/>
+                </a:solidFill>
+                <a:latin typeface="Segoe UI"/>
+              </a:rPr>
+              <a:t>not</a:t>
+            </a:r>
+            <a:r>
+              <a:rPr lang="it-IT" sz="3000" dirty="0">
+                <a:solidFill>
+                  <a:srgbClr val="FFFFFF"/>
+                </a:solidFill>
+                <a:latin typeface="Segoe UI"/>
+              </a:rPr>
+              <a:t> </a:t>
+            </a:r>
+            <a:r>
+              <a:rPr lang="it-IT" sz="3000" dirty="0" err="1">
+                <a:solidFill>
+                  <a:srgbClr val="FFFFFF"/>
+                </a:solidFill>
+                <a:latin typeface="Segoe UI"/>
+              </a:rPr>
+              <a:t>least</a:t>
+            </a:r>
+            <a:r>
+              <a:rPr lang="it-IT" sz="3000" dirty="0">
+                <a:solidFill>
+                  <a:srgbClr val="FFFFFF"/>
+                </a:solidFill>
+                <a:latin typeface="Segoe UI"/>
+              </a:rPr>
+              <a:t>: Mobile challenges</a:t>
+            </a:r>
+            <a:endParaRPr lang="it-IT" dirty="0"/>
+          </a:p>
+        </p:txBody>
+      </p:sp>
     </p:spTree>
     <p:extLst>
       <p:ext uri="{BB962C8B-B14F-4D97-AF65-F5344CB8AC3E}">
@@ -15807,7 +16125,7 @@
         <p:spPr>
           <a:xfrm>
             <a:off x="453650" y="962003"/>
-            <a:ext cx="5527553" cy="5632311"/>
+            <a:ext cx="5527553" cy="5324535"/>
           </a:xfrm>
           <a:prstGeom prst="rect">
             <a:avLst/>
@@ -15882,7 +16200,7 @@
               <a:t> </a:t>
             </a:r>
             <a:r>
-              <a:rPr lang="it-IT" sz="2000" err="1">
+              <a:rPr lang="it-IT" sz="2000" dirty="0" err="1">
                 <a:latin typeface="Segoe UI"/>
               </a:rPr>
               <a:t>TalkBack</a:t>
@@ -15891,17 +16209,8 @@
               <a:rPr lang="it-IT" sz="2000" dirty="0">
                 <a:latin typeface="Segoe UI"/>
               </a:rPr>
-              <a:t>, Switch Access, Keyboard </a:t>
-            </a:r>
-            <a:r>
-              <a:rPr lang="it-IT" sz="2000" err="1">
-                <a:latin typeface="Segoe UI"/>
-              </a:rPr>
-              <a:t>navigation</a:t>
-            </a:r>
-            <a:endParaRPr lang="it-IT">
-              <a:latin typeface="Segoe UI"/>
-            </a:endParaRPr>
+              <a:t>, Switch Access</a:t>
+            </a:r>
           </a:p>
           <a:p>
             <a:pPr marL="285750" indent="-285750" algn="just">

</xml_diff>

<commit_message>
Rewrote entire script + final slides + fixes
</commit_message>
<xml_diff>
--- a/Thesis Presentation/Presentation Gabriel Rovesti.pptx
+++ b/Thesis Presentation/Presentation Gabriel Rovesti.pptx
@@ -261,7 +261,7 @@
 <p1510:revInfo xmlns:a="http://schemas.openxmlformats.org/drawingml/2006/main" xmlns:r="http://schemas.openxmlformats.org/officeDocument/2006/relationships" xmlns:p1510="http://schemas.microsoft.com/office/powerpoint/2015/10/main">
   <p1510:revLst>
     <p1510:client id="{1D759D07-F260-6530-72C1-4EC9929CCA64}" v="158" dt="2025-07-09T14:45:12.816"/>
-    <p1510:client id="{41ACB71F-2355-3F93-36AD-B2AF0FA0873D}" v="85" dt="2025-07-11T12:59:37.305"/>
+    <p1510:client id="{41ACB71F-2355-3F93-36AD-B2AF0FA0873D}" v="171" dt="2025-07-11T14:08:44.190"/>
   </p1510:revLst>
 </p1510:revInfo>
 </file>
@@ -9876,7 +9876,7 @@
                 </a:solidFill>
                 <a:latin typeface="Segoe UI"/>
               </a:rPr>
-              <a:t>10/17</a:t>
+              <a:t>10/16</a:t>
             </a:r>
             <a:endParaRPr lang="it-IT" dirty="0">
               <a:solidFill>
@@ -10659,7 +10659,7 @@
                 </a:solidFill>
                 <a:latin typeface="Segoe UI"/>
               </a:rPr>
-              <a:t>11/17</a:t>
+              <a:t>11/16</a:t>
             </a:r>
             <a:endParaRPr lang="it-IT" dirty="0">
               <a:solidFill>
@@ -11396,7 +11396,7 @@
                 </a:solidFill>
                 <a:latin typeface="Segoe UI"/>
               </a:rPr>
-              <a:t>12/17</a:t>
+              <a:t>12/16</a:t>
             </a:r>
             <a:endParaRPr lang="it-IT" dirty="0">
               <a:solidFill>
@@ -11872,7 +11872,7 @@
                 </a:solidFill>
                 <a:latin typeface="Segoe UI"/>
               </a:rPr>
-              <a:t>14/17</a:t>
+              <a:t>13/16</a:t>
             </a:r>
             <a:endParaRPr lang="it-IT" dirty="0">
               <a:solidFill>
@@ -12396,7 +12396,7 @@
                 </a:solidFill>
                 <a:latin typeface="Segoe UI"/>
               </a:rPr>
-              <a:t>15/17</a:t>
+              <a:t>14/16</a:t>
             </a:r>
             <a:endParaRPr lang="it-IT" dirty="0">
               <a:solidFill>
@@ -12713,7 +12713,7 @@
                 </a:solidFill>
                 <a:latin typeface="Segoe UI"/>
               </a:rPr>
-              <a:t>16/17</a:t>
+              <a:t>15/16</a:t>
             </a:r>
             <a:endParaRPr lang="it-IT" dirty="0">
               <a:solidFill>
@@ -13136,7 +13136,7 @@
                 </a:solidFill>
                 <a:latin typeface="Segoe UI"/>
               </a:rPr>
-              <a:t>17/17</a:t>
+              <a:t>16/16</a:t>
             </a:r>
             <a:endParaRPr lang="it-IT" dirty="0">
               <a:solidFill>
@@ -13968,7 +13968,7 @@
                 </a:solidFill>
                 <a:latin typeface="Segoe UI"/>
               </a:rPr>
-              <a:t>2/17</a:t>
+              <a:t>2/16</a:t>
             </a:r>
             <a:endParaRPr lang="it-IT" dirty="0">
               <a:solidFill>
@@ -14848,7 +14848,7 @@
                 </a:solidFill>
                 <a:latin typeface="Segoe UI"/>
               </a:rPr>
-              <a:t>3/17</a:t>
+              <a:t>3/16</a:t>
             </a:r>
             <a:endParaRPr lang="it-IT" dirty="0">
               <a:solidFill>
@@ -15953,7 +15953,7 @@
                 </a:solidFill>
                 <a:latin typeface="Segoe UI"/>
               </a:rPr>
-              <a:t>4/17</a:t>
+              <a:t>4/16</a:t>
             </a:r>
             <a:endParaRPr lang="it-IT" dirty="0">
               <a:solidFill>
@@ -16735,7 +16735,7 @@
                 </a:solidFill>
                 <a:latin typeface="Segoe UI"/>
               </a:rPr>
-              <a:t>5/17</a:t>
+              <a:t>5/16</a:t>
             </a:r>
             <a:endParaRPr lang="it-IT" dirty="0">
               <a:solidFill>
@@ -17499,7 +17499,7 @@
                 </a:solidFill>
                 <a:latin typeface="Segoe UI"/>
               </a:rPr>
-              <a:t>6/17</a:t>
+              <a:t>6/16</a:t>
             </a:r>
             <a:endParaRPr lang="it-IT" dirty="0">
               <a:solidFill>
@@ -18427,7 +18427,7 @@
                 </a:solidFill>
                 <a:latin typeface="Segoe UI"/>
               </a:rPr>
-              <a:t>7/17</a:t>
+              <a:t>7/16</a:t>
             </a:r>
             <a:endParaRPr lang="it-IT" dirty="0">
               <a:solidFill>
@@ -19036,7 +19036,7 @@
                 </a:solidFill>
                 <a:latin typeface="Segoe UI"/>
               </a:rPr>
-              <a:t>8/17</a:t>
+              <a:t>8/16</a:t>
             </a:r>
             <a:endParaRPr lang="it-IT" dirty="0">
               <a:solidFill>
@@ -19387,7 +19387,7 @@
                 </a:solidFill>
                 <a:latin typeface="Segoe UI"/>
               </a:rPr>
-              <a:t>9/17</a:t>
+              <a:t>9/16</a:t>
             </a:r>
             <a:endParaRPr lang="it-IT" dirty="0">
               <a:solidFill>

</xml_diff>

<commit_message>
To-Do after first trial of presentation
</commit_message>
<xml_diff>
--- a/Thesis Presentation/Presentation Gabriel Rovesti.pptx
+++ b/Thesis Presentation/Presentation Gabriel Rovesti.pptx
@@ -260,8 +260,7 @@
 <file path=ppt/revisionInfo.xml><?xml version="1.0" encoding="utf-8"?>
 <p1510:revInfo xmlns:a="http://schemas.openxmlformats.org/drawingml/2006/main" xmlns:r="http://schemas.openxmlformats.org/officeDocument/2006/relationships" xmlns:p1510="http://schemas.microsoft.com/office/powerpoint/2015/10/main">
   <p1510:revLst>
-    <p1510:client id="{1D759D07-F260-6530-72C1-4EC9929CCA64}" v="158" dt="2025-07-09T14:45:12.816"/>
-    <p1510:client id="{41ACB71F-2355-3F93-36AD-B2AF0FA0873D}" v="171" dt="2025-07-11T14:08:44.190"/>
+    <p1510:client id="{E164A9A8-989A-95FE-C26E-A04E6233DD0D}" v="429" dt="2025-07-15T14:46:15.963"/>
   </p1510:revLst>
 </p1510:revInfo>
 </file>
@@ -360,7 +359,7 @@
           <a:p>
             <a:fld id="{6469F890-3609-4E18-B68A-510CF7125ACB}" type="datetimeFigureOut">
               <a:rPr lang="it-IT" smtClean="0"/>
-              <a:t>11/07/2025</a:t>
+              <a:t>15/07/2025</a:t>
             </a:fld>
             <a:endParaRPr lang="it-IT"/>
           </a:p>
@@ -12758,9 +12757,9 @@
               <a:rPr lang="en-US" sz="2000" b="1" dirty="0">
                 <a:latin typeface="Segoe UI"/>
               </a:rPr>
-              <a:t>Critical insights:</a:t>
-            </a:r>
-            <a:endParaRPr lang="it-IT" b="1">
+              <a:t>Insights for development choice:</a:t>
+            </a:r>
+            <a:endParaRPr lang="it-IT" b="1" dirty="0">
               <a:latin typeface="Segoe UI"/>
             </a:endParaRPr>
           </a:p>
@@ -12770,22 +12769,16 @@
               <a:buChar char="•"/>
             </a:pPr>
             <a:r>
+              <a:rPr lang="en-US" sz="2000" b="1" dirty="0">
+                <a:latin typeface="Segoe UI"/>
+              </a:rPr>
+              <a:t>React Native</a:t>
+            </a:r>
+            <a:r>
               <a:rPr lang="en-US" sz="2000" dirty="0">
                 <a:latin typeface="Segoe UI"/>
               </a:rPr>
-              <a:t>Choose </a:t>
-            </a:r>
-            <a:r>
-              <a:rPr lang="en-US" sz="2000" b="1" dirty="0">
-                <a:latin typeface="Segoe UI"/>
-              </a:rPr>
-              <a:t>React Native</a:t>
-            </a:r>
-            <a:r>
-              <a:rPr lang="en-US" sz="2000" dirty="0">
-                <a:latin typeface="Segoe UI"/>
-              </a:rPr>
-              <a:t> when: Rapid development, web accessibility experience, tight deadlines</a:t>
+              <a:t> for: Rapid development, web accessibility knowledge, tight deadlines</a:t>
             </a:r>
             <a:endParaRPr lang="en-US" dirty="0"/>
           </a:p>
@@ -12795,25 +12788,18 @@
               <a:buChar char="•"/>
             </a:pPr>
             <a:r>
+              <a:rPr lang="en-US" sz="2000" b="1" dirty="0">
+                <a:latin typeface="Segoe UI"/>
+                <a:cs typeface="Segoe UI"/>
+              </a:rPr>
+              <a:t>Flutter </a:t>
+            </a:r>
+            <a:r>
               <a:rPr lang="en-US" sz="2000" dirty="0">
                 <a:latin typeface="Segoe UI"/>
                 <a:cs typeface="Segoe UI"/>
               </a:rPr>
-              <a:t>Choose </a:t>
-            </a:r>
-            <a:r>
-              <a:rPr lang="en-US" sz="2000" b="1" dirty="0">
-                <a:latin typeface="Segoe UI"/>
-                <a:cs typeface="Segoe UI"/>
-              </a:rPr>
-              <a:t>Flutter </a:t>
-            </a:r>
-            <a:r>
-              <a:rPr lang="en-US" sz="2000" dirty="0">
-                <a:latin typeface="Segoe UI"/>
-                <a:cs typeface="Segoe UI"/>
-              </a:rPr>
-              <a:t>when: Complex custom components, long-term maintenance teams, granular control</a:t>
+              <a:t>for: Complex custom components, long-term maintenance teams, granular control</a:t>
             </a:r>
             <a:endParaRPr lang="en-US" dirty="0"/>
           </a:p>
@@ -13160,8 +13146,8 @@
         </p:nvSpPr>
         <p:spPr>
           <a:xfrm>
-            <a:off x="317734" y="961109"/>
-            <a:ext cx="8764545" cy="3170099"/>
+            <a:off x="180023" y="961109"/>
+            <a:ext cx="9191448" cy="2862322"/>
           </a:xfrm>
           <a:prstGeom prst="rect">
             <a:avLst/>
@@ -13227,19 +13213,6 @@
             <a:endParaRPr lang="en-US" dirty="0"/>
           </a:p>
           <a:p>
-            <a:pPr marL="800100" lvl="1" indent="-342900">
-              <a:buFont typeface="Courier New"/>
-              <a:buChar char="o"/>
-            </a:pPr>
-            <a:r>
-              <a:rPr lang="en-US" sz="2000" dirty="0">
-                <a:latin typeface="Segoe UI"/>
-              </a:rPr>
-              <a:t>45% implementation overhead reduction with React Native</a:t>
-            </a:r>
-            <a:endParaRPr lang="en-US" dirty="0"/>
-          </a:p>
-          <a:p>
             <a:pPr marL="342900" indent="-342900">
               <a:buFont typeface="Arial"/>
               <a:buChar char="•"/>
@@ -13298,9 +13271,9 @@
               <a:rPr lang="en-US" sz="2000" dirty="0">
                 <a:latin typeface="Segoe UI"/>
               </a:rPr>
-              <a:t>: Both achieve 100% WCAG compliance with proper implementation </a:t>
-            </a:r>
-            <a:endParaRPr lang="en-US">
+              <a:t>: Both achieve 85-90% WCAG compliance with proper implementation </a:t>
+            </a:r>
+            <a:endParaRPr lang="en-US" dirty="0">
               <a:latin typeface="Segoe UI"/>
             </a:endParaRPr>
           </a:p>
@@ -13472,7 +13445,7 @@
         <p:spPr>
           <a:xfrm>
             <a:off x="453650" y="1099713"/>
-            <a:ext cx="8061432" cy="2554545"/>
+            <a:ext cx="8061432" cy="2862322"/>
           </a:xfrm>
           <a:prstGeom prst="rect">
             <a:avLst/>
@@ -13751,21 +13724,36 @@
               <a:rPr lang="it-IT" sz="2000" dirty="0">
                 <a:latin typeface="Segoe UI"/>
               </a:rPr>
-              <a:t> for assistive </a:t>
+              <a:t>: small screens, </a:t>
             </a:r>
             <a:r>
               <a:rPr lang="it-IT" sz="2000" dirty="0" err="1">
                 <a:latin typeface="Segoe UI"/>
               </a:rPr>
-              <a:t>technology</a:t>
+              <a:t>orientation</a:t>
             </a:r>
             <a:r>
               <a:rPr lang="it-IT" sz="2000" dirty="0">
                 <a:latin typeface="Segoe UI"/>
               </a:rPr>
-              <a:t> users</a:t>
-            </a:r>
-            <a:endParaRPr lang="it-IT" dirty="0">
+              <a:t> </a:t>
+            </a:r>
+            <a:r>
+              <a:rPr lang="it-IT" sz="2000" dirty="0" err="1">
+                <a:latin typeface="Segoe UI"/>
+              </a:rPr>
+              <a:t>changes</a:t>
+            </a:r>
+            <a:r>
+              <a:rPr lang="it-IT" sz="2000" dirty="0">
+                <a:latin typeface="Segoe UI"/>
+              </a:rPr>
+              <a:t>, performances impact</a:t>
+            </a:r>
+          </a:p>
+          <a:p>
+            <a:pPr marL="457200" lvl="1" algn="just"/>
+            <a:endParaRPr lang="it-IT" sz="2000" dirty="0">
               <a:latin typeface="Segoe UI"/>
             </a:endParaRPr>
           </a:p>
@@ -15250,7 +15238,7 @@
         <p:spPr>
           <a:xfrm>
             <a:off x="453650" y="969267"/>
-            <a:ext cx="5597921" cy="5493022"/>
+            <a:ext cx="5597921" cy="5355312"/>
           </a:xfrm>
           <a:prstGeom prst="rect">
             <a:avLst/>
@@ -15688,25 +15676,37 @@
               <a:rPr lang="it-IT" sz="1800" dirty="0">
                 <a:latin typeface="Segoe UI"/>
               </a:rPr>
-              <a:t> Mobile developers </a:t>
+              <a:t> </a:t>
             </a:r>
             <a:r>
               <a:rPr lang="it-IT" sz="1800" dirty="0" err="1">
                 <a:latin typeface="Segoe UI"/>
               </a:rPr>
-              <a:t>lack</a:t>
+              <a:t>Lack</a:t>
             </a:r>
             <a:r>
               <a:rPr lang="it-IT" sz="1800" dirty="0">
                 <a:latin typeface="Segoe UI"/>
               </a:rPr>
+              <a:t> of </a:t>
+            </a:r>
+            <a:r>
+              <a:rPr lang="it-IT" sz="1800" dirty="0" err="1">
+                <a:latin typeface="Segoe UI"/>
+              </a:rPr>
+              <a:t>comprehensive</a:t>
+            </a:r>
+            <a:r>
+              <a:rPr lang="it-IT" sz="1800" dirty="0">
+                <a:latin typeface="Segoe UI"/>
+              </a:rPr>
               <a:t> </a:t>
             </a:r>
             <a:r>
               <a:rPr lang="it-IT" sz="1800" dirty="0" err="1">
                 <a:latin typeface="Segoe UI"/>
               </a:rPr>
-              <a:t>comprehensive</a:t>
+              <a:t>accessibility</a:t>
             </a:r>
             <a:r>
               <a:rPr lang="it-IT" sz="1800" dirty="0">
@@ -15718,35 +15718,32 @@
               <a:rPr lang="it-IT" sz="1800" dirty="0" err="1">
                 <a:latin typeface="Segoe UI"/>
               </a:rPr>
-              <a:t>accessibility</a:t>
+              <a:t>implementation</a:t>
             </a:r>
             <a:r>
               <a:rPr lang="it-IT" sz="1800" dirty="0">
                 <a:latin typeface="Segoe UI"/>
               </a:rPr>
-              <a:t> </a:t>
+              <a:t>, </a:t>
             </a:r>
             <a:r>
               <a:rPr lang="it-IT" sz="1800" dirty="0" err="1">
                 <a:latin typeface="Segoe UI"/>
               </a:rPr>
-              <a:t>implementation</a:t>
+              <a:t>mostly</a:t>
             </a:r>
             <a:r>
               <a:rPr lang="it-IT" sz="1800" dirty="0">
                 <a:latin typeface="Segoe UI"/>
               </a:rPr>
-              <a:t> </a:t>
+              <a:t> web-</a:t>
             </a:r>
             <a:r>
               <a:rPr lang="it-IT" sz="1800" dirty="0" err="1">
                 <a:latin typeface="Segoe UI"/>
               </a:rPr>
-              <a:t>guidance</a:t>
-            </a:r>
-            <a:endParaRPr lang="it-IT">
-              <a:latin typeface="Segoe UI"/>
-            </a:endParaRPr>
+              <a:t>focused</a:t>
+            </a:r>
           </a:p>
           <a:p>
             <a:pPr algn="just"/>
@@ -17300,7 +17297,7 @@
               <a:rPr lang="it-IT" sz="2000" b="1" dirty="0">
                 <a:latin typeface="Segoe UI"/>
               </a:rPr>
-              <a:t>Educational </a:t>
+              <a:t>Developer-first educational </a:t>
             </a:r>
             <a:r>
               <a:rPr lang="it-IT" sz="2000" b="1" dirty="0" err="1">

</xml_diff>

<commit_message>
Full slides + started final rewriting of script
</commit_message>
<xml_diff>
--- a/Thesis Presentation/Presentation Gabriel Rovesti.pptx
+++ b/Thesis Presentation/Presentation Gabriel Rovesti.pptx
@@ -261,7 +261,7 @@
 <p1510:revInfo xmlns:a="http://schemas.openxmlformats.org/drawingml/2006/main" xmlns:r="http://schemas.openxmlformats.org/officeDocument/2006/relationships" xmlns:p1510="http://schemas.microsoft.com/office/powerpoint/2015/10/main">
   <p1510:revLst>
     <p1510:client id="{41AFE373-BDC1-3135-2FEB-41F7888ACE60}" v="976" dt="2025-07-16T17:18:33.846"/>
-    <p1510:client id="{BCB4DB06-B24F-4560-B73E-F8C78F875223}" v="329" dt="2025-07-16T17:48:42.071"/>
+    <p1510:client id="{BCB4DB06-B24F-4560-B73E-F8C78F875223}" v="545" dt="2025-07-16T19:27:38.913"/>
     <p1510:client id="{E164A9A8-989A-95FE-C26E-A04E6233DD0D}" v="429" dt="2025-07-15T14:46:15.963"/>
   </p1510:revLst>
 </p1510:revInfo>
@@ -9744,7 +9744,7 @@
                 </a:solidFill>
                 <a:latin typeface="Segoe UI"/>
               </a:rPr>
-              <a:t>(3) </a:t>
+              <a:t>3 - </a:t>
             </a:r>
             <a:r>
               <a:rPr lang="it-IT" sz="3000" dirty="0" err="1">
@@ -11271,7 +11271,7 @@
                 <a:latin typeface="Segoe UI"/>
                 <a:cs typeface="Segoe UI"/>
               </a:rPr>
-              <a:t>Frameworks </a:t>
+              <a:t>Framework </a:t>
             </a:r>
             <a:r>
               <a:rPr lang="it-IT" sz="3000" dirty="0" err="1">
@@ -11283,7 +11283,7 @@
               </a:rPr>
               <a:t>comparison</a:t>
             </a:r>
-            <a:endParaRPr lang="it-IT" sz="3000">
+            <a:endParaRPr lang="it-IT" sz="3000" dirty="0">
               <a:solidFill>
                 <a:srgbClr val="FFFFFF"/>
               </a:solidFill>
@@ -11455,7 +11455,7 @@
         <p:spPr>
           <a:xfrm>
             <a:off x="315940" y="962003"/>
-            <a:ext cx="8515877" cy="1323439"/>
+            <a:ext cx="8515877" cy="1631216"/>
           </a:xfrm>
           <a:prstGeom prst="rect">
             <a:avLst/>
@@ -11509,7 +11509,7 @@
               <a:t> </a:t>
             </a:r>
             <a:r>
-              <a:rPr lang="it-IT" sz="2000" err="1">
+              <a:rPr lang="it-IT" sz="2000" dirty="0" err="1">
                 <a:latin typeface="Segoe UI"/>
               </a:rPr>
               <a:t>Property-based</a:t>
@@ -11518,14 +11518,17 @@
               <a:rPr lang="it-IT" sz="2000" dirty="0">
                 <a:latin typeface="Segoe UI"/>
               </a:rPr>
-              <a:t> model </a:t>
-            </a:r>
-            <a:r>
-              <a:rPr lang="it-IT" sz="2000" dirty="0"/>
-              <a:t>(</a:t>
-            </a:r>
-            <a:r>
-              <a:rPr lang="it-IT" sz="2000" err="1">
+              <a:t> model</a:t>
+            </a:r>
+            <a:endParaRPr lang="it-IT" dirty="0"/>
+          </a:p>
+          <a:p>
+            <a:pPr marL="742950" lvl="1" indent="-285750" algn="just">
+              <a:buFont typeface="Courier New"/>
+              <a:buChar char="o"/>
+            </a:pPr>
+            <a:r>
+              <a:rPr lang="it-IT" sz="2000" dirty="0" err="1">
                 <a:latin typeface="Consolas"/>
               </a:rPr>
               <a:t>accessibilityLabel</a:t>
@@ -11535,16 +11538,12 @@
               <a:t>, </a:t>
             </a:r>
             <a:r>
-              <a:rPr lang="it-IT" sz="2000" err="1">
+              <a:rPr lang="it-IT" sz="2000" dirty="0" err="1">
                 <a:latin typeface="Consolas"/>
               </a:rPr>
               <a:t>accessibilityRole</a:t>
             </a:r>
-            <a:r>
-              <a:rPr lang="it-IT" sz="2000" dirty="0"/>
-              <a:t>)</a:t>
-            </a:r>
-            <a:endParaRPr lang="it-IT" dirty="0"/>
+            <a:endParaRPr lang="it-IT" sz="2000" dirty="0" err="1"/>
           </a:p>
           <a:p>
             <a:pPr marL="285750" indent="-285750" algn="just">
@@ -11564,7 +11563,7 @@
               <a:t> Widget-</a:t>
             </a:r>
             <a:r>
-              <a:rPr lang="it-IT" sz="2000" dirty="0" err="1">
+              <a:rPr lang="it-IT" sz="2000" err="1">
                 <a:latin typeface="Segoe UI"/>
               </a:rPr>
               <a:t>based</a:t>
@@ -11576,16 +11575,25 @@
               <a:t> </a:t>
             </a:r>
             <a:r>
-              <a:rPr lang="it-IT" sz="2000" dirty="0" err="1">
+              <a:rPr lang="it-IT" sz="2000" err="1">
                 <a:latin typeface="Segoe UI"/>
               </a:rPr>
               <a:t>approach</a:t>
             </a:r>
+            <a:endParaRPr lang="it-IT" dirty="0" err="1">
+              <a:latin typeface="Segoe UI"/>
+            </a:endParaRPr>
+          </a:p>
+          <a:p>
+            <a:pPr marL="742950" lvl="1" indent="-285750" algn="just">
+              <a:buFont typeface="Courier New"/>
+              <a:buChar char="o"/>
+            </a:pPr>
             <a:r>
               <a:rPr lang="it-IT" sz="2000" dirty="0">
                 <a:latin typeface="Segoe UI"/>
               </a:rPr>
-              <a:t> (explici</a:t>
+              <a:t>Explici</a:t>
             </a:r>
             <a:r>
               <a:rPr lang="it-IT" sz="2000" dirty="0"/>
@@ -11605,17 +11613,14 @@
               <a:rPr lang="it-IT" sz="2000" dirty="0" err="1">
                 <a:latin typeface="Segoe UI"/>
               </a:rPr>
-              <a:t>wrappers</a:t>
+              <a:t>adapters</a:t>
             </a:r>
             <a:r>
               <a:rPr lang="it-IT" sz="2000" dirty="0">
                 <a:latin typeface="Segoe UI"/>
               </a:rPr>
-              <a:t>)</a:t>
-            </a:r>
-            <a:endParaRPr lang="it-IT" dirty="0">
-              <a:latin typeface="Segoe UI"/>
-            </a:endParaRPr>
+              <a:t> </a:t>
+            </a:r>
           </a:p>
         </p:txBody>
       </p:sp>
@@ -11978,7 +11983,7 @@
                 <a:latin typeface="Segoe UI"/>
                 <a:cs typeface="Segoe UI"/>
               </a:rPr>
-              <a:t> (1)</a:t>
+              <a:t> - 1</a:t>
             </a:r>
             <a:endParaRPr lang="it-IT" dirty="0" err="1"/>
           </a:p>
@@ -12460,7 +12465,7 @@
                 <a:latin typeface="Segoe UI"/>
                 <a:cs typeface="Segoe UI"/>
               </a:rPr>
-              <a:t> (2)</a:t>
+              <a:t> - 2</a:t>
             </a:r>
             <a:endParaRPr lang="it-IT" dirty="0" err="1"/>
           </a:p>
@@ -12764,7 +12769,7 @@
         </p:blipFill>
         <p:spPr>
           <a:xfrm>
-            <a:off x="836957" y="955398"/>
+            <a:off x="850728" y="955398"/>
             <a:ext cx="7457662" cy="3642692"/>
           </a:xfrm>
           <a:prstGeom prst="rect">
@@ -13122,19 +13127,19 @@
               <a:buChar char="•"/>
             </a:pPr>
             <a:r>
+              <a:rPr lang="en-US" sz="2000" b="1" dirty="0">
+                <a:latin typeface="Segoe UI"/>
+                <a:cs typeface="Segoe UI"/>
+              </a:rPr>
+              <a:t>Systematic evaluation methodology</a:t>
+            </a:r>
+            <a:r>
               <a:rPr lang="en-US" sz="2000" dirty="0">
                 <a:latin typeface="Segoe UI"/>
-              </a:rPr>
-              <a:t>Extended</a:t>
-            </a:r>
-            <a:r>
-              <a:rPr lang="en-US" sz="2000" dirty="0">
-                <a:latin typeface="Segoe UI"/>
                 <a:cs typeface="Segoe UI"/>
               </a:rPr>
-              <a:t> research framework from Flutter-only to comparative analysis</a:t>
-            </a:r>
-            <a:endParaRPr lang="en-US" dirty="0"/>
+              <a:t> on evidence-based formal metrics</a:t>
+            </a:r>
           </a:p>
           <a:p>
             <a:pPr marL="342900" indent="-342900">
@@ -13142,10 +13147,16 @@
               <a:buChar char="•"/>
             </a:pPr>
             <a:r>
+              <a:rPr lang="en-US" sz="2000" b="1" dirty="0">
+                <a:latin typeface="Segoe UI"/>
+              </a:rPr>
+              <a:t>First quantitative framework</a:t>
+            </a:r>
+            <a:r>
               <a:rPr lang="en-US" sz="2000" dirty="0">
                 <a:latin typeface="Segoe UI"/>
               </a:rPr>
-              <a:t>First quantitative framework for mobile accessibility cost assessment  </a:t>
+              <a:t> for cross-platform accessibility assessments </a:t>
             </a:r>
             <a:endParaRPr lang="en-US" dirty="0"/>
           </a:p>
@@ -13155,10 +13166,16 @@
               <a:buChar char="•"/>
             </a:pPr>
             <a:r>
+              <a:rPr lang="en-US" sz="2000" b="1" dirty="0">
+                <a:latin typeface="Segoe UI"/>
+              </a:rPr>
+              <a:t>Systematic methodology</a:t>
+            </a:r>
+            <a:r>
               <a:rPr lang="en-US" sz="2000" dirty="0">
                 <a:latin typeface="Segoe UI"/>
               </a:rPr>
-              <a:t>Systematic methodology bridging WCAG theory to mobile practice</a:t>
+              <a:t> bridging WCAG theory to mobile practice</a:t>
             </a:r>
             <a:endParaRPr lang="en-US" dirty="0"/>
           </a:p>
@@ -13190,7 +13207,7 @@
               <a:rPr lang="en-US" sz="2000" dirty="0">
                 <a:latin typeface="Segoe UI"/>
               </a:rPr>
-              <a:t>: No framework accessible by default (38% vs 32%) </a:t>
+              <a:t>: No framework accessible by default – intervention required for both</a:t>
             </a:r>
           </a:p>
           <a:p>
@@ -13208,7 +13225,7 @@
               <a:rPr lang="en-US" sz="2000" dirty="0">
                 <a:latin typeface="Segoe UI"/>
               </a:rPr>
-              <a:t>: Both achieve 85-90% WCAG compliance with proper implementation </a:t>
+              <a:t>: Both achieve high WCAG compliance with proper implementation </a:t>
             </a:r>
             <a:endParaRPr lang="en-US" dirty="0">
               <a:latin typeface="Segoe UI"/>
@@ -17959,7 +17976,7 @@
                 </a:solidFill>
                 <a:latin typeface="Segoe UI"/>
               </a:rPr>
-              <a:t>(1) Component-</a:t>
+              <a:t>1 - Component-</a:t>
             </a:r>
             <a:r>
               <a:rPr lang="it-IT" sz="3000" dirty="0" err="1">
@@ -18315,7 +18332,7 @@
                 </a:solidFill>
                 <a:latin typeface="Segoe UI"/>
               </a:rPr>
-              <a:t>(2) </a:t>
+              <a:t>2 - </a:t>
             </a:r>
             <a:r>
               <a:rPr lang="it-IT" sz="3000" dirty="0" err="1">

</xml_diff>